<commit_message>
add . recursive fivo / memoization recursive fivo
</commit_message>
<xml_diff>
--- a/04.function/SMCE_ppt_04.pptx
+++ b/04.function/SMCE_ppt_04.pptx
@@ -5,29 +5,31 @@
     <p:sldMasterId id="2147483648" r:id="rId1"/>
   </p:sldMasterIdLst>
   <p:notesMasterIdLst>
-    <p:notesMasterId r:id="rId22"/>
+    <p:notesMasterId r:id="rId24"/>
   </p:notesMasterIdLst>
   <p:sldIdLst>
     <p:sldId id="256" r:id="rId2"/>
     <p:sldId id="277" r:id="rId3"/>
-    <p:sldId id="278" r:id="rId4"/>
-    <p:sldId id="280" r:id="rId5"/>
-    <p:sldId id="281" r:id="rId6"/>
+    <p:sldId id="280" r:id="rId4"/>
+    <p:sldId id="281" r:id="rId5"/>
+    <p:sldId id="284" r:id="rId6"/>
     <p:sldId id="282" r:id="rId7"/>
-    <p:sldId id="284" r:id="rId8"/>
-    <p:sldId id="283" r:id="rId9"/>
-    <p:sldId id="286" r:id="rId10"/>
-    <p:sldId id="285" r:id="rId11"/>
-    <p:sldId id="279" r:id="rId12"/>
-    <p:sldId id="287" r:id="rId13"/>
-    <p:sldId id="289" r:id="rId14"/>
-    <p:sldId id="288" r:id="rId15"/>
-    <p:sldId id="290" r:id="rId16"/>
-    <p:sldId id="291" r:id="rId17"/>
-    <p:sldId id="292" r:id="rId18"/>
-    <p:sldId id="293" r:id="rId19"/>
-    <p:sldId id="295" r:id="rId20"/>
-    <p:sldId id="294" r:id="rId21"/>
+    <p:sldId id="283" r:id="rId8"/>
+    <p:sldId id="286" r:id="rId9"/>
+    <p:sldId id="298" r:id="rId10"/>
+    <p:sldId id="297" r:id="rId11"/>
+    <p:sldId id="285" r:id="rId12"/>
+    <p:sldId id="279" r:id="rId13"/>
+    <p:sldId id="296" r:id="rId14"/>
+    <p:sldId id="287" r:id="rId15"/>
+    <p:sldId id="289" r:id="rId16"/>
+    <p:sldId id="288" r:id="rId17"/>
+    <p:sldId id="290" r:id="rId18"/>
+    <p:sldId id="291" r:id="rId19"/>
+    <p:sldId id="292" r:id="rId20"/>
+    <p:sldId id="293" r:id="rId21"/>
+    <p:sldId id="295" r:id="rId22"/>
+    <p:sldId id="294" r:id="rId23"/>
   </p:sldIdLst>
   <p:sldSz cx="12192000" cy="6858000"/>
   <p:notesSz cx="6858000" cy="9144000"/>
@@ -216,7 +218,7 @@
           <a:p>
             <a:fld id="{7BAEAD52-75FB-7140-85F2-B343E705F587}" type="datetimeFigureOut">
               <a:rPr lang="en-US" altLang="ko-Kore-KR" smtClean="0"/>
-              <a:t>12/5/23</a:t>
+              <a:t>12/7/23</a:t>
             </a:fld>
             <a:endParaRPr lang="ko-Kore-KR"/>
           </a:p>
@@ -633,7 +635,7 @@
           <a:p>
             <a:fld id="{B7B52191-21B5-444B-8F34-B03D147DB134}" type="datetimeFigureOut">
               <a:rPr lang="en-US" altLang="ko-Kore-KR" smtClean="0"/>
-              <a:t>12/5/23</a:t>
+              <a:t>12/7/23</a:t>
             </a:fld>
             <a:endParaRPr lang="ko-Kore-KR"/>
           </a:p>
@@ -833,7 +835,7 @@
           <a:p>
             <a:fld id="{B7B52191-21B5-444B-8F34-B03D147DB134}" type="datetimeFigureOut">
               <a:rPr lang="en-US" altLang="ko-Kore-KR" smtClean="0"/>
-              <a:t>12/5/23</a:t>
+              <a:t>12/7/23</a:t>
             </a:fld>
             <a:endParaRPr lang="ko-Kore-KR"/>
           </a:p>
@@ -1043,7 +1045,7 @@
           <a:p>
             <a:fld id="{B7B52191-21B5-444B-8F34-B03D147DB134}" type="datetimeFigureOut">
               <a:rPr lang="en-US" altLang="ko-Kore-KR" smtClean="0"/>
-              <a:t>12/5/23</a:t>
+              <a:t>12/7/23</a:t>
             </a:fld>
             <a:endParaRPr lang="ko-Kore-KR"/>
           </a:p>
@@ -1243,7 +1245,7 @@
           <a:p>
             <a:fld id="{B7B52191-21B5-444B-8F34-B03D147DB134}" type="datetimeFigureOut">
               <a:rPr lang="en-US" altLang="ko-Kore-KR" smtClean="0"/>
-              <a:t>12/5/23</a:t>
+              <a:t>12/7/23</a:t>
             </a:fld>
             <a:endParaRPr lang="ko-Kore-KR"/>
           </a:p>
@@ -1519,7 +1521,7 @@
           <a:p>
             <a:fld id="{B7B52191-21B5-444B-8F34-B03D147DB134}" type="datetimeFigureOut">
               <a:rPr lang="en-US" altLang="ko-Kore-KR" smtClean="0"/>
-              <a:t>12/5/23</a:t>
+              <a:t>12/7/23</a:t>
             </a:fld>
             <a:endParaRPr lang="ko-Kore-KR"/>
           </a:p>
@@ -1787,7 +1789,7 @@
           <a:p>
             <a:fld id="{B7B52191-21B5-444B-8F34-B03D147DB134}" type="datetimeFigureOut">
               <a:rPr lang="en-US" altLang="ko-Kore-KR" smtClean="0"/>
-              <a:t>12/5/23</a:t>
+              <a:t>12/7/23</a:t>
             </a:fld>
             <a:endParaRPr lang="ko-Kore-KR"/>
           </a:p>
@@ -2202,7 +2204,7 @@
           <a:p>
             <a:fld id="{B7B52191-21B5-444B-8F34-B03D147DB134}" type="datetimeFigureOut">
               <a:rPr lang="en-US" altLang="ko-Kore-KR" smtClean="0"/>
-              <a:t>12/5/23</a:t>
+              <a:t>12/7/23</a:t>
             </a:fld>
             <a:endParaRPr lang="ko-Kore-KR"/>
           </a:p>
@@ -2344,7 +2346,7 @@
           <a:p>
             <a:fld id="{B7B52191-21B5-444B-8F34-B03D147DB134}" type="datetimeFigureOut">
               <a:rPr lang="en-US" altLang="ko-Kore-KR" smtClean="0"/>
-              <a:t>12/5/23</a:t>
+              <a:t>12/7/23</a:t>
             </a:fld>
             <a:endParaRPr lang="ko-Kore-KR"/>
           </a:p>
@@ -2457,7 +2459,7 @@
           <a:p>
             <a:fld id="{B7B52191-21B5-444B-8F34-B03D147DB134}" type="datetimeFigureOut">
               <a:rPr lang="en-US" altLang="ko-Kore-KR" smtClean="0"/>
-              <a:t>12/5/23</a:t>
+              <a:t>12/7/23</a:t>
             </a:fld>
             <a:endParaRPr lang="ko-Kore-KR"/>
           </a:p>
@@ -2770,7 +2772,7 @@
           <a:p>
             <a:fld id="{B7B52191-21B5-444B-8F34-B03D147DB134}" type="datetimeFigureOut">
               <a:rPr lang="en-US" altLang="ko-Kore-KR" smtClean="0"/>
-              <a:t>12/5/23</a:t>
+              <a:t>12/7/23</a:t>
             </a:fld>
             <a:endParaRPr lang="ko-Kore-KR"/>
           </a:p>
@@ -3059,7 +3061,7 @@
           <a:p>
             <a:fld id="{B7B52191-21B5-444B-8F34-B03D147DB134}" type="datetimeFigureOut">
               <a:rPr lang="en-US" altLang="ko-Kore-KR" smtClean="0"/>
-              <a:t>12/5/23</a:t>
+              <a:t>12/7/23</a:t>
             </a:fld>
             <a:endParaRPr lang="ko-Kore-KR"/>
           </a:p>
@@ -3302,7 +3304,7 @@
           <a:p>
             <a:fld id="{B7B52191-21B5-444B-8F34-B03D147DB134}" type="datetimeFigureOut">
               <a:rPr lang="en-US" altLang="ko-Kore-KR" smtClean="0"/>
-              <a:t>12/5/23</a:t>
+              <a:t>12/7/23</a:t>
             </a:fld>
             <a:endParaRPr lang="ko-Kore-KR"/>
           </a:p>
@@ -4102,6 +4104,493 @@
         </p:nvSpPr>
         <p:spPr>
           <a:xfrm>
+            <a:off x="-1289789" y="0"/>
+            <a:ext cx="4899041" cy="778476"/>
+          </a:xfrm>
+          <a:prstGeom prst="rect">
+            <a:avLst/>
+          </a:prstGeom>
+        </p:spPr>
+        <p:txBody>
+          <a:bodyPr vert="horz" lIns="91440" tIns="45720" rIns="91440" bIns="45720" rtlCol="0">
+            <a:normAutofit/>
+          </a:bodyPr>
+          <a:lstStyle>
+            <a:lvl1pPr marL="0" indent="0" algn="ctr" defTabSz="914400" rtl="0" eaLnBrk="1" latinLnBrk="0" hangingPunct="1">
+              <a:lnSpc>
+                <a:spcPct val="90000"/>
+              </a:lnSpc>
+              <a:spcBef>
+                <a:spcPts val="1000"/>
+              </a:spcBef>
+              <a:buFont typeface="Arial" panose="020B0604020202020204" pitchFamily="34" charset="0"/>
+              <a:buNone/>
+              <a:defRPr sz="2400" kern="1200">
+                <a:solidFill>
+                  <a:schemeClr val="tx1"/>
+                </a:solidFill>
+                <a:latin typeface="+mn-lt"/>
+                <a:ea typeface="+mn-ea"/>
+                <a:cs typeface="+mn-cs"/>
+              </a:defRPr>
+            </a:lvl1pPr>
+            <a:lvl2pPr marL="457200" indent="0" algn="ctr" defTabSz="914400" rtl="0" eaLnBrk="1" latinLnBrk="0" hangingPunct="1">
+              <a:lnSpc>
+                <a:spcPct val="90000"/>
+              </a:lnSpc>
+              <a:spcBef>
+                <a:spcPts val="500"/>
+              </a:spcBef>
+              <a:buFont typeface="Arial" panose="020B0604020202020204" pitchFamily="34" charset="0"/>
+              <a:buNone/>
+              <a:defRPr sz="2000" kern="1200">
+                <a:solidFill>
+                  <a:schemeClr val="tx1"/>
+                </a:solidFill>
+                <a:latin typeface="+mn-lt"/>
+                <a:ea typeface="+mn-ea"/>
+                <a:cs typeface="+mn-cs"/>
+              </a:defRPr>
+            </a:lvl2pPr>
+            <a:lvl3pPr marL="914400" indent="0" algn="ctr" defTabSz="914400" rtl="0" eaLnBrk="1" latinLnBrk="0" hangingPunct="1">
+              <a:lnSpc>
+                <a:spcPct val="90000"/>
+              </a:lnSpc>
+              <a:spcBef>
+                <a:spcPts val="500"/>
+              </a:spcBef>
+              <a:buFont typeface="Arial" panose="020B0604020202020204" pitchFamily="34" charset="0"/>
+              <a:buNone/>
+              <a:defRPr sz="1800" kern="1200">
+                <a:solidFill>
+                  <a:schemeClr val="tx1"/>
+                </a:solidFill>
+                <a:latin typeface="+mn-lt"/>
+                <a:ea typeface="+mn-ea"/>
+                <a:cs typeface="+mn-cs"/>
+              </a:defRPr>
+            </a:lvl3pPr>
+            <a:lvl4pPr marL="1371600" indent="0" algn="ctr" defTabSz="914400" rtl="0" eaLnBrk="1" latinLnBrk="0" hangingPunct="1">
+              <a:lnSpc>
+                <a:spcPct val="90000"/>
+              </a:lnSpc>
+              <a:spcBef>
+                <a:spcPts val="500"/>
+              </a:spcBef>
+              <a:buFont typeface="Arial" panose="020B0604020202020204" pitchFamily="34" charset="0"/>
+              <a:buNone/>
+              <a:defRPr sz="1600" kern="1200">
+                <a:solidFill>
+                  <a:schemeClr val="tx1"/>
+                </a:solidFill>
+                <a:latin typeface="+mn-lt"/>
+                <a:ea typeface="+mn-ea"/>
+                <a:cs typeface="+mn-cs"/>
+              </a:defRPr>
+            </a:lvl4pPr>
+            <a:lvl5pPr marL="1828800" indent="0" algn="ctr" defTabSz="914400" rtl="0" eaLnBrk="1" latinLnBrk="0" hangingPunct="1">
+              <a:lnSpc>
+                <a:spcPct val="90000"/>
+              </a:lnSpc>
+              <a:spcBef>
+                <a:spcPts val="500"/>
+              </a:spcBef>
+              <a:buFont typeface="Arial" panose="020B0604020202020204" pitchFamily="34" charset="0"/>
+              <a:buNone/>
+              <a:defRPr sz="1600" kern="1200">
+                <a:solidFill>
+                  <a:schemeClr val="tx1"/>
+                </a:solidFill>
+                <a:latin typeface="+mn-lt"/>
+                <a:ea typeface="+mn-ea"/>
+                <a:cs typeface="+mn-cs"/>
+              </a:defRPr>
+            </a:lvl5pPr>
+            <a:lvl6pPr marL="2286000" indent="0" algn="ctr" defTabSz="914400" rtl="0" eaLnBrk="1" latinLnBrk="0" hangingPunct="1">
+              <a:lnSpc>
+                <a:spcPct val="90000"/>
+              </a:lnSpc>
+              <a:spcBef>
+                <a:spcPts val="500"/>
+              </a:spcBef>
+              <a:buFont typeface="Arial" panose="020B0604020202020204" pitchFamily="34" charset="0"/>
+              <a:buNone/>
+              <a:defRPr sz="1600" kern="1200">
+                <a:solidFill>
+                  <a:schemeClr val="tx1"/>
+                </a:solidFill>
+                <a:latin typeface="+mn-lt"/>
+                <a:ea typeface="+mn-ea"/>
+                <a:cs typeface="+mn-cs"/>
+              </a:defRPr>
+            </a:lvl6pPr>
+            <a:lvl7pPr marL="2743200" indent="0" algn="ctr" defTabSz="914400" rtl="0" eaLnBrk="1" latinLnBrk="0" hangingPunct="1">
+              <a:lnSpc>
+                <a:spcPct val="90000"/>
+              </a:lnSpc>
+              <a:spcBef>
+                <a:spcPts val="500"/>
+              </a:spcBef>
+              <a:buFont typeface="Arial" panose="020B0604020202020204" pitchFamily="34" charset="0"/>
+              <a:buNone/>
+              <a:defRPr sz="1600" kern="1200">
+                <a:solidFill>
+                  <a:schemeClr val="tx1"/>
+                </a:solidFill>
+                <a:latin typeface="+mn-lt"/>
+                <a:ea typeface="+mn-ea"/>
+                <a:cs typeface="+mn-cs"/>
+              </a:defRPr>
+            </a:lvl7pPr>
+            <a:lvl8pPr marL="3200400" indent="0" algn="ctr" defTabSz="914400" rtl="0" eaLnBrk="1" latinLnBrk="0" hangingPunct="1">
+              <a:lnSpc>
+                <a:spcPct val="90000"/>
+              </a:lnSpc>
+              <a:spcBef>
+                <a:spcPts val="500"/>
+              </a:spcBef>
+              <a:buFont typeface="Arial" panose="020B0604020202020204" pitchFamily="34" charset="0"/>
+              <a:buNone/>
+              <a:defRPr sz="1600" kern="1200">
+                <a:solidFill>
+                  <a:schemeClr val="tx1"/>
+                </a:solidFill>
+                <a:latin typeface="+mn-lt"/>
+                <a:ea typeface="+mn-ea"/>
+                <a:cs typeface="+mn-cs"/>
+              </a:defRPr>
+            </a:lvl8pPr>
+            <a:lvl9pPr marL="3657600" indent="0" algn="ctr" defTabSz="914400" rtl="0" eaLnBrk="1" latinLnBrk="0" hangingPunct="1">
+              <a:lnSpc>
+                <a:spcPct val="90000"/>
+              </a:lnSpc>
+              <a:spcBef>
+                <a:spcPts val="500"/>
+              </a:spcBef>
+              <a:buFont typeface="Arial" panose="020B0604020202020204" pitchFamily="34" charset="0"/>
+              <a:buNone/>
+              <a:defRPr sz="1600" kern="1200">
+                <a:solidFill>
+                  <a:schemeClr val="tx1"/>
+                </a:solidFill>
+                <a:latin typeface="+mn-lt"/>
+                <a:ea typeface="+mn-ea"/>
+                <a:cs typeface="+mn-cs"/>
+              </a:defRPr>
+            </a:lvl9pPr>
+          </a:lstStyle>
+          <a:p>
+            <a:r>
+              <a:rPr lang="en-US" altLang="ko-Kore-KR" sz="4400" b="1" dirty="0">
+                <a:solidFill>
+                  <a:schemeClr val="accent2"/>
+                </a:solidFill>
+              </a:rPr>
+              <a:t>Function</a:t>
+            </a:r>
+            <a:endParaRPr lang="ko-Kore-KR" sz="4400" b="1" dirty="0">
+              <a:solidFill>
+                <a:schemeClr val="accent2"/>
+              </a:solidFill>
+            </a:endParaRPr>
+          </a:p>
+        </p:txBody>
+      </p:sp>
+      <p:sp>
+        <p:nvSpPr>
+          <p:cNvPr id="8" name="TextBox 7">
+            <a:extLst>
+              <a:ext uri="{FF2B5EF4-FFF2-40B4-BE49-F238E27FC236}">
+                <a16:creationId xmlns:a16="http://schemas.microsoft.com/office/drawing/2014/main" id="{7A4EC139-2C93-74A4-FC19-DF3434756593}"/>
+              </a:ext>
+            </a:extLst>
+          </p:cNvPr>
+          <p:cNvSpPr txBox="1"/>
+          <p:nvPr/>
+        </p:nvSpPr>
+        <p:spPr>
+          <a:xfrm>
+            <a:off x="2748814" y="3035342"/>
+            <a:ext cx="6909264" cy="584775"/>
+          </a:xfrm>
+          <a:prstGeom prst="rect">
+            <a:avLst/>
+          </a:prstGeom>
+          <a:noFill/>
+        </p:spPr>
+        <p:txBody>
+          <a:bodyPr wrap="none" rtlCol="0">
+            <a:spAutoFit/>
+          </a:bodyPr>
+          <a:lstStyle/>
+          <a:p>
+            <a:r>
+              <a:rPr kumimoji="1" lang="ko-Kore-KR" altLang="en-US" sz="3200" dirty="0"/>
+              <a:t>코드를</a:t>
+            </a:r>
+            <a:r>
+              <a:rPr kumimoji="1" lang="ko-KR" altLang="en-US" sz="3200" dirty="0"/>
+              <a:t> 격리 해 유지보수를 쉽게 한다</a:t>
+            </a:r>
+            <a:r>
+              <a:rPr kumimoji="1" lang="en-US" altLang="ko-KR" sz="3200" dirty="0"/>
+              <a:t>.</a:t>
+            </a:r>
+            <a:endParaRPr kumimoji="1" lang="ko-Kore-KR" altLang="en-US" sz="3200" dirty="0"/>
+          </a:p>
+        </p:txBody>
+      </p:sp>
+    </p:spTree>
+    <p:extLst>
+      <p:ext uri="{BB962C8B-B14F-4D97-AF65-F5344CB8AC3E}">
+        <p14:creationId xmlns:p14="http://schemas.microsoft.com/office/powerpoint/2010/main" val="2212425453"/>
+      </p:ext>
+    </p:extLst>
+  </p:cSld>
+  <p:clrMapOvr>
+    <a:masterClrMapping/>
+  </p:clrMapOvr>
+</p:sld>
+</file>
+
+<file path=ppt/slides/slide11.xml><?xml version="1.0" encoding="utf-8"?>
+<p:sld xmlns:a="http://schemas.openxmlformats.org/drawingml/2006/main" xmlns:r="http://schemas.openxmlformats.org/officeDocument/2006/relationships" xmlns:p="http://schemas.openxmlformats.org/presentationml/2006/main">
+  <p:cSld>
+    <p:spTree>
+      <p:nvGrpSpPr>
+        <p:cNvPr id="1" name=""/>
+        <p:cNvGrpSpPr/>
+        <p:nvPr/>
+      </p:nvGrpSpPr>
+      <p:grpSpPr>
+        <a:xfrm>
+          <a:off x="0" y="0"/>
+          <a:ext cx="0" cy="0"/>
+          <a:chOff x="0" y="0"/>
+          <a:chExt cx="0" cy="0"/>
+        </a:xfrm>
+      </p:grpSpPr>
+      <p:sp>
+        <p:nvSpPr>
+          <p:cNvPr id="7" name="직사각형 6">
+            <a:extLst>
+              <a:ext uri="{FF2B5EF4-FFF2-40B4-BE49-F238E27FC236}">
+                <a16:creationId xmlns:a16="http://schemas.microsoft.com/office/drawing/2014/main" id="{281491D1-B6E8-3BFB-42CF-945A32013856}"/>
+              </a:ext>
+            </a:extLst>
+          </p:cNvPr>
+          <p:cNvSpPr/>
+          <p:nvPr/>
+        </p:nvSpPr>
+        <p:spPr>
+          <a:xfrm>
+            <a:off x="-30480" y="6461759"/>
+            <a:ext cx="12240000" cy="454047"/>
+          </a:xfrm>
+          <a:prstGeom prst="rect">
+            <a:avLst/>
+          </a:prstGeom>
+          <a:solidFill>
+            <a:schemeClr val="accent1">
+              <a:alpha val="34949"/>
+            </a:schemeClr>
+          </a:solidFill>
+          <a:ln>
+            <a:noFill/>
+          </a:ln>
+        </p:spPr>
+        <p:style>
+          <a:lnRef idx="2">
+            <a:schemeClr val="accent1">
+              <a:shade val="15000"/>
+            </a:schemeClr>
+          </a:lnRef>
+          <a:fillRef idx="1">
+            <a:schemeClr val="accent1"/>
+          </a:fillRef>
+          <a:effectRef idx="0">
+            <a:schemeClr val="accent1"/>
+          </a:effectRef>
+          <a:fontRef idx="minor">
+            <a:schemeClr val="lt1"/>
+          </a:fontRef>
+        </p:style>
+        <p:txBody>
+          <a:bodyPr rtlCol="0" anchor="ctr"/>
+          <a:lstStyle/>
+          <a:p>
+            <a:pPr algn="ctr"/>
+            <a:endParaRPr kumimoji="1" lang="ko-Kore-KR" altLang="en-US" dirty="0"/>
+          </a:p>
+        </p:txBody>
+      </p:sp>
+      <p:sp>
+        <p:nvSpPr>
+          <p:cNvPr id="2" name="제목 1">
+            <a:extLst>
+              <a:ext uri="{FF2B5EF4-FFF2-40B4-BE49-F238E27FC236}">
+                <a16:creationId xmlns:a16="http://schemas.microsoft.com/office/drawing/2014/main" id="{5B025642-B38D-A74A-8F24-F7D52B9A84CE}"/>
+              </a:ext>
+            </a:extLst>
+          </p:cNvPr>
+          <p:cNvSpPr>
+            <a:spLocks noGrp="1"/>
+          </p:cNvSpPr>
+          <p:nvPr>
+            <p:ph type="ctrTitle"/>
+          </p:nvPr>
+        </p:nvSpPr>
+        <p:spPr>
+          <a:xfrm>
+            <a:off x="-332127" y="6792119"/>
+            <a:ext cx="3941379" cy="131762"/>
+          </a:xfrm>
+        </p:spPr>
+        <p:txBody>
+          <a:bodyPr>
+            <a:noAutofit/>
+          </a:bodyPr>
+          <a:lstStyle/>
+          <a:p>
+            <a:r>
+              <a:rPr lang="en-US" altLang="ko-Kore-KR" sz="2000" dirty="0" err="1">
+                <a:solidFill>
+                  <a:srgbClr val="7030A0"/>
+                </a:solidFill>
+              </a:rPr>
+              <a:t>SangMyeong</a:t>
+            </a:r>
+            <a:r>
+              <a:rPr lang="en-US" altLang="ko-Kore-KR" sz="2000" dirty="0">
+                <a:solidFill>
+                  <a:srgbClr val="7030A0"/>
+                </a:solidFill>
+              </a:rPr>
+              <a:t> Coding Education</a:t>
+            </a:r>
+            <a:endParaRPr lang="ko-Kore-KR" sz="2000" dirty="0">
+              <a:solidFill>
+                <a:srgbClr val="7030A0"/>
+              </a:solidFill>
+            </a:endParaRPr>
+          </a:p>
+        </p:txBody>
+      </p:sp>
+      <p:sp>
+        <p:nvSpPr>
+          <p:cNvPr id="3" name="부제목 2">
+            <a:extLst>
+              <a:ext uri="{FF2B5EF4-FFF2-40B4-BE49-F238E27FC236}">
+                <a16:creationId xmlns:a16="http://schemas.microsoft.com/office/drawing/2014/main" id="{F05A16A8-C921-DD4F-8509-1F06F45DEDD3}"/>
+              </a:ext>
+            </a:extLst>
+          </p:cNvPr>
+          <p:cNvSpPr>
+            <a:spLocks noGrp="1"/>
+          </p:cNvSpPr>
+          <p:nvPr>
+            <p:ph type="subTitle" idx="1"/>
+          </p:nvPr>
+        </p:nvSpPr>
+        <p:spPr>
+          <a:xfrm>
+            <a:off x="4743318" y="6512447"/>
+            <a:ext cx="2827283" cy="467903"/>
+          </a:xfrm>
+        </p:spPr>
+        <p:txBody>
+          <a:bodyPr>
+            <a:normAutofit/>
+          </a:bodyPr>
+          <a:lstStyle/>
+          <a:p>
+            <a:r>
+              <a:rPr lang="en-US" altLang="ko-KR" dirty="0"/>
+              <a:t>Function</a:t>
+            </a:r>
+            <a:endParaRPr lang="ko-Kore-KR" altLang="ko-Kore-KR" dirty="0"/>
+          </a:p>
+        </p:txBody>
+      </p:sp>
+      <p:sp>
+        <p:nvSpPr>
+          <p:cNvPr id="4" name="제목 1">
+            <a:extLst>
+              <a:ext uri="{FF2B5EF4-FFF2-40B4-BE49-F238E27FC236}">
+                <a16:creationId xmlns:a16="http://schemas.microsoft.com/office/drawing/2014/main" id="{AAA94350-F7A7-7F4D-9274-C4E68FEFACC2}"/>
+              </a:ext>
+            </a:extLst>
+          </p:cNvPr>
+          <p:cNvSpPr txBox="1">
+            <a:spLocks/>
+          </p:cNvSpPr>
+          <p:nvPr/>
+        </p:nvSpPr>
+        <p:spPr>
+          <a:xfrm>
+            <a:off x="11216640" y="6858000"/>
+            <a:ext cx="1069954" cy="57807"/>
+          </a:xfrm>
+          <a:prstGeom prst="rect">
+            <a:avLst/>
+          </a:prstGeom>
+        </p:spPr>
+        <p:txBody>
+          <a:bodyPr vert="horz" lIns="91440" tIns="45720" rIns="91440" bIns="45720" rtlCol="0" anchor="b">
+            <a:noAutofit/>
+          </a:bodyPr>
+          <a:lstStyle>
+            <a:lvl1pPr algn="ctr" defTabSz="914400" rtl="0" eaLnBrk="1" latinLnBrk="0" hangingPunct="1">
+              <a:lnSpc>
+                <a:spcPct val="90000"/>
+              </a:lnSpc>
+              <a:spcBef>
+                <a:spcPct val="0"/>
+              </a:spcBef>
+              <a:buNone/>
+              <a:defRPr sz="6000" kern="1200">
+                <a:solidFill>
+                  <a:schemeClr val="tx1"/>
+                </a:solidFill>
+                <a:latin typeface="+mj-lt"/>
+                <a:ea typeface="+mj-ea"/>
+                <a:cs typeface="+mj-cs"/>
+              </a:defRPr>
+            </a:lvl1pPr>
+          </a:lstStyle>
+          <a:p>
+            <a:r>
+              <a:rPr lang="en-US" sz="2400" dirty="0">
+                <a:solidFill>
+                  <a:srgbClr val="00B050"/>
+                </a:solidFill>
+              </a:rPr>
+              <a:t>week 4</a:t>
+            </a:r>
+            <a:endParaRPr lang="ko-Kore-KR" sz="2400" dirty="0">
+              <a:solidFill>
+                <a:srgbClr val="00B050"/>
+              </a:solidFill>
+            </a:endParaRPr>
+          </a:p>
+        </p:txBody>
+      </p:sp>
+      <p:sp>
+        <p:nvSpPr>
+          <p:cNvPr id="9" name="부제목 2">
+            <a:extLst>
+              <a:ext uri="{FF2B5EF4-FFF2-40B4-BE49-F238E27FC236}">
+                <a16:creationId xmlns:a16="http://schemas.microsoft.com/office/drawing/2014/main" id="{618387EB-79C7-B848-8C39-392B62BF4926}"/>
+              </a:ext>
+            </a:extLst>
+          </p:cNvPr>
+          <p:cNvSpPr txBox="1">
+            <a:spLocks/>
+          </p:cNvSpPr>
+          <p:nvPr/>
+        </p:nvSpPr>
+        <p:spPr>
+          <a:xfrm>
             <a:off x="-332127" y="0"/>
             <a:ext cx="4899041" cy="778476"/>
           </a:xfrm>
@@ -4525,7 +5014,7 @@
 </p:sld>
 </file>
 
-<file path=ppt/slides/slide11.xml><?xml version="1.0" encoding="utf-8"?>
+<file path=ppt/slides/slide12.xml><?xml version="1.0" encoding="utf-8"?>
 <p:sld xmlns:a="http://schemas.openxmlformats.org/drawingml/2006/main" xmlns:r="http://schemas.openxmlformats.org/officeDocument/2006/relationships" xmlns:p="http://schemas.openxmlformats.org/presentationml/2006/main">
   <p:cSld>
     <p:spTree>
@@ -5250,6 +5739,61 @@
           </a:p>
         </p:txBody>
       </p:sp>
+      <p:sp>
+        <p:nvSpPr>
+          <p:cNvPr id="13" name="수동 작업 12">
+            <a:extLst>
+              <a:ext uri="{FF2B5EF4-FFF2-40B4-BE49-F238E27FC236}">
+                <a16:creationId xmlns:a16="http://schemas.microsoft.com/office/drawing/2014/main" id="{90D94DD2-ADF1-5BCE-012D-C0B94D369CEA}"/>
+              </a:ext>
+            </a:extLst>
+          </p:cNvPr>
+          <p:cNvSpPr/>
+          <p:nvPr/>
+        </p:nvSpPr>
+        <p:spPr>
+          <a:xfrm rot="10800000">
+            <a:off x="6674559" y="3889898"/>
+            <a:ext cx="1181100" cy="910590"/>
+          </a:xfrm>
+          <a:prstGeom prst="flowChartManualOperation">
+            <a:avLst/>
+          </a:prstGeom>
+          <a:solidFill>
+            <a:schemeClr val="accent2">
+              <a:lumMod val="40000"/>
+              <a:lumOff val="60000"/>
+            </a:schemeClr>
+          </a:solidFill>
+          <a:ln>
+            <a:noFill/>
+          </a:ln>
+        </p:spPr>
+        <p:style>
+          <a:lnRef idx="2">
+            <a:schemeClr val="accent1">
+              <a:shade val="15000"/>
+            </a:schemeClr>
+          </a:lnRef>
+          <a:fillRef idx="1">
+            <a:schemeClr val="accent1"/>
+          </a:fillRef>
+          <a:effectRef idx="0">
+            <a:schemeClr val="accent1"/>
+          </a:effectRef>
+          <a:fontRef idx="minor">
+            <a:schemeClr val="lt1"/>
+          </a:fontRef>
+        </p:style>
+        <p:txBody>
+          <a:bodyPr rtlCol="0" anchor="ctr"/>
+          <a:lstStyle/>
+          <a:p>
+            <a:pPr algn="ctr"/>
+            <a:endParaRPr kumimoji="1" lang="ko-Kore-KR" altLang="en-US"/>
+          </a:p>
+        </p:txBody>
+      </p:sp>
     </p:spTree>
     <p:extLst>
       <p:ext uri="{BB962C8B-B14F-4D97-AF65-F5344CB8AC3E}">
@@ -5263,7 +5807,7 @@
 </p:sld>
 </file>
 
-<file path=ppt/slides/slide12.xml><?xml version="1.0" encoding="utf-8"?>
+<file path=ppt/slides/slide13.xml><?xml version="1.0" encoding="utf-8"?>
 <p:sld xmlns:a="http://schemas.openxmlformats.org/drawingml/2006/main" xmlns:r="http://schemas.openxmlformats.org/officeDocument/2006/relationships" xmlns:p="http://schemas.openxmlformats.org/presentationml/2006/main">
   <p:cSld>
     <p:spTree>
@@ -5501,6 +6045,555 @@
         </p:nvSpPr>
         <p:spPr>
           <a:xfrm>
+            <a:off x="-1289789" y="0"/>
+            <a:ext cx="4899041" cy="778476"/>
+          </a:xfrm>
+          <a:prstGeom prst="rect">
+            <a:avLst/>
+          </a:prstGeom>
+        </p:spPr>
+        <p:txBody>
+          <a:bodyPr vert="horz" lIns="91440" tIns="45720" rIns="91440" bIns="45720" rtlCol="0">
+            <a:normAutofit/>
+          </a:bodyPr>
+          <a:lstStyle>
+            <a:lvl1pPr marL="0" indent="0" algn="ctr" defTabSz="914400" rtl="0" eaLnBrk="1" latinLnBrk="0" hangingPunct="1">
+              <a:lnSpc>
+                <a:spcPct val="90000"/>
+              </a:lnSpc>
+              <a:spcBef>
+                <a:spcPts val="1000"/>
+              </a:spcBef>
+              <a:buFont typeface="Arial" panose="020B0604020202020204" pitchFamily="34" charset="0"/>
+              <a:buNone/>
+              <a:defRPr sz="2400" kern="1200">
+                <a:solidFill>
+                  <a:schemeClr val="tx1"/>
+                </a:solidFill>
+                <a:latin typeface="+mn-lt"/>
+                <a:ea typeface="+mn-ea"/>
+                <a:cs typeface="+mn-cs"/>
+              </a:defRPr>
+            </a:lvl1pPr>
+            <a:lvl2pPr marL="457200" indent="0" algn="ctr" defTabSz="914400" rtl="0" eaLnBrk="1" latinLnBrk="0" hangingPunct="1">
+              <a:lnSpc>
+                <a:spcPct val="90000"/>
+              </a:lnSpc>
+              <a:spcBef>
+                <a:spcPts val="500"/>
+              </a:spcBef>
+              <a:buFont typeface="Arial" panose="020B0604020202020204" pitchFamily="34" charset="0"/>
+              <a:buNone/>
+              <a:defRPr sz="2000" kern="1200">
+                <a:solidFill>
+                  <a:schemeClr val="tx1"/>
+                </a:solidFill>
+                <a:latin typeface="+mn-lt"/>
+                <a:ea typeface="+mn-ea"/>
+                <a:cs typeface="+mn-cs"/>
+              </a:defRPr>
+            </a:lvl2pPr>
+            <a:lvl3pPr marL="914400" indent="0" algn="ctr" defTabSz="914400" rtl="0" eaLnBrk="1" latinLnBrk="0" hangingPunct="1">
+              <a:lnSpc>
+                <a:spcPct val="90000"/>
+              </a:lnSpc>
+              <a:spcBef>
+                <a:spcPts val="500"/>
+              </a:spcBef>
+              <a:buFont typeface="Arial" panose="020B0604020202020204" pitchFamily="34" charset="0"/>
+              <a:buNone/>
+              <a:defRPr sz="1800" kern="1200">
+                <a:solidFill>
+                  <a:schemeClr val="tx1"/>
+                </a:solidFill>
+                <a:latin typeface="+mn-lt"/>
+                <a:ea typeface="+mn-ea"/>
+                <a:cs typeface="+mn-cs"/>
+              </a:defRPr>
+            </a:lvl3pPr>
+            <a:lvl4pPr marL="1371600" indent="0" algn="ctr" defTabSz="914400" rtl="0" eaLnBrk="1" latinLnBrk="0" hangingPunct="1">
+              <a:lnSpc>
+                <a:spcPct val="90000"/>
+              </a:lnSpc>
+              <a:spcBef>
+                <a:spcPts val="500"/>
+              </a:spcBef>
+              <a:buFont typeface="Arial" panose="020B0604020202020204" pitchFamily="34" charset="0"/>
+              <a:buNone/>
+              <a:defRPr sz="1600" kern="1200">
+                <a:solidFill>
+                  <a:schemeClr val="tx1"/>
+                </a:solidFill>
+                <a:latin typeface="+mn-lt"/>
+                <a:ea typeface="+mn-ea"/>
+                <a:cs typeface="+mn-cs"/>
+              </a:defRPr>
+            </a:lvl4pPr>
+            <a:lvl5pPr marL="1828800" indent="0" algn="ctr" defTabSz="914400" rtl="0" eaLnBrk="1" latinLnBrk="0" hangingPunct="1">
+              <a:lnSpc>
+                <a:spcPct val="90000"/>
+              </a:lnSpc>
+              <a:spcBef>
+                <a:spcPts val="500"/>
+              </a:spcBef>
+              <a:buFont typeface="Arial" panose="020B0604020202020204" pitchFamily="34" charset="0"/>
+              <a:buNone/>
+              <a:defRPr sz="1600" kern="1200">
+                <a:solidFill>
+                  <a:schemeClr val="tx1"/>
+                </a:solidFill>
+                <a:latin typeface="+mn-lt"/>
+                <a:ea typeface="+mn-ea"/>
+                <a:cs typeface="+mn-cs"/>
+              </a:defRPr>
+            </a:lvl5pPr>
+            <a:lvl6pPr marL="2286000" indent="0" algn="ctr" defTabSz="914400" rtl="0" eaLnBrk="1" latinLnBrk="0" hangingPunct="1">
+              <a:lnSpc>
+                <a:spcPct val="90000"/>
+              </a:lnSpc>
+              <a:spcBef>
+                <a:spcPts val="500"/>
+              </a:spcBef>
+              <a:buFont typeface="Arial" panose="020B0604020202020204" pitchFamily="34" charset="0"/>
+              <a:buNone/>
+              <a:defRPr sz="1600" kern="1200">
+                <a:solidFill>
+                  <a:schemeClr val="tx1"/>
+                </a:solidFill>
+                <a:latin typeface="+mn-lt"/>
+                <a:ea typeface="+mn-ea"/>
+                <a:cs typeface="+mn-cs"/>
+              </a:defRPr>
+            </a:lvl6pPr>
+            <a:lvl7pPr marL="2743200" indent="0" algn="ctr" defTabSz="914400" rtl="0" eaLnBrk="1" latinLnBrk="0" hangingPunct="1">
+              <a:lnSpc>
+                <a:spcPct val="90000"/>
+              </a:lnSpc>
+              <a:spcBef>
+                <a:spcPts val="500"/>
+              </a:spcBef>
+              <a:buFont typeface="Arial" panose="020B0604020202020204" pitchFamily="34" charset="0"/>
+              <a:buNone/>
+              <a:defRPr sz="1600" kern="1200">
+                <a:solidFill>
+                  <a:schemeClr val="tx1"/>
+                </a:solidFill>
+                <a:latin typeface="+mn-lt"/>
+                <a:ea typeface="+mn-ea"/>
+                <a:cs typeface="+mn-cs"/>
+              </a:defRPr>
+            </a:lvl7pPr>
+            <a:lvl8pPr marL="3200400" indent="0" algn="ctr" defTabSz="914400" rtl="0" eaLnBrk="1" latinLnBrk="0" hangingPunct="1">
+              <a:lnSpc>
+                <a:spcPct val="90000"/>
+              </a:lnSpc>
+              <a:spcBef>
+                <a:spcPts val="500"/>
+              </a:spcBef>
+              <a:buFont typeface="Arial" panose="020B0604020202020204" pitchFamily="34" charset="0"/>
+              <a:buNone/>
+              <a:defRPr sz="1600" kern="1200">
+                <a:solidFill>
+                  <a:schemeClr val="tx1"/>
+                </a:solidFill>
+                <a:latin typeface="+mn-lt"/>
+                <a:ea typeface="+mn-ea"/>
+                <a:cs typeface="+mn-cs"/>
+              </a:defRPr>
+            </a:lvl8pPr>
+            <a:lvl9pPr marL="3657600" indent="0" algn="ctr" defTabSz="914400" rtl="0" eaLnBrk="1" latinLnBrk="0" hangingPunct="1">
+              <a:lnSpc>
+                <a:spcPct val="90000"/>
+              </a:lnSpc>
+              <a:spcBef>
+                <a:spcPts val="500"/>
+              </a:spcBef>
+              <a:buFont typeface="Arial" panose="020B0604020202020204" pitchFamily="34" charset="0"/>
+              <a:buNone/>
+              <a:defRPr sz="1600" kern="1200">
+                <a:solidFill>
+                  <a:schemeClr val="tx1"/>
+                </a:solidFill>
+                <a:latin typeface="+mn-lt"/>
+                <a:ea typeface="+mn-ea"/>
+                <a:cs typeface="+mn-cs"/>
+              </a:defRPr>
+            </a:lvl9pPr>
+          </a:lstStyle>
+          <a:p>
+            <a:r>
+              <a:rPr lang="en-US" altLang="ko-Kore-KR" sz="4400" b="1" dirty="0">
+                <a:solidFill>
+                  <a:schemeClr val="accent2"/>
+                </a:solidFill>
+              </a:rPr>
+              <a:t>Function</a:t>
+            </a:r>
+            <a:endParaRPr lang="ko-Kore-KR" sz="4400" b="1" dirty="0">
+              <a:solidFill>
+                <a:schemeClr val="accent2"/>
+              </a:solidFill>
+            </a:endParaRPr>
+          </a:p>
+        </p:txBody>
+      </p:sp>
+      <p:pic>
+        <p:nvPicPr>
+          <p:cNvPr id="16" name="Picture 2" descr="문구점뽑기 한국동전 가챠 뽑기기계 통 캡슐 미니 : 롯데ON">
+            <a:extLst>
+              <a:ext uri="{FF2B5EF4-FFF2-40B4-BE49-F238E27FC236}">
+                <a16:creationId xmlns:a16="http://schemas.microsoft.com/office/drawing/2014/main" id="{54CF12D1-0293-3018-A209-92CC8AA7B0AD}"/>
+              </a:ext>
+            </a:extLst>
+          </p:cNvPr>
+          <p:cNvPicPr>
+            <a:picLocks noChangeAspect="1" noChangeArrowheads="1"/>
+          </p:cNvPicPr>
+          <p:nvPr/>
+        </p:nvPicPr>
+        <p:blipFill>
+          <a:blip r:embed="rId2">
+            <a:extLst>
+              <a:ext uri="{28A0092B-C50C-407E-A947-70E740481C1C}">
+                <a14:useLocalDpi xmlns:a14="http://schemas.microsoft.com/office/drawing/2010/main" val="0"/>
+              </a:ext>
+            </a:extLst>
+          </a:blip>
+          <a:srcRect/>
+          <a:stretch>
+            <a:fillRect/>
+          </a:stretch>
+        </p:blipFill>
+        <p:spPr bwMode="auto">
+          <a:xfrm>
+            <a:off x="3782142" y="932713"/>
+            <a:ext cx="4403391" cy="4403391"/>
+          </a:xfrm>
+          <a:prstGeom prst="rect">
+            <a:avLst/>
+          </a:prstGeom>
+          <a:noFill/>
+          <a:extLst>
+            <a:ext uri="{909E8E84-426E-40DD-AFC4-6F175D3DCCD1}">
+              <a14:hiddenFill xmlns:a14="http://schemas.microsoft.com/office/drawing/2010/main">
+                <a:solidFill>
+                  <a:srgbClr val="FFFFFF"/>
+                </a:solidFill>
+              </a14:hiddenFill>
+            </a:ext>
+          </a:extLst>
+        </p:spPr>
+      </p:pic>
+      <p:sp>
+        <p:nvSpPr>
+          <p:cNvPr id="5" name="액자 4">
+            <a:extLst>
+              <a:ext uri="{FF2B5EF4-FFF2-40B4-BE49-F238E27FC236}">
+                <a16:creationId xmlns:a16="http://schemas.microsoft.com/office/drawing/2014/main" id="{7EC457C1-0C08-807A-7070-83559C347E7F}"/>
+              </a:ext>
+            </a:extLst>
+          </p:cNvPr>
+          <p:cNvSpPr/>
+          <p:nvPr/>
+        </p:nvSpPr>
+        <p:spPr>
+          <a:xfrm>
+            <a:off x="5780390" y="3939190"/>
+            <a:ext cx="1689046" cy="1510442"/>
+          </a:xfrm>
+          <a:prstGeom prst="frame">
+            <a:avLst/>
+          </a:prstGeom>
+          <a:solidFill>
+            <a:srgbClr val="C00000"/>
+          </a:solidFill>
+          <a:ln>
+            <a:noFill/>
+          </a:ln>
+          <a:effectLst>
+            <a:softEdge rad="12700"/>
+          </a:effectLst>
+        </p:spPr>
+        <p:style>
+          <a:lnRef idx="2">
+            <a:schemeClr val="accent1">
+              <a:shade val="15000"/>
+            </a:schemeClr>
+          </a:lnRef>
+          <a:fillRef idx="1">
+            <a:schemeClr val="accent1"/>
+          </a:fillRef>
+          <a:effectRef idx="0">
+            <a:schemeClr val="accent1"/>
+          </a:effectRef>
+          <a:fontRef idx="minor">
+            <a:schemeClr val="lt1"/>
+          </a:fontRef>
+        </p:style>
+        <p:txBody>
+          <a:bodyPr rtlCol="0" anchor="ctr"/>
+          <a:lstStyle/>
+          <a:p>
+            <a:pPr algn="ctr"/>
+            <a:endParaRPr kumimoji="1" lang="ko-Kore-KR" altLang="en-US">
+              <a:solidFill>
+                <a:schemeClr val="tx1"/>
+              </a:solidFill>
+            </a:endParaRPr>
+          </a:p>
+        </p:txBody>
+      </p:sp>
+    </p:spTree>
+    <p:extLst>
+      <p:ext uri="{BB962C8B-B14F-4D97-AF65-F5344CB8AC3E}">
+        <p14:creationId xmlns:p14="http://schemas.microsoft.com/office/powerpoint/2010/main" val="2210947243"/>
+      </p:ext>
+    </p:extLst>
+  </p:cSld>
+  <p:clrMapOvr>
+    <a:masterClrMapping/>
+  </p:clrMapOvr>
+</p:sld>
+</file>
+
+<file path=ppt/slides/slide14.xml><?xml version="1.0" encoding="utf-8"?>
+<p:sld xmlns:a="http://schemas.openxmlformats.org/drawingml/2006/main" xmlns:r="http://schemas.openxmlformats.org/officeDocument/2006/relationships" xmlns:p="http://schemas.openxmlformats.org/presentationml/2006/main">
+  <p:cSld>
+    <p:spTree>
+      <p:nvGrpSpPr>
+        <p:cNvPr id="1" name=""/>
+        <p:cNvGrpSpPr/>
+        <p:nvPr/>
+      </p:nvGrpSpPr>
+      <p:grpSpPr>
+        <a:xfrm>
+          <a:off x="0" y="0"/>
+          <a:ext cx="0" cy="0"/>
+          <a:chOff x="0" y="0"/>
+          <a:chExt cx="0" cy="0"/>
+        </a:xfrm>
+      </p:grpSpPr>
+      <p:sp>
+        <p:nvSpPr>
+          <p:cNvPr id="7" name="직사각형 6">
+            <a:extLst>
+              <a:ext uri="{FF2B5EF4-FFF2-40B4-BE49-F238E27FC236}">
+                <a16:creationId xmlns:a16="http://schemas.microsoft.com/office/drawing/2014/main" id="{281491D1-B6E8-3BFB-42CF-945A32013856}"/>
+              </a:ext>
+            </a:extLst>
+          </p:cNvPr>
+          <p:cNvSpPr/>
+          <p:nvPr/>
+        </p:nvSpPr>
+        <p:spPr>
+          <a:xfrm>
+            <a:off x="-30480" y="6461759"/>
+            <a:ext cx="12240000" cy="454047"/>
+          </a:xfrm>
+          <a:prstGeom prst="rect">
+            <a:avLst/>
+          </a:prstGeom>
+          <a:solidFill>
+            <a:schemeClr val="accent1">
+              <a:alpha val="34949"/>
+            </a:schemeClr>
+          </a:solidFill>
+          <a:ln>
+            <a:noFill/>
+          </a:ln>
+        </p:spPr>
+        <p:style>
+          <a:lnRef idx="2">
+            <a:schemeClr val="accent1">
+              <a:shade val="15000"/>
+            </a:schemeClr>
+          </a:lnRef>
+          <a:fillRef idx="1">
+            <a:schemeClr val="accent1"/>
+          </a:fillRef>
+          <a:effectRef idx="0">
+            <a:schemeClr val="accent1"/>
+          </a:effectRef>
+          <a:fontRef idx="minor">
+            <a:schemeClr val="lt1"/>
+          </a:fontRef>
+        </p:style>
+        <p:txBody>
+          <a:bodyPr rtlCol="0" anchor="ctr"/>
+          <a:lstStyle/>
+          <a:p>
+            <a:pPr algn="ctr"/>
+            <a:endParaRPr kumimoji="1" lang="ko-Kore-KR" altLang="en-US" dirty="0"/>
+          </a:p>
+        </p:txBody>
+      </p:sp>
+      <p:sp>
+        <p:nvSpPr>
+          <p:cNvPr id="2" name="제목 1">
+            <a:extLst>
+              <a:ext uri="{FF2B5EF4-FFF2-40B4-BE49-F238E27FC236}">
+                <a16:creationId xmlns:a16="http://schemas.microsoft.com/office/drawing/2014/main" id="{5B025642-B38D-A74A-8F24-F7D52B9A84CE}"/>
+              </a:ext>
+            </a:extLst>
+          </p:cNvPr>
+          <p:cNvSpPr>
+            <a:spLocks noGrp="1"/>
+          </p:cNvSpPr>
+          <p:nvPr>
+            <p:ph type="ctrTitle"/>
+          </p:nvPr>
+        </p:nvSpPr>
+        <p:spPr>
+          <a:xfrm>
+            <a:off x="-332127" y="6792119"/>
+            <a:ext cx="3941379" cy="131762"/>
+          </a:xfrm>
+        </p:spPr>
+        <p:txBody>
+          <a:bodyPr>
+            <a:noAutofit/>
+          </a:bodyPr>
+          <a:lstStyle/>
+          <a:p>
+            <a:r>
+              <a:rPr lang="en-US" altLang="ko-Kore-KR" sz="2000" dirty="0" err="1">
+                <a:solidFill>
+                  <a:srgbClr val="7030A0"/>
+                </a:solidFill>
+              </a:rPr>
+              <a:t>SangMyeong</a:t>
+            </a:r>
+            <a:r>
+              <a:rPr lang="en-US" altLang="ko-Kore-KR" sz="2000" dirty="0">
+                <a:solidFill>
+                  <a:srgbClr val="7030A0"/>
+                </a:solidFill>
+              </a:rPr>
+              <a:t> Coding Education</a:t>
+            </a:r>
+            <a:endParaRPr lang="ko-Kore-KR" sz="2000" dirty="0">
+              <a:solidFill>
+                <a:srgbClr val="7030A0"/>
+              </a:solidFill>
+            </a:endParaRPr>
+          </a:p>
+        </p:txBody>
+      </p:sp>
+      <p:sp>
+        <p:nvSpPr>
+          <p:cNvPr id="3" name="부제목 2">
+            <a:extLst>
+              <a:ext uri="{FF2B5EF4-FFF2-40B4-BE49-F238E27FC236}">
+                <a16:creationId xmlns:a16="http://schemas.microsoft.com/office/drawing/2014/main" id="{F05A16A8-C921-DD4F-8509-1F06F45DEDD3}"/>
+              </a:ext>
+            </a:extLst>
+          </p:cNvPr>
+          <p:cNvSpPr>
+            <a:spLocks noGrp="1"/>
+          </p:cNvSpPr>
+          <p:nvPr>
+            <p:ph type="subTitle" idx="1"/>
+          </p:nvPr>
+        </p:nvSpPr>
+        <p:spPr>
+          <a:xfrm>
+            <a:off x="4743318" y="6512447"/>
+            <a:ext cx="2827283" cy="467903"/>
+          </a:xfrm>
+        </p:spPr>
+        <p:txBody>
+          <a:bodyPr>
+            <a:normAutofit/>
+          </a:bodyPr>
+          <a:lstStyle/>
+          <a:p>
+            <a:r>
+              <a:rPr lang="en-US" altLang="ko-KR" dirty="0"/>
+              <a:t>Function</a:t>
+            </a:r>
+            <a:endParaRPr lang="ko-Kore-KR" altLang="ko-Kore-KR" dirty="0"/>
+          </a:p>
+        </p:txBody>
+      </p:sp>
+      <p:sp>
+        <p:nvSpPr>
+          <p:cNvPr id="4" name="제목 1">
+            <a:extLst>
+              <a:ext uri="{FF2B5EF4-FFF2-40B4-BE49-F238E27FC236}">
+                <a16:creationId xmlns:a16="http://schemas.microsoft.com/office/drawing/2014/main" id="{AAA94350-F7A7-7F4D-9274-C4E68FEFACC2}"/>
+              </a:ext>
+            </a:extLst>
+          </p:cNvPr>
+          <p:cNvSpPr txBox="1">
+            <a:spLocks/>
+          </p:cNvSpPr>
+          <p:nvPr/>
+        </p:nvSpPr>
+        <p:spPr>
+          <a:xfrm>
+            <a:off x="11216640" y="6858000"/>
+            <a:ext cx="1069954" cy="57807"/>
+          </a:xfrm>
+          <a:prstGeom prst="rect">
+            <a:avLst/>
+          </a:prstGeom>
+        </p:spPr>
+        <p:txBody>
+          <a:bodyPr vert="horz" lIns="91440" tIns="45720" rIns="91440" bIns="45720" rtlCol="0" anchor="b">
+            <a:noAutofit/>
+          </a:bodyPr>
+          <a:lstStyle>
+            <a:lvl1pPr algn="ctr" defTabSz="914400" rtl="0" eaLnBrk="1" latinLnBrk="0" hangingPunct="1">
+              <a:lnSpc>
+                <a:spcPct val="90000"/>
+              </a:lnSpc>
+              <a:spcBef>
+                <a:spcPct val="0"/>
+              </a:spcBef>
+              <a:buNone/>
+              <a:defRPr sz="6000" kern="1200">
+                <a:solidFill>
+                  <a:schemeClr val="tx1"/>
+                </a:solidFill>
+                <a:latin typeface="+mj-lt"/>
+                <a:ea typeface="+mj-ea"/>
+                <a:cs typeface="+mj-cs"/>
+              </a:defRPr>
+            </a:lvl1pPr>
+          </a:lstStyle>
+          <a:p>
+            <a:r>
+              <a:rPr lang="en-US" sz="2400" dirty="0">
+                <a:solidFill>
+                  <a:srgbClr val="00B050"/>
+                </a:solidFill>
+              </a:rPr>
+              <a:t>week 4</a:t>
+            </a:r>
+            <a:endParaRPr lang="ko-Kore-KR" sz="2400" dirty="0">
+              <a:solidFill>
+                <a:srgbClr val="00B050"/>
+              </a:solidFill>
+            </a:endParaRPr>
+          </a:p>
+        </p:txBody>
+      </p:sp>
+      <p:sp>
+        <p:nvSpPr>
+          <p:cNvPr id="9" name="부제목 2">
+            <a:extLst>
+              <a:ext uri="{FF2B5EF4-FFF2-40B4-BE49-F238E27FC236}">
+                <a16:creationId xmlns:a16="http://schemas.microsoft.com/office/drawing/2014/main" id="{618387EB-79C7-B848-8C39-392B62BF4926}"/>
+              </a:ext>
+            </a:extLst>
+          </p:cNvPr>
+          <p:cNvSpPr txBox="1">
+            <a:spLocks/>
+          </p:cNvSpPr>
+          <p:nvPr/>
+        </p:nvSpPr>
+        <p:spPr>
+          <a:xfrm>
             <a:off x="-810959" y="0"/>
             <a:ext cx="4899041" cy="778476"/>
           </a:xfrm>
@@ -6004,7 +7097,7 @@
 </p:sld>
 </file>
 
-<file path=ppt/slides/slide13.xml><?xml version="1.0" encoding="utf-8"?>
+<file path=ppt/slides/slide15.xml><?xml version="1.0" encoding="utf-8"?>
 <p:sld xmlns:a="http://schemas.openxmlformats.org/drawingml/2006/main" xmlns:r="http://schemas.openxmlformats.org/officeDocument/2006/relationships" xmlns:p="http://schemas.openxmlformats.org/presentationml/2006/main">
   <p:cSld>
     <p:spTree>
@@ -6960,7 +8053,7 @@
 </p:sld>
 </file>
 
-<file path=ppt/slides/slide14.xml><?xml version="1.0" encoding="utf-8"?>
+<file path=ppt/slides/slide16.xml><?xml version="1.0" encoding="utf-8"?>
 <p:sld xmlns:a="http://schemas.openxmlformats.org/drawingml/2006/main" xmlns:r="http://schemas.openxmlformats.org/officeDocument/2006/relationships" xmlns:p="http://schemas.openxmlformats.org/presentationml/2006/main">
   <p:cSld>
     <p:spTree>
@@ -7904,7 +8997,7 @@
 </p:sld>
 </file>
 
-<file path=ppt/slides/slide15.xml><?xml version="1.0" encoding="utf-8"?>
+<file path=ppt/slides/slide17.xml><?xml version="1.0" encoding="utf-8"?>
 <p:sld xmlns:a="http://schemas.openxmlformats.org/drawingml/2006/main" xmlns:r="http://schemas.openxmlformats.org/officeDocument/2006/relationships" xmlns:p="http://schemas.openxmlformats.org/presentationml/2006/main">
   <p:cSld>
     <p:spTree>
@@ -8618,7 +9711,7 @@
 </p:sld>
 </file>
 
-<file path=ppt/slides/slide16.xml><?xml version="1.0" encoding="utf-8"?>
+<file path=ppt/slides/slide18.xml><?xml version="1.0" encoding="utf-8"?>
 <p:sld xmlns:a="http://schemas.openxmlformats.org/drawingml/2006/main" xmlns:r="http://schemas.openxmlformats.org/officeDocument/2006/relationships" xmlns:p="http://schemas.openxmlformats.org/presentationml/2006/main">
   <p:cSld>
     <p:spTree>
@@ -9258,7 +10351,7 @@
 </p:sld>
 </file>
 
-<file path=ppt/slides/slide17.xml><?xml version="1.0" encoding="utf-8"?>
+<file path=ppt/slides/slide19.xml><?xml version="1.0" encoding="utf-8"?>
 <p:sld xmlns:a="http://schemas.openxmlformats.org/drawingml/2006/main" xmlns:r="http://schemas.openxmlformats.org/officeDocument/2006/relationships" xmlns:p="http://schemas.openxmlformats.org/presentationml/2006/main">
   <p:cSld>
     <p:spTree>
@@ -9919,7 +11012,1036 @@
 </p:sld>
 </file>
 
-<file path=ppt/slides/slide18.xml><?xml version="1.0" encoding="utf-8"?>
+<file path=ppt/slides/slide2.xml><?xml version="1.0" encoding="utf-8"?>
+<p:sld xmlns:a="http://schemas.openxmlformats.org/drawingml/2006/main" xmlns:r="http://schemas.openxmlformats.org/officeDocument/2006/relationships" xmlns:p="http://schemas.openxmlformats.org/presentationml/2006/main">
+  <p:cSld>
+    <p:spTree>
+      <p:nvGrpSpPr>
+        <p:cNvPr id="1" name=""/>
+        <p:cNvGrpSpPr/>
+        <p:nvPr/>
+      </p:nvGrpSpPr>
+      <p:grpSpPr>
+        <a:xfrm>
+          <a:off x="0" y="0"/>
+          <a:ext cx="0" cy="0"/>
+          <a:chOff x="0" y="0"/>
+          <a:chExt cx="0" cy="0"/>
+        </a:xfrm>
+      </p:grpSpPr>
+      <p:sp>
+        <p:nvSpPr>
+          <p:cNvPr id="7" name="직사각형 6">
+            <a:extLst>
+              <a:ext uri="{FF2B5EF4-FFF2-40B4-BE49-F238E27FC236}">
+                <a16:creationId xmlns:a16="http://schemas.microsoft.com/office/drawing/2014/main" id="{281491D1-B6E8-3BFB-42CF-945A32013856}"/>
+              </a:ext>
+            </a:extLst>
+          </p:cNvPr>
+          <p:cNvSpPr/>
+          <p:nvPr/>
+        </p:nvSpPr>
+        <p:spPr>
+          <a:xfrm>
+            <a:off x="-30480" y="6461759"/>
+            <a:ext cx="12240000" cy="454047"/>
+          </a:xfrm>
+          <a:prstGeom prst="rect">
+            <a:avLst/>
+          </a:prstGeom>
+          <a:solidFill>
+            <a:schemeClr val="accent1">
+              <a:alpha val="34949"/>
+            </a:schemeClr>
+          </a:solidFill>
+          <a:ln>
+            <a:noFill/>
+          </a:ln>
+        </p:spPr>
+        <p:style>
+          <a:lnRef idx="2">
+            <a:schemeClr val="accent1">
+              <a:shade val="15000"/>
+            </a:schemeClr>
+          </a:lnRef>
+          <a:fillRef idx="1">
+            <a:schemeClr val="accent1"/>
+          </a:fillRef>
+          <a:effectRef idx="0">
+            <a:schemeClr val="accent1"/>
+          </a:effectRef>
+          <a:fontRef idx="minor">
+            <a:schemeClr val="lt1"/>
+          </a:fontRef>
+        </p:style>
+        <p:txBody>
+          <a:bodyPr rtlCol="0" anchor="ctr"/>
+          <a:lstStyle/>
+          <a:p>
+            <a:pPr algn="ctr"/>
+            <a:endParaRPr kumimoji="1" lang="ko-Kore-KR" altLang="en-US" dirty="0"/>
+          </a:p>
+        </p:txBody>
+      </p:sp>
+      <p:sp>
+        <p:nvSpPr>
+          <p:cNvPr id="2" name="제목 1">
+            <a:extLst>
+              <a:ext uri="{FF2B5EF4-FFF2-40B4-BE49-F238E27FC236}">
+                <a16:creationId xmlns:a16="http://schemas.microsoft.com/office/drawing/2014/main" id="{5B025642-B38D-A74A-8F24-F7D52B9A84CE}"/>
+              </a:ext>
+            </a:extLst>
+          </p:cNvPr>
+          <p:cNvSpPr>
+            <a:spLocks noGrp="1"/>
+          </p:cNvSpPr>
+          <p:nvPr>
+            <p:ph type="ctrTitle"/>
+          </p:nvPr>
+        </p:nvSpPr>
+        <p:spPr>
+          <a:xfrm>
+            <a:off x="-332127" y="6792119"/>
+            <a:ext cx="3941379" cy="131762"/>
+          </a:xfrm>
+        </p:spPr>
+        <p:txBody>
+          <a:bodyPr>
+            <a:noAutofit/>
+          </a:bodyPr>
+          <a:lstStyle/>
+          <a:p>
+            <a:r>
+              <a:rPr lang="en-US" altLang="ko-Kore-KR" sz="2000" dirty="0" err="1">
+                <a:solidFill>
+                  <a:srgbClr val="7030A0"/>
+                </a:solidFill>
+              </a:rPr>
+              <a:t>SangMyeong</a:t>
+            </a:r>
+            <a:r>
+              <a:rPr lang="en-US" altLang="ko-Kore-KR" sz="2000" dirty="0">
+                <a:solidFill>
+                  <a:srgbClr val="7030A0"/>
+                </a:solidFill>
+              </a:rPr>
+              <a:t> Coding Education</a:t>
+            </a:r>
+            <a:endParaRPr lang="ko-Kore-KR" sz="2000" dirty="0">
+              <a:solidFill>
+                <a:srgbClr val="7030A0"/>
+              </a:solidFill>
+            </a:endParaRPr>
+          </a:p>
+        </p:txBody>
+      </p:sp>
+      <p:sp>
+        <p:nvSpPr>
+          <p:cNvPr id="3" name="부제목 2">
+            <a:extLst>
+              <a:ext uri="{FF2B5EF4-FFF2-40B4-BE49-F238E27FC236}">
+                <a16:creationId xmlns:a16="http://schemas.microsoft.com/office/drawing/2014/main" id="{F05A16A8-C921-DD4F-8509-1F06F45DEDD3}"/>
+              </a:ext>
+            </a:extLst>
+          </p:cNvPr>
+          <p:cNvSpPr>
+            <a:spLocks noGrp="1"/>
+          </p:cNvSpPr>
+          <p:nvPr>
+            <p:ph type="subTitle" idx="1"/>
+          </p:nvPr>
+        </p:nvSpPr>
+        <p:spPr>
+          <a:xfrm>
+            <a:off x="4743318" y="6512447"/>
+            <a:ext cx="2827283" cy="467903"/>
+          </a:xfrm>
+        </p:spPr>
+        <p:txBody>
+          <a:bodyPr>
+            <a:normAutofit/>
+          </a:bodyPr>
+          <a:lstStyle/>
+          <a:p>
+            <a:r>
+              <a:rPr lang="en-US" altLang="ko-KR" dirty="0"/>
+              <a:t>Function</a:t>
+            </a:r>
+            <a:endParaRPr lang="ko-Kore-KR" altLang="ko-Kore-KR" dirty="0"/>
+          </a:p>
+        </p:txBody>
+      </p:sp>
+      <p:sp>
+        <p:nvSpPr>
+          <p:cNvPr id="4" name="제목 1">
+            <a:extLst>
+              <a:ext uri="{FF2B5EF4-FFF2-40B4-BE49-F238E27FC236}">
+                <a16:creationId xmlns:a16="http://schemas.microsoft.com/office/drawing/2014/main" id="{AAA94350-F7A7-7F4D-9274-C4E68FEFACC2}"/>
+              </a:ext>
+            </a:extLst>
+          </p:cNvPr>
+          <p:cNvSpPr txBox="1">
+            <a:spLocks/>
+          </p:cNvSpPr>
+          <p:nvPr/>
+        </p:nvSpPr>
+        <p:spPr>
+          <a:xfrm>
+            <a:off x="11216640" y="6858000"/>
+            <a:ext cx="1069954" cy="57807"/>
+          </a:xfrm>
+          <a:prstGeom prst="rect">
+            <a:avLst/>
+          </a:prstGeom>
+        </p:spPr>
+        <p:txBody>
+          <a:bodyPr vert="horz" lIns="91440" tIns="45720" rIns="91440" bIns="45720" rtlCol="0" anchor="b">
+            <a:noAutofit/>
+          </a:bodyPr>
+          <a:lstStyle>
+            <a:lvl1pPr algn="ctr" defTabSz="914400" rtl="0" eaLnBrk="1" latinLnBrk="0" hangingPunct="1">
+              <a:lnSpc>
+                <a:spcPct val="90000"/>
+              </a:lnSpc>
+              <a:spcBef>
+                <a:spcPct val="0"/>
+              </a:spcBef>
+              <a:buNone/>
+              <a:defRPr sz="6000" kern="1200">
+                <a:solidFill>
+                  <a:schemeClr val="tx1"/>
+                </a:solidFill>
+                <a:latin typeface="+mj-lt"/>
+                <a:ea typeface="+mj-ea"/>
+                <a:cs typeface="+mj-cs"/>
+              </a:defRPr>
+            </a:lvl1pPr>
+          </a:lstStyle>
+          <a:p>
+            <a:r>
+              <a:rPr lang="en-US" sz="2400" dirty="0">
+                <a:solidFill>
+                  <a:srgbClr val="00B050"/>
+                </a:solidFill>
+              </a:rPr>
+              <a:t>week 4</a:t>
+            </a:r>
+            <a:endParaRPr lang="ko-Kore-KR" sz="2400" dirty="0">
+              <a:solidFill>
+                <a:srgbClr val="00B050"/>
+              </a:solidFill>
+            </a:endParaRPr>
+          </a:p>
+        </p:txBody>
+      </p:sp>
+      <p:sp>
+        <p:nvSpPr>
+          <p:cNvPr id="9" name="부제목 2">
+            <a:extLst>
+              <a:ext uri="{FF2B5EF4-FFF2-40B4-BE49-F238E27FC236}">
+                <a16:creationId xmlns:a16="http://schemas.microsoft.com/office/drawing/2014/main" id="{618387EB-79C7-B848-8C39-392B62BF4926}"/>
+              </a:ext>
+            </a:extLst>
+          </p:cNvPr>
+          <p:cNvSpPr txBox="1">
+            <a:spLocks/>
+          </p:cNvSpPr>
+          <p:nvPr/>
+        </p:nvSpPr>
+        <p:spPr>
+          <a:xfrm>
+            <a:off x="-1289789" y="0"/>
+            <a:ext cx="4899041" cy="778476"/>
+          </a:xfrm>
+          <a:prstGeom prst="rect">
+            <a:avLst/>
+          </a:prstGeom>
+        </p:spPr>
+        <p:txBody>
+          <a:bodyPr vert="horz" lIns="91440" tIns="45720" rIns="91440" bIns="45720" rtlCol="0">
+            <a:normAutofit/>
+          </a:bodyPr>
+          <a:lstStyle>
+            <a:lvl1pPr marL="0" indent="0" algn="ctr" defTabSz="914400" rtl="0" eaLnBrk="1" latinLnBrk="0" hangingPunct="1">
+              <a:lnSpc>
+                <a:spcPct val="90000"/>
+              </a:lnSpc>
+              <a:spcBef>
+                <a:spcPts val="1000"/>
+              </a:spcBef>
+              <a:buFont typeface="Arial" panose="020B0604020202020204" pitchFamily="34" charset="0"/>
+              <a:buNone/>
+              <a:defRPr sz="2400" kern="1200">
+                <a:solidFill>
+                  <a:schemeClr val="tx1"/>
+                </a:solidFill>
+                <a:latin typeface="+mn-lt"/>
+                <a:ea typeface="+mn-ea"/>
+                <a:cs typeface="+mn-cs"/>
+              </a:defRPr>
+            </a:lvl1pPr>
+            <a:lvl2pPr marL="457200" indent="0" algn="ctr" defTabSz="914400" rtl="0" eaLnBrk="1" latinLnBrk="0" hangingPunct="1">
+              <a:lnSpc>
+                <a:spcPct val="90000"/>
+              </a:lnSpc>
+              <a:spcBef>
+                <a:spcPts val="500"/>
+              </a:spcBef>
+              <a:buFont typeface="Arial" panose="020B0604020202020204" pitchFamily="34" charset="0"/>
+              <a:buNone/>
+              <a:defRPr sz="2000" kern="1200">
+                <a:solidFill>
+                  <a:schemeClr val="tx1"/>
+                </a:solidFill>
+                <a:latin typeface="+mn-lt"/>
+                <a:ea typeface="+mn-ea"/>
+                <a:cs typeface="+mn-cs"/>
+              </a:defRPr>
+            </a:lvl2pPr>
+            <a:lvl3pPr marL="914400" indent="0" algn="ctr" defTabSz="914400" rtl="0" eaLnBrk="1" latinLnBrk="0" hangingPunct="1">
+              <a:lnSpc>
+                <a:spcPct val="90000"/>
+              </a:lnSpc>
+              <a:spcBef>
+                <a:spcPts val="500"/>
+              </a:spcBef>
+              <a:buFont typeface="Arial" panose="020B0604020202020204" pitchFamily="34" charset="0"/>
+              <a:buNone/>
+              <a:defRPr sz="1800" kern="1200">
+                <a:solidFill>
+                  <a:schemeClr val="tx1"/>
+                </a:solidFill>
+                <a:latin typeface="+mn-lt"/>
+                <a:ea typeface="+mn-ea"/>
+                <a:cs typeface="+mn-cs"/>
+              </a:defRPr>
+            </a:lvl3pPr>
+            <a:lvl4pPr marL="1371600" indent="0" algn="ctr" defTabSz="914400" rtl="0" eaLnBrk="1" latinLnBrk="0" hangingPunct="1">
+              <a:lnSpc>
+                <a:spcPct val="90000"/>
+              </a:lnSpc>
+              <a:spcBef>
+                <a:spcPts val="500"/>
+              </a:spcBef>
+              <a:buFont typeface="Arial" panose="020B0604020202020204" pitchFamily="34" charset="0"/>
+              <a:buNone/>
+              <a:defRPr sz="1600" kern="1200">
+                <a:solidFill>
+                  <a:schemeClr val="tx1"/>
+                </a:solidFill>
+                <a:latin typeface="+mn-lt"/>
+                <a:ea typeface="+mn-ea"/>
+                <a:cs typeface="+mn-cs"/>
+              </a:defRPr>
+            </a:lvl4pPr>
+            <a:lvl5pPr marL="1828800" indent="0" algn="ctr" defTabSz="914400" rtl="0" eaLnBrk="1" latinLnBrk="0" hangingPunct="1">
+              <a:lnSpc>
+                <a:spcPct val="90000"/>
+              </a:lnSpc>
+              <a:spcBef>
+                <a:spcPts val="500"/>
+              </a:spcBef>
+              <a:buFont typeface="Arial" panose="020B0604020202020204" pitchFamily="34" charset="0"/>
+              <a:buNone/>
+              <a:defRPr sz="1600" kern="1200">
+                <a:solidFill>
+                  <a:schemeClr val="tx1"/>
+                </a:solidFill>
+                <a:latin typeface="+mn-lt"/>
+                <a:ea typeface="+mn-ea"/>
+                <a:cs typeface="+mn-cs"/>
+              </a:defRPr>
+            </a:lvl5pPr>
+            <a:lvl6pPr marL="2286000" indent="0" algn="ctr" defTabSz="914400" rtl="0" eaLnBrk="1" latinLnBrk="0" hangingPunct="1">
+              <a:lnSpc>
+                <a:spcPct val="90000"/>
+              </a:lnSpc>
+              <a:spcBef>
+                <a:spcPts val="500"/>
+              </a:spcBef>
+              <a:buFont typeface="Arial" panose="020B0604020202020204" pitchFamily="34" charset="0"/>
+              <a:buNone/>
+              <a:defRPr sz="1600" kern="1200">
+                <a:solidFill>
+                  <a:schemeClr val="tx1"/>
+                </a:solidFill>
+                <a:latin typeface="+mn-lt"/>
+                <a:ea typeface="+mn-ea"/>
+                <a:cs typeface="+mn-cs"/>
+              </a:defRPr>
+            </a:lvl6pPr>
+            <a:lvl7pPr marL="2743200" indent="0" algn="ctr" defTabSz="914400" rtl="0" eaLnBrk="1" latinLnBrk="0" hangingPunct="1">
+              <a:lnSpc>
+                <a:spcPct val="90000"/>
+              </a:lnSpc>
+              <a:spcBef>
+                <a:spcPts val="500"/>
+              </a:spcBef>
+              <a:buFont typeface="Arial" panose="020B0604020202020204" pitchFamily="34" charset="0"/>
+              <a:buNone/>
+              <a:defRPr sz="1600" kern="1200">
+                <a:solidFill>
+                  <a:schemeClr val="tx1"/>
+                </a:solidFill>
+                <a:latin typeface="+mn-lt"/>
+                <a:ea typeface="+mn-ea"/>
+                <a:cs typeface="+mn-cs"/>
+              </a:defRPr>
+            </a:lvl7pPr>
+            <a:lvl8pPr marL="3200400" indent="0" algn="ctr" defTabSz="914400" rtl="0" eaLnBrk="1" latinLnBrk="0" hangingPunct="1">
+              <a:lnSpc>
+                <a:spcPct val="90000"/>
+              </a:lnSpc>
+              <a:spcBef>
+                <a:spcPts val="500"/>
+              </a:spcBef>
+              <a:buFont typeface="Arial" panose="020B0604020202020204" pitchFamily="34" charset="0"/>
+              <a:buNone/>
+              <a:defRPr sz="1600" kern="1200">
+                <a:solidFill>
+                  <a:schemeClr val="tx1"/>
+                </a:solidFill>
+                <a:latin typeface="+mn-lt"/>
+                <a:ea typeface="+mn-ea"/>
+                <a:cs typeface="+mn-cs"/>
+              </a:defRPr>
+            </a:lvl8pPr>
+            <a:lvl9pPr marL="3657600" indent="0" algn="ctr" defTabSz="914400" rtl="0" eaLnBrk="1" latinLnBrk="0" hangingPunct="1">
+              <a:lnSpc>
+                <a:spcPct val="90000"/>
+              </a:lnSpc>
+              <a:spcBef>
+                <a:spcPts val="500"/>
+              </a:spcBef>
+              <a:buFont typeface="Arial" panose="020B0604020202020204" pitchFamily="34" charset="0"/>
+              <a:buNone/>
+              <a:defRPr sz="1600" kern="1200">
+                <a:solidFill>
+                  <a:schemeClr val="tx1"/>
+                </a:solidFill>
+                <a:latin typeface="+mn-lt"/>
+                <a:ea typeface="+mn-ea"/>
+                <a:cs typeface="+mn-cs"/>
+              </a:defRPr>
+            </a:lvl9pPr>
+          </a:lstStyle>
+          <a:p>
+            <a:r>
+              <a:rPr lang="en-US" altLang="ko-Kore-KR" sz="4400" b="1" dirty="0">
+                <a:solidFill>
+                  <a:schemeClr val="accent2"/>
+                </a:solidFill>
+              </a:rPr>
+              <a:t>Function</a:t>
+            </a:r>
+            <a:endParaRPr lang="ko-Kore-KR" sz="4400" b="1" dirty="0">
+              <a:solidFill>
+                <a:schemeClr val="accent2"/>
+              </a:solidFill>
+            </a:endParaRPr>
+          </a:p>
+        </p:txBody>
+      </p:sp>
+      <p:sp>
+        <p:nvSpPr>
+          <p:cNvPr id="5" name="TextBox 4">
+            <a:extLst>
+              <a:ext uri="{FF2B5EF4-FFF2-40B4-BE49-F238E27FC236}">
+                <a16:creationId xmlns:a16="http://schemas.microsoft.com/office/drawing/2014/main" id="{B79E4B3C-E8F1-E038-CCA5-432D6846903A}"/>
+              </a:ext>
+            </a:extLst>
+          </p:cNvPr>
+          <p:cNvSpPr txBox="1"/>
+          <p:nvPr/>
+        </p:nvSpPr>
+        <p:spPr>
+          <a:xfrm>
+            <a:off x="179070" y="778476"/>
+            <a:ext cx="5758308" cy="523220"/>
+          </a:xfrm>
+          <a:prstGeom prst="rect">
+            <a:avLst/>
+          </a:prstGeom>
+          <a:noFill/>
+        </p:spPr>
+        <p:txBody>
+          <a:bodyPr wrap="none" rtlCol="0">
+            <a:spAutoFit/>
+          </a:bodyPr>
+          <a:lstStyle/>
+          <a:p>
+            <a:r>
+              <a:rPr kumimoji="1" lang="en-US" altLang="ko-Kore-KR" sz="2800" dirty="0"/>
+              <a:t>Function ( </a:t>
+            </a:r>
+            <a:r>
+              <a:rPr kumimoji="1" lang="ko-Kore-KR" altLang="en-US" sz="2800" dirty="0"/>
+              <a:t>함수</a:t>
+            </a:r>
+            <a:r>
+              <a:rPr kumimoji="1" lang="ko-KR" altLang="en-US" sz="2800" dirty="0"/>
+              <a:t> </a:t>
+            </a:r>
+            <a:r>
+              <a:rPr kumimoji="1" lang="en-US" altLang="ko-KR" sz="2800" dirty="0"/>
+              <a:t>)</a:t>
+            </a:r>
+            <a:r>
+              <a:rPr kumimoji="1" lang="ko-KR" altLang="en-US" sz="2800" dirty="0"/>
+              <a:t> </a:t>
+            </a:r>
+            <a:r>
+              <a:rPr kumimoji="1" lang="ko-KR" altLang="en-US" dirty="0"/>
+              <a:t> </a:t>
+            </a:r>
+            <a:r>
+              <a:rPr kumimoji="1" lang="ko-KR" altLang="en-US" dirty="0">
+                <a:solidFill>
+                  <a:schemeClr val="bg2">
+                    <a:lumMod val="75000"/>
+                  </a:schemeClr>
+                </a:solidFill>
+              </a:rPr>
+              <a:t>나중에 제대로 다시 다룰 예정</a:t>
+            </a:r>
+            <a:endParaRPr kumimoji="1" lang="ko-Kore-KR" altLang="en-US" dirty="0">
+              <a:solidFill>
+                <a:schemeClr val="bg2">
+                  <a:lumMod val="75000"/>
+                </a:schemeClr>
+              </a:solidFill>
+            </a:endParaRPr>
+          </a:p>
+        </p:txBody>
+      </p:sp>
+      <p:pic>
+        <p:nvPicPr>
+          <p:cNvPr id="6" name="그림 5" descr="텍스트, 스크린샷, 저울이(가) 표시된 사진&#10;&#10;자동 생성된 설명">
+            <a:extLst>
+              <a:ext uri="{FF2B5EF4-FFF2-40B4-BE49-F238E27FC236}">
+                <a16:creationId xmlns:a16="http://schemas.microsoft.com/office/drawing/2014/main" id="{2B734C3A-4BCC-9DA1-6AAA-DF4ADE639307}"/>
+              </a:ext>
+            </a:extLst>
+          </p:cNvPr>
+          <p:cNvPicPr>
+            <a:picLocks noChangeAspect="1"/>
+          </p:cNvPicPr>
+          <p:nvPr/>
+        </p:nvPicPr>
+        <p:blipFill>
+          <a:blip r:embed="rId2"/>
+          <a:stretch>
+            <a:fillRect/>
+          </a:stretch>
+        </p:blipFill>
+        <p:spPr>
+          <a:xfrm>
+            <a:off x="373048" y="1352384"/>
+            <a:ext cx="6020180" cy="4646447"/>
+          </a:xfrm>
+          <a:prstGeom prst="rect">
+            <a:avLst/>
+          </a:prstGeom>
+        </p:spPr>
+      </p:pic>
+      <p:sp>
+        <p:nvSpPr>
+          <p:cNvPr id="10" name="직사각형 9">
+            <a:extLst>
+              <a:ext uri="{FF2B5EF4-FFF2-40B4-BE49-F238E27FC236}">
+                <a16:creationId xmlns:a16="http://schemas.microsoft.com/office/drawing/2014/main" id="{EBE088EF-D08A-CA29-575A-132621AD3177}"/>
+              </a:ext>
+            </a:extLst>
+          </p:cNvPr>
+          <p:cNvSpPr/>
+          <p:nvPr/>
+        </p:nvSpPr>
+        <p:spPr>
+          <a:xfrm>
+            <a:off x="2023110" y="2011680"/>
+            <a:ext cx="2720208" cy="228600"/>
+          </a:xfrm>
+          <a:prstGeom prst="rect">
+            <a:avLst/>
+          </a:prstGeom>
+          <a:solidFill>
+            <a:schemeClr val="accent4">
+              <a:lumMod val="20000"/>
+              <a:lumOff val="80000"/>
+              <a:alpha val="47780"/>
+            </a:schemeClr>
+          </a:solidFill>
+          <a:ln>
+            <a:noFill/>
+          </a:ln>
+        </p:spPr>
+        <p:style>
+          <a:lnRef idx="2">
+            <a:schemeClr val="accent1">
+              <a:shade val="15000"/>
+            </a:schemeClr>
+          </a:lnRef>
+          <a:fillRef idx="1">
+            <a:schemeClr val="accent1"/>
+          </a:fillRef>
+          <a:effectRef idx="0">
+            <a:schemeClr val="accent1"/>
+          </a:effectRef>
+          <a:fontRef idx="minor">
+            <a:schemeClr val="lt1"/>
+          </a:fontRef>
+        </p:style>
+        <p:txBody>
+          <a:bodyPr rtlCol="0" anchor="ctr"/>
+          <a:lstStyle/>
+          <a:p>
+            <a:pPr algn="ctr"/>
+            <a:endParaRPr kumimoji="1" lang="ko-Kore-KR" altLang="en-US" dirty="0"/>
+          </a:p>
+        </p:txBody>
+      </p:sp>
+      <p:sp>
+        <p:nvSpPr>
+          <p:cNvPr id="11" name="직사각형 10">
+            <a:extLst>
+              <a:ext uri="{FF2B5EF4-FFF2-40B4-BE49-F238E27FC236}">
+                <a16:creationId xmlns:a16="http://schemas.microsoft.com/office/drawing/2014/main" id="{ADF9563C-F194-6507-9BBE-7939A0906586}"/>
+              </a:ext>
+            </a:extLst>
+          </p:cNvPr>
+          <p:cNvSpPr/>
+          <p:nvPr/>
+        </p:nvSpPr>
+        <p:spPr>
+          <a:xfrm>
+            <a:off x="889044" y="3670998"/>
+            <a:ext cx="631146" cy="352362"/>
+          </a:xfrm>
+          <a:prstGeom prst="rect">
+            <a:avLst/>
+          </a:prstGeom>
+          <a:solidFill>
+            <a:schemeClr val="accent4">
+              <a:lumMod val="20000"/>
+              <a:lumOff val="80000"/>
+              <a:alpha val="47780"/>
+            </a:schemeClr>
+          </a:solidFill>
+          <a:ln>
+            <a:noFill/>
+          </a:ln>
+        </p:spPr>
+        <p:style>
+          <a:lnRef idx="2">
+            <a:schemeClr val="accent1">
+              <a:shade val="15000"/>
+            </a:schemeClr>
+          </a:lnRef>
+          <a:fillRef idx="1">
+            <a:schemeClr val="accent1"/>
+          </a:fillRef>
+          <a:effectRef idx="0">
+            <a:schemeClr val="accent1"/>
+          </a:effectRef>
+          <a:fontRef idx="minor">
+            <a:schemeClr val="lt1"/>
+          </a:fontRef>
+        </p:style>
+        <p:txBody>
+          <a:bodyPr rtlCol="0" anchor="ctr"/>
+          <a:lstStyle/>
+          <a:p>
+            <a:pPr algn="ctr"/>
+            <a:endParaRPr kumimoji="1" lang="ko-Kore-KR" altLang="en-US" dirty="0"/>
+          </a:p>
+        </p:txBody>
+      </p:sp>
+      <p:sp>
+        <p:nvSpPr>
+          <p:cNvPr id="13" name="직사각형 12">
+            <a:extLst>
+              <a:ext uri="{FF2B5EF4-FFF2-40B4-BE49-F238E27FC236}">
+                <a16:creationId xmlns:a16="http://schemas.microsoft.com/office/drawing/2014/main" id="{64509E5B-608B-D589-B81C-D717B111652D}"/>
+              </a:ext>
+            </a:extLst>
+          </p:cNvPr>
+          <p:cNvSpPr/>
+          <p:nvPr/>
+        </p:nvSpPr>
+        <p:spPr>
+          <a:xfrm>
+            <a:off x="6629400" y="939746"/>
+            <a:ext cx="4983480" cy="4866694"/>
+          </a:xfrm>
+          <a:prstGeom prst="rect">
+            <a:avLst/>
+          </a:prstGeom>
+        </p:spPr>
+        <p:style>
+          <a:lnRef idx="2">
+            <a:schemeClr val="accent6"/>
+          </a:lnRef>
+          <a:fillRef idx="1">
+            <a:schemeClr val="lt1"/>
+          </a:fillRef>
+          <a:effectRef idx="0">
+            <a:schemeClr val="accent6"/>
+          </a:effectRef>
+          <a:fontRef idx="minor">
+            <a:schemeClr val="dk1"/>
+          </a:fontRef>
+        </p:style>
+        <p:txBody>
+          <a:bodyPr rtlCol="0" anchor="ctr"/>
+          <a:lstStyle/>
+          <a:p>
+            <a:pPr marL="342900" indent="-342900" algn="ctr">
+              <a:buAutoNum type="arabicPeriod"/>
+            </a:pPr>
+            <a:endParaRPr kumimoji="1" lang="en-US" altLang="ko-KR" dirty="0"/>
+          </a:p>
+          <a:p>
+            <a:pPr marL="342900" indent="-342900" algn="ctr">
+              <a:buAutoNum type="arabicPeriod"/>
+            </a:pPr>
+            <a:r>
+              <a:rPr kumimoji="1" lang="ko-KR" altLang="en-US" dirty="0"/>
+              <a:t>빨래 용량에 따라 물 높이 설정 </a:t>
+            </a:r>
+            <a:endParaRPr kumimoji="1" lang="en-US" altLang="ko-KR" dirty="0"/>
+          </a:p>
+          <a:p>
+            <a:pPr marL="342900" indent="-342900" algn="ctr">
+              <a:buAutoNum type="arabicPeriod"/>
+            </a:pPr>
+            <a:r>
+              <a:rPr kumimoji="1" lang="ko-KR" altLang="en-US" dirty="0"/>
+              <a:t>물이 가득 채워지고 </a:t>
+            </a:r>
+            <a:r>
+              <a:rPr kumimoji="1" lang="en-US" altLang="ko-KR" dirty="0"/>
+              <a:t>10</a:t>
+            </a:r>
+            <a:r>
+              <a:rPr kumimoji="1" lang="ko-KR" altLang="en-US" dirty="0"/>
+              <a:t>분 동안 대기상태</a:t>
+            </a:r>
+            <a:endParaRPr kumimoji="1" lang="en-US" altLang="ko-KR" dirty="0"/>
+          </a:p>
+          <a:p>
+            <a:pPr marL="342900" indent="-342900" algn="ctr">
+              <a:buAutoNum type="arabicPeriod"/>
+            </a:pPr>
+            <a:r>
+              <a:rPr kumimoji="1" lang="ko-KR" altLang="en-US" dirty="0"/>
+              <a:t>세제 투입</a:t>
+            </a:r>
+            <a:endParaRPr kumimoji="1" lang="en-US" altLang="ko-KR" dirty="0"/>
+          </a:p>
+          <a:p>
+            <a:pPr marL="342900" indent="-342900" algn="ctr">
+              <a:buAutoNum type="arabicPeriod"/>
+            </a:pPr>
+            <a:r>
+              <a:rPr kumimoji="1" lang="ko-KR" altLang="en-US" dirty="0"/>
+              <a:t>섬유유연제 투입</a:t>
+            </a:r>
+            <a:endParaRPr kumimoji="1" lang="en-US" altLang="ko-KR" dirty="0"/>
+          </a:p>
+          <a:p>
+            <a:pPr marL="342900" indent="-342900" algn="ctr">
+              <a:buAutoNum type="arabicPeriod"/>
+            </a:pPr>
+            <a:r>
+              <a:rPr kumimoji="1" lang="en-US" altLang="ko-KR" dirty="0"/>
+              <a:t>25</a:t>
+            </a:r>
+            <a:r>
+              <a:rPr kumimoji="1" lang="ko-KR" altLang="en-US" dirty="0"/>
+              <a:t>분간 </a:t>
+            </a:r>
+            <a:r>
+              <a:rPr kumimoji="1" lang="en-US" altLang="ko-KR" dirty="0"/>
+              <a:t>60rpm </a:t>
+            </a:r>
+            <a:r>
+              <a:rPr kumimoji="1" lang="ko-KR" altLang="en-US" dirty="0" err="1"/>
+              <a:t>으로</a:t>
+            </a:r>
+            <a:r>
+              <a:rPr kumimoji="1" lang="ko-KR" altLang="en-US" dirty="0"/>
+              <a:t> 회전</a:t>
+            </a:r>
+            <a:endParaRPr kumimoji="1" lang="en-US" altLang="ko-KR" dirty="0"/>
+          </a:p>
+          <a:p>
+            <a:pPr marL="342900" indent="-342900" algn="ctr">
+              <a:buAutoNum type="arabicPeriod"/>
+            </a:pPr>
+            <a:r>
+              <a:rPr kumimoji="1" lang="ko-KR" altLang="en-US" dirty="0"/>
+              <a:t>물 배출</a:t>
+            </a:r>
+            <a:endParaRPr kumimoji="1" lang="en-US" altLang="ko-KR" dirty="0"/>
+          </a:p>
+          <a:p>
+            <a:pPr marL="342900" indent="-342900" algn="ctr">
+              <a:buAutoNum type="arabicPeriod"/>
+            </a:pPr>
+            <a:r>
+              <a:rPr kumimoji="1" lang="ko-KR" altLang="en-US" dirty="0"/>
+              <a:t>물 가득 채우기</a:t>
+            </a:r>
+            <a:endParaRPr kumimoji="1" lang="en-US" altLang="ko-KR" dirty="0"/>
+          </a:p>
+          <a:p>
+            <a:pPr marL="342900" indent="-342900" algn="ctr">
+              <a:buAutoNum type="arabicPeriod"/>
+            </a:pPr>
+            <a:r>
+              <a:rPr kumimoji="1" lang="en-US" altLang="ko-KR" dirty="0"/>
+              <a:t>20</a:t>
+            </a:r>
+            <a:r>
+              <a:rPr kumimoji="1" lang="ko-KR" altLang="en-US" dirty="0"/>
+              <a:t>분간 </a:t>
+            </a:r>
+            <a:r>
+              <a:rPr kumimoji="1" lang="en-US" altLang="ko-KR" dirty="0"/>
+              <a:t>60rpm </a:t>
+            </a:r>
+            <a:r>
+              <a:rPr kumimoji="1" lang="ko-KR" altLang="en-US" dirty="0" err="1"/>
+              <a:t>으로</a:t>
+            </a:r>
+            <a:r>
+              <a:rPr kumimoji="1" lang="ko-KR" altLang="en-US" dirty="0"/>
+              <a:t> 회전</a:t>
+            </a:r>
+            <a:endParaRPr kumimoji="1" lang="en-US" altLang="ko-KR" dirty="0"/>
+          </a:p>
+          <a:p>
+            <a:pPr marL="342900" indent="-342900" algn="ctr">
+              <a:buAutoNum type="arabicPeriod"/>
+            </a:pPr>
+            <a:r>
+              <a:rPr kumimoji="1" lang="ko-KR" altLang="en-US" dirty="0"/>
+              <a:t>물 배출</a:t>
+            </a:r>
+            <a:endParaRPr kumimoji="1" lang="en-US" altLang="ko-KR" dirty="0"/>
+          </a:p>
+          <a:p>
+            <a:pPr marL="342900" indent="-342900" algn="ctr">
+              <a:buAutoNum type="arabicPeriod"/>
+            </a:pPr>
+            <a:r>
+              <a:rPr kumimoji="1" lang="ko-KR" altLang="en-US" dirty="0"/>
+              <a:t>탈수를 위한 </a:t>
+            </a:r>
+            <a:r>
+              <a:rPr kumimoji="1" lang="en-US" altLang="ko-KR" dirty="0"/>
+              <a:t>120rpm </a:t>
+            </a:r>
+            <a:r>
+              <a:rPr kumimoji="1" lang="ko-KR" altLang="en-US" dirty="0" err="1"/>
+              <a:t>으로</a:t>
+            </a:r>
+            <a:r>
+              <a:rPr kumimoji="1" lang="ko-KR" altLang="en-US" dirty="0"/>
+              <a:t> </a:t>
+            </a:r>
+            <a:r>
+              <a:rPr kumimoji="1" lang="en-US" altLang="ko-KR" dirty="0"/>
+              <a:t>20</a:t>
+            </a:r>
+            <a:r>
+              <a:rPr kumimoji="1" lang="ko-KR" altLang="en-US" dirty="0"/>
+              <a:t>분간 회전</a:t>
+            </a:r>
+            <a:endParaRPr kumimoji="1" lang="en-US" altLang="ko-KR" dirty="0"/>
+          </a:p>
+          <a:p>
+            <a:pPr marL="342900" indent="-342900" algn="ctr">
+              <a:buAutoNum type="arabicPeriod"/>
+            </a:pPr>
+            <a:endParaRPr kumimoji="1" lang="en-US" altLang="ko-KR" dirty="0"/>
+          </a:p>
+        </p:txBody>
+      </p:sp>
+      <p:pic>
+        <p:nvPicPr>
+          <p:cNvPr id="14" name="그림 13" descr="텍스트, 스크린샷, 디자인, 폰트이(가) 표시된 사진&#10;&#10;자동 생성된 설명">
+            <a:extLst>
+              <a:ext uri="{FF2B5EF4-FFF2-40B4-BE49-F238E27FC236}">
+                <a16:creationId xmlns:a16="http://schemas.microsoft.com/office/drawing/2014/main" id="{53485FD2-A77D-857F-DB5C-0A0548BDEB30}"/>
+              </a:ext>
+            </a:extLst>
+          </p:cNvPr>
+          <p:cNvPicPr>
+            <a:picLocks noChangeAspect="1"/>
+          </p:cNvPicPr>
+          <p:nvPr/>
+        </p:nvPicPr>
+        <p:blipFill rotWithShape="1">
+          <a:blip r:embed="rId3"/>
+          <a:srcRect l="21678" b="10953"/>
+          <a:stretch/>
+        </p:blipFill>
+        <p:spPr>
+          <a:xfrm>
+            <a:off x="8769918" y="420677"/>
+            <a:ext cx="1220387" cy="909049"/>
+          </a:xfrm>
+          <a:prstGeom prst="rect">
+            <a:avLst/>
+          </a:prstGeom>
+        </p:spPr>
+      </p:pic>
+      <p:pic>
+        <p:nvPicPr>
+          <p:cNvPr id="16" name="그림 15" descr="텍스트, 병, 플라스틱, 플라스틱 병이(가) 표시된 사진&#10;&#10;자동 생성된 설명">
+            <a:extLst>
+              <a:ext uri="{FF2B5EF4-FFF2-40B4-BE49-F238E27FC236}">
+                <a16:creationId xmlns:a16="http://schemas.microsoft.com/office/drawing/2014/main" id="{4F9D4840-01C8-235E-BE1E-12788A7340AD}"/>
+              </a:ext>
+            </a:extLst>
+          </p:cNvPr>
+          <p:cNvPicPr>
+            <a:picLocks noChangeAspect="1"/>
+          </p:cNvPicPr>
+          <p:nvPr/>
+        </p:nvPicPr>
+        <p:blipFill>
+          <a:blip r:embed="rId4"/>
+          <a:stretch>
+            <a:fillRect/>
+          </a:stretch>
+        </p:blipFill>
+        <p:spPr>
+          <a:xfrm>
+            <a:off x="6854321" y="560939"/>
+            <a:ext cx="716280" cy="791445"/>
+          </a:xfrm>
+          <a:prstGeom prst="rect">
+            <a:avLst/>
+          </a:prstGeom>
+        </p:spPr>
+      </p:pic>
+      <p:pic>
+        <p:nvPicPr>
+          <p:cNvPr id="18" name="Picture 2" descr="하얀생활 세탁세제 2.7L (4개) : 다나와 가격비교">
+            <a:extLst>
+              <a:ext uri="{FF2B5EF4-FFF2-40B4-BE49-F238E27FC236}">
+                <a16:creationId xmlns:a16="http://schemas.microsoft.com/office/drawing/2014/main" id="{FC03E866-2172-DEC5-D022-0567E175739D}"/>
+              </a:ext>
+            </a:extLst>
+          </p:cNvPr>
+          <p:cNvPicPr>
+            <a:picLocks noChangeAspect="1" noChangeArrowheads="1"/>
+          </p:cNvPicPr>
+          <p:nvPr/>
+        </p:nvPicPr>
+        <p:blipFill>
+          <a:blip r:embed="rId5">
+            <a:extLst>
+              <a:ext uri="{28A0092B-C50C-407E-A947-70E740481C1C}">
+                <a14:useLocalDpi xmlns:a14="http://schemas.microsoft.com/office/drawing/2010/main" val="0"/>
+              </a:ext>
+            </a:extLst>
+          </a:blip>
+          <a:srcRect/>
+          <a:stretch>
+            <a:fillRect/>
+          </a:stretch>
+        </p:blipFill>
+        <p:spPr bwMode="auto">
+          <a:xfrm>
+            <a:off x="7570601" y="545290"/>
+            <a:ext cx="738224" cy="738224"/>
+          </a:xfrm>
+          <a:prstGeom prst="rect">
+            <a:avLst/>
+          </a:prstGeom>
+          <a:noFill/>
+          <a:extLst>
+            <a:ext uri="{909E8E84-426E-40DD-AFC4-6F175D3DCCD1}">
+              <a14:hiddenFill xmlns:a14="http://schemas.microsoft.com/office/drawing/2010/main">
+                <a:solidFill>
+                  <a:srgbClr val="FFFFFF"/>
+                </a:solidFill>
+              </a14:hiddenFill>
+            </a:ext>
+          </a:extLst>
+        </p:spPr>
+      </p:pic>
+      <p:sp>
+        <p:nvSpPr>
+          <p:cNvPr id="20" name="모서리가 둥근 직사각형 19">
+            <a:extLst>
+              <a:ext uri="{FF2B5EF4-FFF2-40B4-BE49-F238E27FC236}">
+                <a16:creationId xmlns:a16="http://schemas.microsoft.com/office/drawing/2014/main" id="{E34C20BE-B5D7-AD56-0649-A176238C7EC0}"/>
+              </a:ext>
+            </a:extLst>
+          </p:cNvPr>
+          <p:cNvSpPr/>
+          <p:nvPr/>
+        </p:nvSpPr>
+        <p:spPr>
+          <a:xfrm>
+            <a:off x="6629400" y="389238"/>
+            <a:ext cx="1915597" cy="1176672"/>
+          </a:xfrm>
+          <a:prstGeom prst="roundRect">
+            <a:avLst/>
+          </a:prstGeom>
+          <a:solidFill>
+            <a:schemeClr val="lt1">
+              <a:alpha val="0"/>
+            </a:schemeClr>
+          </a:solidFill>
+          <a:ln>
+            <a:solidFill>
+              <a:schemeClr val="accent4"/>
+            </a:solidFill>
+          </a:ln>
+        </p:spPr>
+        <p:style>
+          <a:lnRef idx="2">
+            <a:schemeClr val="accent4"/>
+          </a:lnRef>
+          <a:fillRef idx="1">
+            <a:schemeClr val="lt1"/>
+          </a:fillRef>
+          <a:effectRef idx="0">
+            <a:schemeClr val="accent4"/>
+          </a:effectRef>
+          <a:fontRef idx="minor">
+            <a:schemeClr val="dk1"/>
+          </a:fontRef>
+        </p:style>
+        <p:txBody>
+          <a:bodyPr rtlCol="0" anchor="ctr"/>
+          <a:lstStyle/>
+          <a:p>
+            <a:pPr algn="ctr"/>
+            <a:endParaRPr kumimoji="1" lang="ko-Kore-KR" altLang="en-US"/>
+          </a:p>
+        </p:txBody>
+      </p:sp>
+    </p:spTree>
+    <p:extLst>
+      <p:ext uri="{BB962C8B-B14F-4D97-AF65-F5344CB8AC3E}">
+        <p14:creationId xmlns:p14="http://schemas.microsoft.com/office/powerpoint/2010/main" val="320903362"/>
+      </p:ext>
+    </p:extLst>
+  </p:cSld>
+  <p:clrMapOvr>
+    <a:masterClrMapping/>
+  </p:clrMapOvr>
+</p:sld>
+</file>
+
+<file path=ppt/slides/slide20.xml><?xml version="1.0" encoding="utf-8"?>
 <p:sld xmlns:a="http://schemas.openxmlformats.org/drawingml/2006/main" xmlns:r="http://schemas.openxmlformats.org/officeDocument/2006/relationships" xmlns:p="http://schemas.openxmlformats.org/presentationml/2006/main">
   <p:cSld>
     <p:spTree>
@@ -10818,7 +12940,7 @@
 </p:sld>
 </file>
 
-<file path=ppt/slides/slide19.xml><?xml version="1.0" encoding="utf-8"?>
+<file path=ppt/slides/slide21.xml><?xml version="1.0" encoding="utf-8"?>
 <p:sld xmlns:a="http://schemas.openxmlformats.org/drawingml/2006/main" xmlns:r="http://schemas.openxmlformats.org/officeDocument/2006/relationships" xmlns:p="http://schemas.openxmlformats.org/presentationml/2006/main">
   <p:cSld>
     <p:spTree>
@@ -11749,1030 +13871,7 @@
 </p:sld>
 </file>
 
-<file path=ppt/slides/slide2.xml><?xml version="1.0" encoding="utf-8"?>
-<p:sld xmlns:a="http://schemas.openxmlformats.org/drawingml/2006/main" xmlns:r="http://schemas.openxmlformats.org/officeDocument/2006/relationships" xmlns:p="http://schemas.openxmlformats.org/presentationml/2006/main">
-  <p:cSld>
-    <p:spTree>
-      <p:nvGrpSpPr>
-        <p:cNvPr id="1" name=""/>
-        <p:cNvGrpSpPr/>
-        <p:nvPr/>
-      </p:nvGrpSpPr>
-      <p:grpSpPr>
-        <a:xfrm>
-          <a:off x="0" y="0"/>
-          <a:ext cx="0" cy="0"/>
-          <a:chOff x="0" y="0"/>
-          <a:chExt cx="0" cy="0"/>
-        </a:xfrm>
-      </p:grpSpPr>
-      <p:sp>
-        <p:nvSpPr>
-          <p:cNvPr id="7" name="직사각형 6">
-            <a:extLst>
-              <a:ext uri="{FF2B5EF4-FFF2-40B4-BE49-F238E27FC236}">
-                <a16:creationId xmlns:a16="http://schemas.microsoft.com/office/drawing/2014/main" id="{281491D1-B6E8-3BFB-42CF-945A32013856}"/>
-              </a:ext>
-            </a:extLst>
-          </p:cNvPr>
-          <p:cNvSpPr/>
-          <p:nvPr/>
-        </p:nvSpPr>
-        <p:spPr>
-          <a:xfrm>
-            <a:off x="-30480" y="6461759"/>
-            <a:ext cx="12240000" cy="454047"/>
-          </a:xfrm>
-          <a:prstGeom prst="rect">
-            <a:avLst/>
-          </a:prstGeom>
-          <a:solidFill>
-            <a:schemeClr val="accent1">
-              <a:alpha val="34949"/>
-            </a:schemeClr>
-          </a:solidFill>
-          <a:ln>
-            <a:noFill/>
-          </a:ln>
-        </p:spPr>
-        <p:style>
-          <a:lnRef idx="2">
-            <a:schemeClr val="accent1">
-              <a:shade val="15000"/>
-            </a:schemeClr>
-          </a:lnRef>
-          <a:fillRef idx="1">
-            <a:schemeClr val="accent1"/>
-          </a:fillRef>
-          <a:effectRef idx="0">
-            <a:schemeClr val="accent1"/>
-          </a:effectRef>
-          <a:fontRef idx="minor">
-            <a:schemeClr val="lt1"/>
-          </a:fontRef>
-        </p:style>
-        <p:txBody>
-          <a:bodyPr rtlCol="0" anchor="ctr"/>
-          <a:lstStyle/>
-          <a:p>
-            <a:pPr algn="ctr"/>
-            <a:endParaRPr kumimoji="1" lang="ko-Kore-KR" altLang="en-US" dirty="0"/>
-          </a:p>
-        </p:txBody>
-      </p:sp>
-      <p:sp>
-        <p:nvSpPr>
-          <p:cNvPr id="2" name="제목 1">
-            <a:extLst>
-              <a:ext uri="{FF2B5EF4-FFF2-40B4-BE49-F238E27FC236}">
-                <a16:creationId xmlns:a16="http://schemas.microsoft.com/office/drawing/2014/main" id="{5B025642-B38D-A74A-8F24-F7D52B9A84CE}"/>
-              </a:ext>
-            </a:extLst>
-          </p:cNvPr>
-          <p:cNvSpPr>
-            <a:spLocks noGrp="1"/>
-          </p:cNvSpPr>
-          <p:nvPr>
-            <p:ph type="ctrTitle"/>
-          </p:nvPr>
-        </p:nvSpPr>
-        <p:spPr>
-          <a:xfrm>
-            <a:off x="-332127" y="6792119"/>
-            <a:ext cx="3941379" cy="131762"/>
-          </a:xfrm>
-        </p:spPr>
-        <p:txBody>
-          <a:bodyPr>
-            <a:noAutofit/>
-          </a:bodyPr>
-          <a:lstStyle/>
-          <a:p>
-            <a:r>
-              <a:rPr lang="en-US" altLang="ko-Kore-KR" sz="2000" dirty="0" err="1">
-                <a:solidFill>
-                  <a:srgbClr val="7030A0"/>
-                </a:solidFill>
-              </a:rPr>
-              <a:t>SangMyeong</a:t>
-            </a:r>
-            <a:r>
-              <a:rPr lang="en-US" altLang="ko-Kore-KR" sz="2000" dirty="0">
-                <a:solidFill>
-                  <a:srgbClr val="7030A0"/>
-                </a:solidFill>
-              </a:rPr>
-              <a:t> Coding Education</a:t>
-            </a:r>
-            <a:endParaRPr lang="ko-Kore-KR" sz="2000" dirty="0">
-              <a:solidFill>
-                <a:srgbClr val="7030A0"/>
-              </a:solidFill>
-            </a:endParaRPr>
-          </a:p>
-        </p:txBody>
-      </p:sp>
-      <p:sp>
-        <p:nvSpPr>
-          <p:cNvPr id="3" name="부제목 2">
-            <a:extLst>
-              <a:ext uri="{FF2B5EF4-FFF2-40B4-BE49-F238E27FC236}">
-                <a16:creationId xmlns:a16="http://schemas.microsoft.com/office/drawing/2014/main" id="{F05A16A8-C921-DD4F-8509-1F06F45DEDD3}"/>
-              </a:ext>
-            </a:extLst>
-          </p:cNvPr>
-          <p:cNvSpPr>
-            <a:spLocks noGrp="1"/>
-          </p:cNvSpPr>
-          <p:nvPr>
-            <p:ph type="subTitle" idx="1"/>
-          </p:nvPr>
-        </p:nvSpPr>
-        <p:spPr>
-          <a:xfrm>
-            <a:off x="4743318" y="6512447"/>
-            <a:ext cx="2827283" cy="467903"/>
-          </a:xfrm>
-        </p:spPr>
-        <p:txBody>
-          <a:bodyPr>
-            <a:normAutofit/>
-          </a:bodyPr>
-          <a:lstStyle/>
-          <a:p>
-            <a:r>
-              <a:rPr lang="en-US" altLang="ko-KR" dirty="0"/>
-              <a:t>Function</a:t>
-            </a:r>
-            <a:endParaRPr lang="ko-Kore-KR" altLang="ko-Kore-KR" dirty="0"/>
-          </a:p>
-        </p:txBody>
-      </p:sp>
-      <p:sp>
-        <p:nvSpPr>
-          <p:cNvPr id="4" name="제목 1">
-            <a:extLst>
-              <a:ext uri="{FF2B5EF4-FFF2-40B4-BE49-F238E27FC236}">
-                <a16:creationId xmlns:a16="http://schemas.microsoft.com/office/drawing/2014/main" id="{AAA94350-F7A7-7F4D-9274-C4E68FEFACC2}"/>
-              </a:ext>
-            </a:extLst>
-          </p:cNvPr>
-          <p:cNvSpPr txBox="1">
-            <a:spLocks/>
-          </p:cNvSpPr>
-          <p:nvPr/>
-        </p:nvSpPr>
-        <p:spPr>
-          <a:xfrm>
-            <a:off x="11216640" y="6858000"/>
-            <a:ext cx="1069954" cy="57807"/>
-          </a:xfrm>
-          <a:prstGeom prst="rect">
-            <a:avLst/>
-          </a:prstGeom>
-        </p:spPr>
-        <p:txBody>
-          <a:bodyPr vert="horz" lIns="91440" tIns="45720" rIns="91440" bIns="45720" rtlCol="0" anchor="b">
-            <a:noAutofit/>
-          </a:bodyPr>
-          <a:lstStyle>
-            <a:lvl1pPr algn="ctr" defTabSz="914400" rtl="0" eaLnBrk="1" latinLnBrk="0" hangingPunct="1">
-              <a:lnSpc>
-                <a:spcPct val="90000"/>
-              </a:lnSpc>
-              <a:spcBef>
-                <a:spcPct val="0"/>
-              </a:spcBef>
-              <a:buNone/>
-              <a:defRPr sz="6000" kern="1200">
-                <a:solidFill>
-                  <a:schemeClr val="tx1"/>
-                </a:solidFill>
-                <a:latin typeface="+mj-lt"/>
-                <a:ea typeface="+mj-ea"/>
-                <a:cs typeface="+mj-cs"/>
-              </a:defRPr>
-            </a:lvl1pPr>
-          </a:lstStyle>
-          <a:p>
-            <a:r>
-              <a:rPr lang="en-US" sz="2400" dirty="0">
-                <a:solidFill>
-                  <a:srgbClr val="00B050"/>
-                </a:solidFill>
-              </a:rPr>
-              <a:t>week 4</a:t>
-            </a:r>
-            <a:endParaRPr lang="ko-Kore-KR" sz="2400" dirty="0">
-              <a:solidFill>
-                <a:srgbClr val="00B050"/>
-              </a:solidFill>
-            </a:endParaRPr>
-          </a:p>
-        </p:txBody>
-      </p:sp>
-      <p:sp>
-        <p:nvSpPr>
-          <p:cNvPr id="9" name="부제목 2">
-            <a:extLst>
-              <a:ext uri="{FF2B5EF4-FFF2-40B4-BE49-F238E27FC236}">
-                <a16:creationId xmlns:a16="http://schemas.microsoft.com/office/drawing/2014/main" id="{618387EB-79C7-B848-8C39-392B62BF4926}"/>
-              </a:ext>
-            </a:extLst>
-          </p:cNvPr>
-          <p:cNvSpPr txBox="1">
-            <a:spLocks/>
-          </p:cNvSpPr>
-          <p:nvPr/>
-        </p:nvSpPr>
-        <p:spPr>
-          <a:xfrm>
-            <a:off x="-1289789" y="0"/>
-            <a:ext cx="4899041" cy="778476"/>
-          </a:xfrm>
-          <a:prstGeom prst="rect">
-            <a:avLst/>
-          </a:prstGeom>
-        </p:spPr>
-        <p:txBody>
-          <a:bodyPr vert="horz" lIns="91440" tIns="45720" rIns="91440" bIns="45720" rtlCol="0">
-            <a:normAutofit/>
-          </a:bodyPr>
-          <a:lstStyle>
-            <a:lvl1pPr marL="0" indent="0" algn="ctr" defTabSz="914400" rtl="0" eaLnBrk="1" latinLnBrk="0" hangingPunct="1">
-              <a:lnSpc>
-                <a:spcPct val="90000"/>
-              </a:lnSpc>
-              <a:spcBef>
-                <a:spcPts val="1000"/>
-              </a:spcBef>
-              <a:buFont typeface="Arial" panose="020B0604020202020204" pitchFamily="34" charset="0"/>
-              <a:buNone/>
-              <a:defRPr sz="2400" kern="1200">
-                <a:solidFill>
-                  <a:schemeClr val="tx1"/>
-                </a:solidFill>
-                <a:latin typeface="+mn-lt"/>
-                <a:ea typeface="+mn-ea"/>
-                <a:cs typeface="+mn-cs"/>
-              </a:defRPr>
-            </a:lvl1pPr>
-            <a:lvl2pPr marL="457200" indent="0" algn="ctr" defTabSz="914400" rtl="0" eaLnBrk="1" latinLnBrk="0" hangingPunct="1">
-              <a:lnSpc>
-                <a:spcPct val="90000"/>
-              </a:lnSpc>
-              <a:spcBef>
-                <a:spcPts val="500"/>
-              </a:spcBef>
-              <a:buFont typeface="Arial" panose="020B0604020202020204" pitchFamily="34" charset="0"/>
-              <a:buNone/>
-              <a:defRPr sz="2000" kern="1200">
-                <a:solidFill>
-                  <a:schemeClr val="tx1"/>
-                </a:solidFill>
-                <a:latin typeface="+mn-lt"/>
-                <a:ea typeface="+mn-ea"/>
-                <a:cs typeface="+mn-cs"/>
-              </a:defRPr>
-            </a:lvl2pPr>
-            <a:lvl3pPr marL="914400" indent="0" algn="ctr" defTabSz="914400" rtl="0" eaLnBrk="1" latinLnBrk="0" hangingPunct="1">
-              <a:lnSpc>
-                <a:spcPct val="90000"/>
-              </a:lnSpc>
-              <a:spcBef>
-                <a:spcPts val="500"/>
-              </a:spcBef>
-              <a:buFont typeface="Arial" panose="020B0604020202020204" pitchFamily="34" charset="0"/>
-              <a:buNone/>
-              <a:defRPr sz="1800" kern="1200">
-                <a:solidFill>
-                  <a:schemeClr val="tx1"/>
-                </a:solidFill>
-                <a:latin typeface="+mn-lt"/>
-                <a:ea typeface="+mn-ea"/>
-                <a:cs typeface="+mn-cs"/>
-              </a:defRPr>
-            </a:lvl3pPr>
-            <a:lvl4pPr marL="1371600" indent="0" algn="ctr" defTabSz="914400" rtl="0" eaLnBrk="1" latinLnBrk="0" hangingPunct="1">
-              <a:lnSpc>
-                <a:spcPct val="90000"/>
-              </a:lnSpc>
-              <a:spcBef>
-                <a:spcPts val="500"/>
-              </a:spcBef>
-              <a:buFont typeface="Arial" panose="020B0604020202020204" pitchFamily="34" charset="0"/>
-              <a:buNone/>
-              <a:defRPr sz="1600" kern="1200">
-                <a:solidFill>
-                  <a:schemeClr val="tx1"/>
-                </a:solidFill>
-                <a:latin typeface="+mn-lt"/>
-                <a:ea typeface="+mn-ea"/>
-                <a:cs typeface="+mn-cs"/>
-              </a:defRPr>
-            </a:lvl4pPr>
-            <a:lvl5pPr marL="1828800" indent="0" algn="ctr" defTabSz="914400" rtl="0" eaLnBrk="1" latinLnBrk="0" hangingPunct="1">
-              <a:lnSpc>
-                <a:spcPct val="90000"/>
-              </a:lnSpc>
-              <a:spcBef>
-                <a:spcPts val="500"/>
-              </a:spcBef>
-              <a:buFont typeface="Arial" panose="020B0604020202020204" pitchFamily="34" charset="0"/>
-              <a:buNone/>
-              <a:defRPr sz="1600" kern="1200">
-                <a:solidFill>
-                  <a:schemeClr val="tx1"/>
-                </a:solidFill>
-                <a:latin typeface="+mn-lt"/>
-                <a:ea typeface="+mn-ea"/>
-                <a:cs typeface="+mn-cs"/>
-              </a:defRPr>
-            </a:lvl5pPr>
-            <a:lvl6pPr marL="2286000" indent="0" algn="ctr" defTabSz="914400" rtl="0" eaLnBrk="1" latinLnBrk="0" hangingPunct="1">
-              <a:lnSpc>
-                <a:spcPct val="90000"/>
-              </a:lnSpc>
-              <a:spcBef>
-                <a:spcPts val="500"/>
-              </a:spcBef>
-              <a:buFont typeface="Arial" panose="020B0604020202020204" pitchFamily="34" charset="0"/>
-              <a:buNone/>
-              <a:defRPr sz="1600" kern="1200">
-                <a:solidFill>
-                  <a:schemeClr val="tx1"/>
-                </a:solidFill>
-                <a:latin typeface="+mn-lt"/>
-                <a:ea typeface="+mn-ea"/>
-                <a:cs typeface="+mn-cs"/>
-              </a:defRPr>
-            </a:lvl6pPr>
-            <a:lvl7pPr marL="2743200" indent="0" algn="ctr" defTabSz="914400" rtl="0" eaLnBrk="1" latinLnBrk="0" hangingPunct="1">
-              <a:lnSpc>
-                <a:spcPct val="90000"/>
-              </a:lnSpc>
-              <a:spcBef>
-                <a:spcPts val="500"/>
-              </a:spcBef>
-              <a:buFont typeface="Arial" panose="020B0604020202020204" pitchFamily="34" charset="0"/>
-              <a:buNone/>
-              <a:defRPr sz="1600" kern="1200">
-                <a:solidFill>
-                  <a:schemeClr val="tx1"/>
-                </a:solidFill>
-                <a:latin typeface="+mn-lt"/>
-                <a:ea typeface="+mn-ea"/>
-                <a:cs typeface="+mn-cs"/>
-              </a:defRPr>
-            </a:lvl7pPr>
-            <a:lvl8pPr marL="3200400" indent="0" algn="ctr" defTabSz="914400" rtl="0" eaLnBrk="1" latinLnBrk="0" hangingPunct="1">
-              <a:lnSpc>
-                <a:spcPct val="90000"/>
-              </a:lnSpc>
-              <a:spcBef>
-                <a:spcPts val="500"/>
-              </a:spcBef>
-              <a:buFont typeface="Arial" panose="020B0604020202020204" pitchFamily="34" charset="0"/>
-              <a:buNone/>
-              <a:defRPr sz="1600" kern="1200">
-                <a:solidFill>
-                  <a:schemeClr val="tx1"/>
-                </a:solidFill>
-                <a:latin typeface="+mn-lt"/>
-                <a:ea typeface="+mn-ea"/>
-                <a:cs typeface="+mn-cs"/>
-              </a:defRPr>
-            </a:lvl8pPr>
-            <a:lvl9pPr marL="3657600" indent="0" algn="ctr" defTabSz="914400" rtl="0" eaLnBrk="1" latinLnBrk="0" hangingPunct="1">
-              <a:lnSpc>
-                <a:spcPct val="90000"/>
-              </a:lnSpc>
-              <a:spcBef>
-                <a:spcPts val="500"/>
-              </a:spcBef>
-              <a:buFont typeface="Arial" panose="020B0604020202020204" pitchFamily="34" charset="0"/>
-              <a:buNone/>
-              <a:defRPr sz="1600" kern="1200">
-                <a:solidFill>
-                  <a:schemeClr val="tx1"/>
-                </a:solidFill>
-                <a:latin typeface="+mn-lt"/>
-                <a:ea typeface="+mn-ea"/>
-                <a:cs typeface="+mn-cs"/>
-              </a:defRPr>
-            </a:lvl9pPr>
-          </a:lstStyle>
-          <a:p>
-            <a:r>
-              <a:rPr lang="en-US" altLang="ko-Kore-KR" sz="4400" b="1" dirty="0">
-                <a:solidFill>
-                  <a:schemeClr val="accent2"/>
-                </a:solidFill>
-              </a:rPr>
-              <a:t>Function</a:t>
-            </a:r>
-            <a:endParaRPr lang="ko-Kore-KR" sz="4400" b="1" dirty="0">
-              <a:solidFill>
-                <a:schemeClr val="accent2"/>
-              </a:solidFill>
-            </a:endParaRPr>
-          </a:p>
-        </p:txBody>
-      </p:sp>
-      <p:sp>
-        <p:nvSpPr>
-          <p:cNvPr id="5" name="TextBox 4">
-            <a:extLst>
-              <a:ext uri="{FF2B5EF4-FFF2-40B4-BE49-F238E27FC236}">
-                <a16:creationId xmlns:a16="http://schemas.microsoft.com/office/drawing/2014/main" id="{B79E4B3C-E8F1-E038-CCA5-432D6846903A}"/>
-              </a:ext>
-            </a:extLst>
-          </p:cNvPr>
-          <p:cNvSpPr txBox="1"/>
-          <p:nvPr/>
-        </p:nvSpPr>
-        <p:spPr>
-          <a:xfrm>
-            <a:off x="179070" y="778476"/>
-            <a:ext cx="5758308" cy="523220"/>
-          </a:xfrm>
-          <a:prstGeom prst="rect">
-            <a:avLst/>
-          </a:prstGeom>
-          <a:noFill/>
-        </p:spPr>
-        <p:txBody>
-          <a:bodyPr wrap="none" rtlCol="0">
-            <a:spAutoFit/>
-          </a:bodyPr>
-          <a:lstStyle/>
-          <a:p>
-            <a:r>
-              <a:rPr kumimoji="1" lang="en-US" altLang="ko-Kore-KR" sz="2800" dirty="0"/>
-              <a:t>Function ( </a:t>
-            </a:r>
-            <a:r>
-              <a:rPr kumimoji="1" lang="ko-Kore-KR" altLang="en-US" sz="2800" dirty="0"/>
-              <a:t>함수</a:t>
-            </a:r>
-            <a:r>
-              <a:rPr kumimoji="1" lang="ko-KR" altLang="en-US" sz="2800" dirty="0"/>
-              <a:t> </a:t>
-            </a:r>
-            <a:r>
-              <a:rPr kumimoji="1" lang="en-US" altLang="ko-KR" sz="2800" dirty="0"/>
-              <a:t>)</a:t>
-            </a:r>
-            <a:r>
-              <a:rPr kumimoji="1" lang="ko-KR" altLang="en-US" sz="2800" dirty="0"/>
-              <a:t> </a:t>
-            </a:r>
-            <a:r>
-              <a:rPr kumimoji="1" lang="ko-KR" altLang="en-US" dirty="0"/>
-              <a:t> </a:t>
-            </a:r>
-            <a:r>
-              <a:rPr kumimoji="1" lang="ko-KR" altLang="en-US" dirty="0">
-                <a:solidFill>
-                  <a:schemeClr val="bg2">
-                    <a:lumMod val="75000"/>
-                  </a:schemeClr>
-                </a:solidFill>
-              </a:rPr>
-              <a:t>나중에 제대로 다시 다룰 예정</a:t>
-            </a:r>
-            <a:endParaRPr kumimoji="1" lang="ko-Kore-KR" altLang="en-US" dirty="0">
-              <a:solidFill>
-                <a:schemeClr val="bg2">
-                  <a:lumMod val="75000"/>
-                </a:schemeClr>
-              </a:solidFill>
-            </a:endParaRPr>
-          </a:p>
-        </p:txBody>
-      </p:sp>
-      <p:pic>
-        <p:nvPicPr>
-          <p:cNvPr id="6" name="그림 5" descr="텍스트, 스크린샷, 저울이(가) 표시된 사진&#10;&#10;자동 생성된 설명">
-            <a:extLst>
-              <a:ext uri="{FF2B5EF4-FFF2-40B4-BE49-F238E27FC236}">
-                <a16:creationId xmlns:a16="http://schemas.microsoft.com/office/drawing/2014/main" id="{2B734C3A-4BCC-9DA1-6AAA-DF4ADE639307}"/>
-              </a:ext>
-            </a:extLst>
-          </p:cNvPr>
-          <p:cNvPicPr>
-            <a:picLocks noChangeAspect="1"/>
-          </p:cNvPicPr>
-          <p:nvPr/>
-        </p:nvPicPr>
-        <p:blipFill>
-          <a:blip r:embed="rId2"/>
-          <a:stretch>
-            <a:fillRect/>
-          </a:stretch>
-        </p:blipFill>
-        <p:spPr>
-          <a:xfrm>
-            <a:off x="373048" y="1352384"/>
-            <a:ext cx="6020180" cy="4646447"/>
-          </a:xfrm>
-          <a:prstGeom prst="rect">
-            <a:avLst/>
-          </a:prstGeom>
-        </p:spPr>
-      </p:pic>
-      <p:sp>
-        <p:nvSpPr>
-          <p:cNvPr id="10" name="직사각형 9">
-            <a:extLst>
-              <a:ext uri="{FF2B5EF4-FFF2-40B4-BE49-F238E27FC236}">
-                <a16:creationId xmlns:a16="http://schemas.microsoft.com/office/drawing/2014/main" id="{EBE088EF-D08A-CA29-575A-132621AD3177}"/>
-              </a:ext>
-            </a:extLst>
-          </p:cNvPr>
-          <p:cNvSpPr/>
-          <p:nvPr/>
-        </p:nvSpPr>
-        <p:spPr>
-          <a:xfrm>
-            <a:off x="2023110" y="2011680"/>
-            <a:ext cx="2720208" cy="228600"/>
-          </a:xfrm>
-          <a:prstGeom prst="rect">
-            <a:avLst/>
-          </a:prstGeom>
-          <a:solidFill>
-            <a:schemeClr val="accent4">
-              <a:lumMod val="20000"/>
-              <a:lumOff val="80000"/>
-              <a:alpha val="47780"/>
-            </a:schemeClr>
-          </a:solidFill>
-          <a:ln>
-            <a:noFill/>
-          </a:ln>
-        </p:spPr>
-        <p:style>
-          <a:lnRef idx="2">
-            <a:schemeClr val="accent1">
-              <a:shade val="15000"/>
-            </a:schemeClr>
-          </a:lnRef>
-          <a:fillRef idx="1">
-            <a:schemeClr val="accent1"/>
-          </a:fillRef>
-          <a:effectRef idx="0">
-            <a:schemeClr val="accent1"/>
-          </a:effectRef>
-          <a:fontRef idx="minor">
-            <a:schemeClr val="lt1"/>
-          </a:fontRef>
-        </p:style>
-        <p:txBody>
-          <a:bodyPr rtlCol="0" anchor="ctr"/>
-          <a:lstStyle/>
-          <a:p>
-            <a:pPr algn="ctr"/>
-            <a:endParaRPr kumimoji="1" lang="ko-Kore-KR" altLang="en-US" dirty="0"/>
-          </a:p>
-        </p:txBody>
-      </p:sp>
-      <p:sp>
-        <p:nvSpPr>
-          <p:cNvPr id="11" name="직사각형 10">
-            <a:extLst>
-              <a:ext uri="{FF2B5EF4-FFF2-40B4-BE49-F238E27FC236}">
-                <a16:creationId xmlns:a16="http://schemas.microsoft.com/office/drawing/2014/main" id="{ADF9563C-F194-6507-9BBE-7939A0906586}"/>
-              </a:ext>
-            </a:extLst>
-          </p:cNvPr>
-          <p:cNvSpPr/>
-          <p:nvPr/>
-        </p:nvSpPr>
-        <p:spPr>
-          <a:xfrm>
-            <a:off x="889044" y="3670998"/>
-            <a:ext cx="631146" cy="352362"/>
-          </a:xfrm>
-          <a:prstGeom prst="rect">
-            <a:avLst/>
-          </a:prstGeom>
-          <a:solidFill>
-            <a:schemeClr val="accent4">
-              <a:lumMod val="20000"/>
-              <a:lumOff val="80000"/>
-              <a:alpha val="47780"/>
-            </a:schemeClr>
-          </a:solidFill>
-          <a:ln>
-            <a:noFill/>
-          </a:ln>
-        </p:spPr>
-        <p:style>
-          <a:lnRef idx="2">
-            <a:schemeClr val="accent1">
-              <a:shade val="15000"/>
-            </a:schemeClr>
-          </a:lnRef>
-          <a:fillRef idx="1">
-            <a:schemeClr val="accent1"/>
-          </a:fillRef>
-          <a:effectRef idx="0">
-            <a:schemeClr val="accent1"/>
-          </a:effectRef>
-          <a:fontRef idx="minor">
-            <a:schemeClr val="lt1"/>
-          </a:fontRef>
-        </p:style>
-        <p:txBody>
-          <a:bodyPr rtlCol="0" anchor="ctr"/>
-          <a:lstStyle/>
-          <a:p>
-            <a:pPr algn="ctr"/>
-            <a:endParaRPr kumimoji="1" lang="ko-Kore-KR" altLang="en-US" dirty="0"/>
-          </a:p>
-        </p:txBody>
-      </p:sp>
-      <p:sp>
-        <p:nvSpPr>
-          <p:cNvPr id="13" name="직사각형 12">
-            <a:extLst>
-              <a:ext uri="{FF2B5EF4-FFF2-40B4-BE49-F238E27FC236}">
-                <a16:creationId xmlns:a16="http://schemas.microsoft.com/office/drawing/2014/main" id="{64509E5B-608B-D589-B81C-D717B111652D}"/>
-              </a:ext>
-            </a:extLst>
-          </p:cNvPr>
-          <p:cNvSpPr/>
-          <p:nvPr/>
-        </p:nvSpPr>
-        <p:spPr>
-          <a:xfrm>
-            <a:off x="6629400" y="939746"/>
-            <a:ext cx="4983480" cy="4866694"/>
-          </a:xfrm>
-          <a:prstGeom prst="rect">
-            <a:avLst/>
-          </a:prstGeom>
-        </p:spPr>
-        <p:style>
-          <a:lnRef idx="2">
-            <a:schemeClr val="accent6"/>
-          </a:lnRef>
-          <a:fillRef idx="1">
-            <a:schemeClr val="lt1"/>
-          </a:fillRef>
-          <a:effectRef idx="0">
-            <a:schemeClr val="accent6"/>
-          </a:effectRef>
-          <a:fontRef idx="minor">
-            <a:schemeClr val="dk1"/>
-          </a:fontRef>
-        </p:style>
-        <p:txBody>
-          <a:bodyPr rtlCol="0" anchor="ctr"/>
-          <a:lstStyle/>
-          <a:p>
-            <a:pPr marL="342900" indent="-342900" algn="ctr">
-              <a:buAutoNum type="arabicPeriod"/>
-            </a:pPr>
-            <a:r>
-              <a:rPr kumimoji="1" lang="ko-KR" altLang="en-US" dirty="0"/>
-              <a:t>빨래 용량에 따라 물 높이 설정 </a:t>
-            </a:r>
-            <a:endParaRPr kumimoji="1" lang="en-US" altLang="ko-KR" dirty="0"/>
-          </a:p>
-          <a:p>
-            <a:pPr marL="342900" indent="-342900" algn="ctr">
-              <a:buAutoNum type="arabicPeriod"/>
-            </a:pPr>
-            <a:r>
-              <a:rPr kumimoji="1" lang="ko-KR" altLang="en-US" dirty="0"/>
-              <a:t>물이 가득 채워지고 </a:t>
-            </a:r>
-            <a:r>
-              <a:rPr kumimoji="1" lang="en-US" altLang="ko-KR" dirty="0"/>
-              <a:t>10</a:t>
-            </a:r>
-            <a:r>
-              <a:rPr kumimoji="1" lang="ko-KR" altLang="en-US" dirty="0"/>
-              <a:t>분 동안 대기상태</a:t>
-            </a:r>
-            <a:endParaRPr kumimoji="1" lang="en-US" altLang="ko-KR" dirty="0"/>
-          </a:p>
-          <a:p>
-            <a:pPr marL="342900" indent="-342900" algn="ctr">
-              <a:buAutoNum type="arabicPeriod"/>
-            </a:pPr>
-            <a:r>
-              <a:rPr kumimoji="1" lang="ko-KR" altLang="en-US" dirty="0"/>
-              <a:t>세제 투입</a:t>
-            </a:r>
-            <a:endParaRPr kumimoji="1" lang="en-US" altLang="ko-KR" dirty="0"/>
-          </a:p>
-          <a:p>
-            <a:pPr marL="342900" indent="-342900" algn="ctr">
-              <a:buAutoNum type="arabicPeriod"/>
-            </a:pPr>
-            <a:r>
-              <a:rPr kumimoji="1" lang="ko-KR" altLang="en-US" dirty="0"/>
-              <a:t>섬유유연제 투입</a:t>
-            </a:r>
-            <a:endParaRPr kumimoji="1" lang="en-US" altLang="ko-KR" dirty="0"/>
-          </a:p>
-          <a:p>
-            <a:pPr marL="342900" indent="-342900" algn="ctr">
-              <a:buAutoNum type="arabicPeriod"/>
-            </a:pPr>
-            <a:r>
-              <a:rPr kumimoji="1" lang="en-US" altLang="ko-KR" dirty="0"/>
-              <a:t>25</a:t>
-            </a:r>
-            <a:r>
-              <a:rPr kumimoji="1" lang="ko-KR" altLang="en-US" dirty="0"/>
-              <a:t>분간 </a:t>
-            </a:r>
-            <a:r>
-              <a:rPr kumimoji="1" lang="en-US" altLang="ko-KR" dirty="0"/>
-              <a:t>60rpm </a:t>
-            </a:r>
-            <a:r>
-              <a:rPr kumimoji="1" lang="ko-KR" altLang="en-US" dirty="0" err="1"/>
-              <a:t>으로</a:t>
-            </a:r>
-            <a:r>
-              <a:rPr kumimoji="1" lang="ko-KR" altLang="en-US" dirty="0"/>
-              <a:t> 회전</a:t>
-            </a:r>
-            <a:endParaRPr kumimoji="1" lang="en-US" altLang="ko-KR" dirty="0"/>
-          </a:p>
-          <a:p>
-            <a:pPr marL="342900" indent="-342900" algn="ctr">
-              <a:buAutoNum type="arabicPeriod"/>
-            </a:pPr>
-            <a:r>
-              <a:rPr kumimoji="1" lang="ko-KR" altLang="en-US" dirty="0"/>
-              <a:t>물 배출</a:t>
-            </a:r>
-            <a:endParaRPr kumimoji="1" lang="en-US" altLang="ko-KR" dirty="0"/>
-          </a:p>
-          <a:p>
-            <a:pPr marL="342900" indent="-342900" algn="ctr">
-              <a:buAutoNum type="arabicPeriod"/>
-            </a:pPr>
-            <a:r>
-              <a:rPr kumimoji="1" lang="ko-KR" altLang="en-US" dirty="0"/>
-              <a:t>물 가득 채우기</a:t>
-            </a:r>
-            <a:endParaRPr kumimoji="1" lang="en-US" altLang="ko-KR" dirty="0"/>
-          </a:p>
-          <a:p>
-            <a:pPr marL="342900" indent="-342900" algn="ctr">
-              <a:buAutoNum type="arabicPeriod"/>
-            </a:pPr>
-            <a:r>
-              <a:rPr kumimoji="1" lang="en-US" altLang="ko-KR" dirty="0"/>
-              <a:t>20</a:t>
-            </a:r>
-            <a:r>
-              <a:rPr kumimoji="1" lang="ko-KR" altLang="en-US" dirty="0"/>
-              <a:t>분간 </a:t>
-            </a:r>
-            <a:r>
-              <a:rPr kumimoji="1" lang="en-US" altLang="ko-KR" dirty="0"/>
-              <a:t>60rpm </a:t>
-            </a:r>
-            <a:r>
-              <a:rPr kumimoji="1" lang="ko-KR" altLang="en-US" dirty="0" err="1"/>
-              <a:t>으로</a:t>
-            </a:r>
-            <a:r>
-              <a:rPr kumimoji="1" lang="ko-KR" altLang="en-US" dirty="0"/>
-              <a:t> 회전</a:t>
-            </a:r>
-            <a:endParaRPr kumimoji="1" lang="en-US" altLang="ko-KR" dirty="0"/>
-          </a:p>
-          <a:p>
-            <a:pPr marL="342900" indent="-342900" algn="ctr">
-              <a:buAutoNum type="arabicPeriod"/>
-            </a:pPr>
-            <a:r>
-              <a:rPr kumimoji="1" lang="ko-KR" altLang="en-US" dirty="0"/>
-              <a:t>물 배출</a:t>
-            </a:r>
-            <a:endParaRPr kumimoji="1" lang="en-US" altLang="ko-KR" dirty="0"/>
-          </a:p>
-          <a:p>
-            <a:pPr marL="342900" indent="-342900" algn="ctr">
-              <a:buAutoNum type="arabicPeriod"/>
-            </a:pPr>
-            <a:r>
-              <a:rPr kumimoji="1" lang="ko-KR" altLang="en-US" dirty="0"/>
-              <a:t>탈수를 위한 </a:t>
-            </a:r>
-            <a:r>
-              <a:rPr kumimoji="1" lang="en-US" altLang="ko-KR" dirty="0"/>
-              <a:t>120rpm </a:t>
-            </a:r>
-            <a:r>
-              <a:rPr kumimoji="1" lang="ko-KR" altLang="en-US" dirty="0" err="1"/>
-              <a:t>으로</a:t>
-            </a:r>
-            <a:r>
-              <a:rPr kumimoji="1" lang="ko-KR" altLang="en-US" dirty="0"/>
-              <a:t> </a:t>
-            </a:r>
-            <a:r>
-              <a:rPr kumimoji="1" lang="en-US" altLang="ko-KR" dirty="0"/>
-              <a:t>20</a:t>
-            </a:r>
-            <a:r>
-              <a:rPr kumimoji="1" lang="ko-KR" altLang="en-US" dirty="0"/>
-              <a:t>분간 회전</a:t>
-            </a:r>
-            <a:endParaRPr kumimoji="1" lang="en-US" altLang="ko-KR" dirty="0"/>
-          </a:p>
-          <a:p>
-            <a:pPr marL="342900" indent="-342900" algn="ctr">
-              <a:buAutoNum type="arabicPeriod"/>
-            </a:pPr>
-            <a:endParaRPr kumimoji="1" lang="en-US" altLang="ko-KR" dirty="0"/>
-          </a:p>
-        </p:txBody>
-      </p:sp>
-      <p:pic>
-        <p:nvPicPr>
-          <p:cNvPr id="14" name="그림 13" descr="텍스트, 스크린샷, 디자인, 폰트이(가) 표시된 사진&#10;&#10;자동 생성된 설명">
-            <a:extLst>
-              <a:ext uri="{FF2B5EF4-FFF2-40B4-BE49-F238E27FC236}">
-                <a16:creationId xmlns:a16="http://schemas.microsoft.com/office/drawing/2014/main" id="{53485FD2-A77D-857F-DB5C-0A0548BDEB30}"/>
-              </a:ext>
-            </a:extLst>
-          </p:cNvPr>
-          <p:cNvPicPr>
-            <a:picLocks noChangeAspect="1"/>
-          </p:cNvPicPr>
-          <p:nvPr/>
-        </p:nvPicPr>
-        <p:blipFill rotWithShape="1">
-          <a:blip r:embed="rId3"/>
-          <a:srcRect l="21678" b="10953"/>
-          <a:stretch/>
-        </p:blipFill>
-        <p:spPr>
-          <a:xfrm>
-            <a:off x="8769918" y="420677"/>
-            <a:ext cx="1220387" cy="909049"/>
-          </a:xfrm>
-          <a:prstGeom prst="rect">
-            <a:avLst/>
-          </a:prstGeom>
-        </p:spPr>
-      </p:pic>
-      <p:pic>
-        <p:nvPicPr>
-          <p:cNvPr id="16" name="그림 15" descr="텍스트, 병, 플라스틱, 플라스틱 병이(가) 표시된 사진&#10;&#10;자동 생성된 설명">
-            <a:extLst>
-              <a:ext uri="{FF2B5EF4-FFF2-40B4-BE49-F238E27FC236}">
-                <a16:creationId xmlns:a16="http://schemas.microsoft.com/office/drawing/2014/main" id="{4F9D4840-01C8-235E-BE1E-12788A7340AD}"/>
-              </a:ext>
-            </a:extLst>
-          </p:cNvPr>
-          <p:cNvPicPr>
-            <a:picLocks noChangeAspect="1"/>
-          </p:cNvPicPr>
-          <p:nvPr/>
-        </p:nvPicPr>
-        <p:blipFill>
-          <a:blip r:embed="rId4"/>
-          <a:stretch>
-            <a:fillRect/>
-          </a:stretch>
-        </p:blipFill>
-        <p:spPr>
-          <a:xfrm>
-            <a:off x="6854321" y="560939"/>
-            <a:ext cx="716280" cy="791445"/>
-          </a:xfrm>
-          <a:prstGeom prst="rect">
-            <a:avLst/>
-          </a:prstGeom>
-        </p:spPr>
-      </p:pic>
-      <p:pic>
-        <p:nvPicPr>
-          <p:cNvPr id="18" name="Picture 2" descr="하얀생활 세탁세제 2.7L (4개) : 다나와 가격비교">
-            <a:extLst>
-              <a:ext uri="{FF2B5EF4-FFF2-40B4-BE49-F238E27FC236}">
-                <a16:creationId xmlns:a16="http://schemas.microsoft.com/office/drawing/2014/main" id="{FC03E866-2172-DEC5-D022-0567E175739D}"/>
-              </a:ext>
-            </a:extLst>
-          </p:cNvPr>
-          <p:cNvPicPr>
-            <a:picLocks noChangeAspect="1" noChangeArrowheads="1"/>
-          </p:cNvPicPr>
-          <p:nvPr/>
-        </p:nvPicPr>
-        <p:blipFill>
-          <a:blip r:embed="rId5">
-            <a:extLst>
-              <a:ext uri="{28A0092B-C50C-407E-A947-70E740481C1C}">
-                <a14:useLocalDpi xmlns:a14="http://schemas.microsoft.com/office/drawing/2010/main" val="0"/>
-              </a:ext>
-            </a:extLst>
-          </a:blip>
-          <a:srcRect/>
-          <a:stretch>
-            <a:fillRect/>
-          </a:stretch>
-        </p:blipFill>
-        <p:spPr bwMode="auto">
-          <a:xfrm>
-            <a:off x="7570601" y="545290"/>
-            <a:ext cx="738224" cy="738224"/>
-          </a:xfrm>
-          <a:prstGeom prst="rect">
-            <a:avLst/>
-          </a:prstGeom>
-          <a:noFill/>
-          <a:extLst>
-            <a:ext uri="{909E8E84-426E-40DD-AFC4-6F175D3DCCD1}">
-              <a14:hiddenFill xmlns:a14="http://schemas.microsoft.com/office/drawing/2010/main">
-                <a:solidFill>
-                  <a:srgbClr val="FFFFFF"/>
-                </a:solidFill>
-              </a14:hiddenFill>
-            </a:ext>
-          </a:extLst>
-        </p:spPr>
-      </p:pic>
-      <p:sp>
-        <p:nvSpPr>
-          <p:cNvPr id="20" name="모서리가 둥근 직사각형 19">
-            <a:extLst>
-              <a:ext uri="{FF2B5EF4-FFF2-40B4-BE49-F238E27FC236}">
-                <a16:creationId xmlns:a16="http://schemas.microsoft.com/office/drawing/2014/main" id="{E34C20BE-B5D7-AD56-0649-A176238C7EC0}"/>
-              </a:ext>
-            </a:extLst>
-          </p:cNvPr>
-          <p:cNvSpPr/>
-          <p:nvPr/>
-        </p:nvSpPr>
-        <p:spPr>
-          <a:xfrm>
-            <a:off x="6629400" y="389238"/>
-            <a:ext cx="1915597" cy="1176672"/>
-          </a:xfrm>
-          <a:prstGeom prst="roundRect">
-            <a:avLst/>
-          </a:prstGeom>
-          <a:solidFill>
-            <a:schemeClr val="lt1">
-              <a:alpha val="0"/>
-            </a:schemeClr>
-          </a:solidFill>
-          <a:ln>
-            <a:solidFill>
-              <a:schemeClr val="accent4"/>
-            </a:solidFill>
-          </a:ln>
-        </p:spPr>
-        <p:style>
-          <a:lnRef idx="2">
-            <a:schemeClr val="accent4"/>
-          </a:lnRef>
-          <a:fillRef idx="1">
-            <a:schemeClr val="lt1"/>
-          </a:fillRef>
-          <a:effectRef idx="0">
-            <a:schemeClr val="accent4"/>
-          </a:effectRef>
-          <a:fontRef idx="minor">
-            <a:schemeClr val="dk1"/>
-          </a:fontRef>
-        </p:style>
-        <p:txBody>
-          <a:bodyPr rtlCol="0" anchor="ctr"/>
-          <a:lstStyle/>
-          <a:p>
-            <a:pPr algn="ctr"/>
-            <a:endParaRPr kumimoji="1" lang="ko-Kore-KR" altLang="en-US"/>
-          </a:p>
-        </p:txBody>
-      </p:sp>
-    </p:spTree>
-    <p:extLst>
-      <p:ext uri="{BB962C8B-B14F-4D97-AF65-F5344CB8AC3E}">
-        <p14:creationId xmlns:p14="http://schemas.microsoft.com/office/powerpoint/2010/main" val="320903362"/>
-      </p:ext>
-    </p:extLst>
-  </p:cSld>
-  <p:clrMapOvr>
-    <a:masterClrMapping/>
-  </p:clrMapOvr>
-</p:sld>
-</file>
-
-<file path=ppt/slides/slide20.xml><?xml version="1.0" encoding="utf-8"?>
+<file path=ppt/slides/slide22.xml><?xml version="1.0" encoding="utf-8"?>
 <p:sld xmlns:a="http://schemas.openxmlformats.org/drawingml/2006/main" xmlns:r="http://schemas.openxmlformats.org/officeDocument/2006/relationships" xmlns:p="http://schemas.openxmlformats.org/presentationml/2006/main">
   <p:cSld>
     <p:spTree>
@@ -13892,618 +14991,6 @@
           </a:p>
         </p:txBody>
       </p:sp>
-      <p:sp>
-        <p:nvSpPr>
-          <p:cNvPr id="8" name="수동 작업 7">
-            <a:extLst>
-              <a:ext uri="{FF2B5EF4-FFF2-40B4-BE49-F238E27FC236}">
-                <a16:creationId xmlns:a16="http://schemas.microsoft.com/office/drawing/2014/main" id="{2861B161-47B2-F6E8-D01B-DCD8CEF97FB8}"/>
-              </a:ext>
-            </a:extLst>
-          </p:cNvPr>
-          <p:cNvSpPr/>
-          <p:nvPr/>
-        </p:nvSpPr>
-        <p:spPr>
-          <a:xfrm>
-            <a:off x="4242904" y="1653098"/>
-            <a:ext cx="1181100" cy="910590"/>
-          </a:xfrm>
-          <a:prstGeom prst="flowChartManualOperation">
-            <a:avLst/>
-          </a:prstGeom>
-          <a:solidFill>
-            <a:schemeClr val="accent2">
-              <a:lumMod val="40000"/>
-              <a:lumOff val="60000"/>
-            </a:schemeClr>
-          </a:solidFill>
-          <a:ln>
-            <a:noFill/>
-          </a:ln>
-        </p:spPr>
-        <p:style>
-          <a:lnRef idx="2">
-            <a:schemeClr val="accent1">
-              <a:shade val="15000"/>
-            </a:schemeClr>
-          </a:lnRef>
-          <a:fillRef idx="1">
-            <a:schemeClr val="accent1"/>
-          </a:fillRef>
-          <a:effectRef idx="0">
-            <a:schemeClr val="accent1"/>
-          </a:effectRef>
-          <a:fontRef idx="minor">
-            <a:schemeClr val="lt1"/>
-          </a:fontRef>
-        </p:style>
-        <p:txBody>
-          <a:bodyPr rtlCol="0" anchor="ctr"/>
-          <a:lstStyle/>
-          <a:p>
-            <a:pPr algn="ctr"/>
-            <a:endParaRPr kumimoji="1" lang="ko-Kore-KR" altLang="en-US"/>
-          </a:p>
-        </p:txBody>
-      </p:sp>
-      <p:sp>
-        <p:nvSpPr>
-          <p:cNvPr id="12" name="수동 작업 11">
-            <a:extLst>
-              <a:ext uri="{FF2B5EF4-FFF2-40B4-BE49-F238E27FC236}">
-                <a16:creationId xmlns:a16="http://schemas.microsoft.com/office/drawing/2014/main" id="{7F8C17E2-D2AD-E60F-F002-E759C39E1F7D}"/>
-              </a:ext>
-            </a:extLst>
-          </p:cNvPr>
-          <p:cNvSpPr/>
-          <p:nvPr/>
-        </p:nvSpPr>
-        <p:spPr>
-          <a:xfrm rot="10800000">
-            <a:off x="6674559" y="3889898"/>
-            <a:ext cx="1181100" cy="910590"/>
-          </a:xfrm>
-          <a:prstGeom prst="flowChartManualOperation">
-            <a:avLst/>
-          </a:prstGeom>
-          <a:solidFill>
-            <a:schemeClr val="accent2">
-              <a:lumMod val="40000"/>
-              <a:lumOff val="60000"/>
-            </a:schemeClr>
-          </a:solidFill>
-          <a:ln>
-            <a:noFill/>
-          </a:ln>
-        </p:spPr>
-        <p:style>
-          <a:lnRef idx="2">
-            <a:schemeClr val="accent1">
-              <a:shade val="15000"/>
-            </a:schemeClr>
-          </a:lnRef>
-          <a:fillRef idx="1">
-            <a:schemeClr val="accent1"/>
-          </a:fillRef>
-          <a:effectRef idx="0">
-            <a:schemeClr val="accent1"/>
-          </a:effectRef>
-          <a:fontRef idx="minor">
-            <a:schemeClr val="lt1"/>
-          </a:fontRef>
-        </p:style>
-        <p:txBody>
-          <a:bodyPr rtlCol="0" anchor="ctr"/>
-          <a:lstStyle/>
-          <a:p>
-            <a:pPr algn="ctr"/>
-            <a:endParaRPr kumimoji="1" lang="ko-Kore-KR" altLang="en-US"/>
-          </a:p>
-        </p:txBody>
-      </p:sp>
-      <p:sp>
-        <p:nvSpPr>
-          <p:cNvPr id="15" name="직사각형 14">
-            <a:extLst>
-              <a:ext uri="{FF2B5EF4-FFF2-40B4-BE49-F238E27FC236}">
-                <a16:creationId xmlns:a16="http://schemas.microsoft.com/office/drawing/2014/main" id="{22B3786A-F2A1-7FCB-E0CD-74224F06AF1D}"/>
-              </a:ext>
-            </a:extLst>
-          </p:cNvPr>
-          <p:cNvSpPr/>
-          <p:nvPr/>
-        </p:nvSpPr>
-        <p:spPr>
-          <a:xfrm>
-            <a:off x="3918792" y="2548116"/>
-            <a:ext cx="4144661" cy="1341782"/>
-          </a:xfrm>
-          <a:prstGeom prst="rect">
-            <a:avLst/>
-          </a:prstGeom>
-          <a:solidFill>
-            <a:schemeClr val="accent2">
-              <a:lumMod val="40000"/>
-              <a:lumOff val="60000"/>
-            </a:schemeClr>
-          </a:solidFill>
-          <a:ln>
-            <a:noFill/>
-          </a:ln>
-        </p:spPr>
-        <p:style>
-          <a:lnRef idx="2">
-            <a:schemeClr val="accent1">
-              <a:shade val="15000"/>
-            </a:schemeClr>
-          </a:lnRef>
-          <a:fillRef idx="1">
-            <a:schemeClr val="accent1"/>
-          </a:fillRef>
-          <a:effectRef idx="0">
-            <a:schemeClr val="accent1"/>
-          </a:effectRef>
-          <a:fontRef idx="minor">
-            <a:schemeClr val="lt1"/>
-          </a:fontRef>
-        </p:style>
-        <p:txBody>
-          <a:bodyPr rtlCol="0" anchor="ctr"/>
-          <a:lstStyle/>
-          <a:p>
-            <a:pPr algn="ctr"/>
-            <a:r>
-              <a:rPr kumimoji="1" lang="en-US" altLang="ko-Kore-KR" dirty="0"/>
-              <a:t>Function</a:t>
-            </a:r>
-            <a:endParaRPr kumimoji="1" lang="ko-Kore-KR" altLang="en-US" dirty="0"/>
-          </a:p>
-        </p:txBody>
-      </p:sp>
-    </p:spTree>
-    <p:extLst>
-      <p:ext uri="{BB962C8B-B14F-4D97-AF65-F5344CB8AC3E}">
-        <p14:creationId xmlns:p14="http://schemas.microsoft.com/office/powerpoint/2010/main" val="980075055"/>
-      </p:ext>
-    </p:extLst>
-  </p:cSld>
-  <p:clrMapOvr>
-    <a:masterClrMapping/>
-  </p:clrMapOvr>
-</p:sld>
-</file>
-
-<file path=ppt/slides/slide4.xml><?xml version="1.0" encoding="utf-8"?>
-<p:sld xmlns:a="http://schemas.openxmlformats.org/drawingml/2006/main" xmlns:r="http://schemas.openxmlformats.org/officeDocument/2006/relationships" xmlns:p="http://schemas.openxmlformats.org/presentationml/2006/main">
-  <p:cSld>
-    <p:spTree>
-      <p:nvGrpSpPr>
-        <p:cNvPr id="1" name=""/>
-        <p:cNvGrpSpPr/>
-        <p:nvPr/>
-      </p:nvGrpSpPr>
-      <p:grpSpPr>
-        <a:xfrm>
-          <a:off x="0" y="0"/>
-          <a:ext cx="0" cy="0"/>
-          <a:chOff x="0" y="0"/>
-          <a:chExt cx="0" cy="0"/>
-        </a:xfrm>
-      </p:grpSpPr>
-      <p:sp>
-        <p:nvSpPr>
-          <p:cNvPr id="7" name="직사각형 6">
-            <a:extLst>
-              <a:ext uri="{FF2B5EF4-FFF2-40B4-BE49-F238E27FC236}">
-                <a16:creationId xmlns:a16="http://schemas.microsoft.com/office/drawing/2014/main" id="{281491D1-B6E8-3BFB-42CF-945A32013856}"/>
-              </a:ext>
-            </a:extLst>
-          </p:cNvPr>
-          <p:cNvSpPr/>
-          <p:nvPr/>
-        </p:nvSpPr>
-        <p:spPr>
-          <a:xfrm>
-            <a:off x="-30480" y="6461759"/>
-            <a:ext cx="12240000" cy="454047"/>
-          </a:xfrm>
-          <a:prstGeom prst="rect">
-            <a:avLst/>
-          </a:prstGeom>
-          <a:solidFill>
-            <a:schemeClr val="accent1">
-              <a:alpha val="34949"/>
-            </a:schemeClr>
-          </a:solidFill>
-          <a:ln>
-            <a:noFill/>
-          </a:ln>
-        </p:spPr>
-        <p:style>
-          <a:lnRef idx="2">
-            <a:schemeClr val="accent1">
-              <a:shade val="15000"/>
-            </a:schemeClr>
-          </a:lnRef>
-          <a:fillRef idx="1">
-            <a:schemeClr val="accent1"/>
-          </a:fillRef>
-          <a:effectRef idx="0">
-            <a:schemeClr val="accent1"/>
-          </a:effectRef>
-          <a:fontRef idx="minor">
-            <a:schemeClr val="lt1"/>
-          </a:fontRef>
-        </p:style>
-        <p:txBody>
-          <a:bodyPr rtlCol="0" anchor="ctr"/>
-          <a:lstStyle/>
-          <a:p>
-            <a:pPr algn="ctr"/>
-            <a:endParaRPr kumimoji="1" lang="ko-Kore-KR" altLang="en-US" dirty="0"/>
-          </a:p>
-        </p:txBody>
-      </p:sp>
-      <p:sp>
-        <p:nvSpPr>
-          <p:cNvPr id="2" name="제목 1">
-            <a:extLst>
-              <a:ext uri="{FF2B5EF4-FFF2-40B4-BE49-F238E27FC236}">
-                <a16:creationId xmlns:a16="http://schemas.microsoft.com/office/drawing/2014/main" id="{5B025642-B38D-A74A-8F24-F7D52B9A84CE}"/>
-              </a:ext>
-            </a:extLst>
-          </p:cNvPr>
-          <p:cNvSpPr>
-            <a:spLocks noGrp="1"/>
-          </p:cNvSpPr>
-          <p:nvPr>
-            <p:ph type="ctrTitle"/>
-          </p:nvPr>
-        </p:nvSpPr>
-        <p:spPr>
-          <a:xfrm>
-            <a:off x="-332127" y="6792119"/>
-            <a:ext cx="3941379" cy="131762"/>
-          </a:xfrm>
-        </p:spPr>
-        <p:txBody>
-          <a:bodyPr>
-            <a:noAutofit/>
-          </a:bodyPr>
-          <a:lstStyle/>
-          <a:p>
-            <a:r>
-              <a:rPr lang="en-US" altLang="ko-Kore-KR" sz="2000" dirty="0" err="1">
-                <a:solidFill>
-                  <a:srgbClr val="7030A0"/>
-                </a:solidFill>
-              </a:rPr>
-              <a:t>SangMyeong</a:t>
-            </a:r>
-            <a:r>
-              <a:rPr lang="en-US" altLang="ko-Kore-KR" sz="2000" dirty="0">
-                <a:solidFill>
-                  <a:srgbClr val="7030A0"/>
-                </a:solidFill>
-              </a:rPr>
-              <a:t> Coding Education</a:t>
-            </a:r>
-            <a:endParaRPr lang="ko-Kore-KR" sz="2000" dirty="0">
-              <a:solidFill>
-                <a:srgbClr val="7030A0"/>
-              </a:solidFill>
-            </a:endParaRPr>
-          </a:p>
-        </p:txBody>
-      </p:sp>
-      <p:sp>
-        <p:nvSpPr>
-          <p:cNvPr id="3" name="부제목 2">
-            <a:extLst>
-              <a:ext uri="{FF2B5EF4-FFF2-40B4-BE49-F238E27FC236}">
-                <a16:creationId xmlns:a16="http://schemas.microsoft.com/office/drawing/2014/main" id="{F05A16A8-C921-DD4F-8509-1F06F45DEDD3}"/>
-              </a:ext>
-            </a:extLst>
-          </p:cNvPr>
-          <p:cNvSpPr>
-            <a:spLocks noGrp="1"/>
-          </p:cNvSpPr>
-          <p:nvPr>
-            <p:ph type="subTitle" idx="1"/>
-          </p:nvPr>
-        </p:nvSpPr>
-        <p:spPr>
-          <a:xfrm>
-            <a:off x="4743318" y="6512447"/>
-            <a:ext cx="2827283" cy="467903"/>
-          </a:xfrm>
-        </p:spPr>
-        <p:txBody>
-          <a:bodyPr>
-            <a:normAutofit/>
-          </a:bodyPr>
-          <a:lstStyle/>
-          <a:p>
-            <a:r>
-              <a:rPr lang="en-US" altLang="ko-KR" dirty="0"/>
-              <a:t>Function</a:t>
-            </a:r>
-            <a:endParaRPr lang="ko-Kore-KR" altLang="ko-Kore-KR" dirty="0"/>
-          </a:p>
-        </p:txBody>
-      </p:sp>
-      <p:sp>
-        <p:nvSpPr>
-          <p:cNvPr id="4" name="제목 1">
-            <a:extLst>
-              <a:ext uri="{FF2B5EF4-FFF2-40B4-BE49-F238E27FC236}">
-                <a16:creationId xmlns:a16="http://schemas.microsoft.com/office/drawing/2014/main" id="{AAA94350-F7A7-7F4D-9274-C4E68FEFACC2}"/>
-              </a:ext>
-            </a:extLst>
-          </p:cNvPr>
-          <p:cNvSpPr txBox="1">
-            <a:spLocks/>
-          </p:cNvSpPr>
-          <p:nvPr/>
-        </p:nvSpPr>
-        <p:spPr>
-          <a:xfrm>
-            <a:off x="11216640" y="6858000"/>
-            <a:ext cx="1069954" cy="57807"/>
-          </a:xfrm>
-          <a:prstGeom prst="rect">
-            <a:avLst/>
-          </a:prstGeom>
-        </p:spPr>
-        <p:txBody>
-          <a:bodyPr vert="horz" lIns="91440" tIns="45720" rIns="91440" bIns="45720" rtlCol="0" anchor="b">
-            <a:noAutofit/>
-          </a:bodyPr>
-          <a:lstStyle>
-            <a:lvl1pPr algn="ctr" defTabSz="914400" rtl="0" eaLnBrk="1" latinLnBrk="0" hangingPunct="1">
-              <a:lnSpc>
-                <a:spcPct val="90000"/>
-              </a:lnSpc>
-              <a:spcBef>
-                <a:spcPct val="0"/>
-              </a:spcBef>
-              <a:buNone/>
-              <a:defRPr sz="6000" kern="1200">
-                <a:solidFill>
-                  <a:schemeClr val="tx1"/>
-                </a:solidFill>
-                <a:latin typeface="+mj-lt"/>
-                <a:ea typeface="+mj-ea"/>
-                <a:cs typeface="+mj-cs"/>
-              </a:defRPr>
-            </a:lvl1pPr>
-          </a:lstStyle>
-          <a:p>
-            <a:r>
-              <a:rPr lang="en-US" sz="2400" dirty="0">
-                <a:solidFill>
-                  <a:srgbClr val="00B050"/>
-                </a:solidFill>
-              </a:rPr>
-              <a:t>week 4</a:t>
-            </a:r>
-            <a:endParaRPr lang="ko-Kore-KR" sz="2400" dirty="0">
-              <a:solidFill>
-                <a:srgbClr val="00B050"/>
-              </a:solidFill>
-            </a:endParaRPr>
-          </a:p>
-        </p:txBody>
-      </p:sp>
-      <p:sp>
-        <p:nvSpPr>
-          <p:cNvPr id="9" name="부제목 2">
-            <a:extLst>
-              <a:ext uri="{FF2B5EF4-FFF2-40B4-BE49-F238E27FC236}">
-                <a16:creationId xmlns:a16="http://schemas.microsoft.com/office/drawing/2014/main" id="{618387EB-79C7-B848-8C39-392B62BF4926}"/>
-              </a:ext>
-            </a:extLst>
-          </p:cNvPr>
-          <p:cNvSpPr txBox="1">
-            <a:spLocks/>
-          </p:cNvSpPr>
-          <p:nvPr/>
-        </p:nvSpPr>
-        <p:spPr>
-          <a:xfrm>
-            <a:off x="-1289789" y="0"/>
-            <a:ext cx="4899041" cy="778476"/>
-          </a:xfrm>
-          <a:prstGeom prst="rect">
-            <a:avLst/>
-          </a:prstGeom>
-        </p:spPr>
-        <p:txBody>
-          <a:bodyPr vert="horz" lIns="91440" tIns="45720" rIns="91440" bIns="45720" rtlCol="0">
-            <a:normAutofit/>
-          </a:bodyPr>
-          <a:lstStyle>
-            <a:lvl1pPr marL="0" indent="0" algn="ctr" defTabSz="914400" rtl="0" eaLnBrk="1" latinLnBrk="0" hangingPunct="1">
-              <a:lnSpc>
-                <a:spcPct val="90000"/>
-              </a:lnSpc>
-              <a:spcBef>
-                <a:spcPts val="1000"/>
-              </a:spcBef>
-              <a:buFont typeface="Arial" panose="020B0604020202020204" pitchFamily="34" charset="0"/>
-              <a:buNone/>
-              <a:defRPr sz="2400" kern="1200">
-                <a:solidFill>
-                  <a:schemeClr val="tx1"/>
-                </a:solidFill>
-                <a:latin typeface="+mn-lt"/>
-                <a:ea typeface="+mn-ea"/>
-                <a:cs typeface="+mn-cs"/>
-              </a:defRPr>
-            </a:lvl1pPr>
-            <a:lvl2pPr marL="457200" indent="0" algn="ctr" defTabSz="914400" rtl="0" eaLnBrk="1" latinLnBrk="0" hangingPunct="1">
-              <a:lnSpc>
-                <a:spcPct val="90000"/>
-              </a:lnSpc>
-              <a:spcBef>
-                <a:spcPts val="500"/>
-              </a:spcBef>
-              <a:buFont typeface="Arial" panose="020B0604020202020204" pitchFamily="34" charset="0"/>
-              <a:buNone/>
-              <a:defRPr sz="2000" kern="1200">
-                <a:solidFill>
-                  <a:schemeClr val="tx1"/>
-                </a:solidFill>
-                <a:latin typeface="+mn-lt"/>
-                <a:ea typeface="+mn-ea"/>
-                <a:cs typeface="+mn-cs"/>
-              </a:defRPr>
-            </a:lvl2pPr>
-            <a:lvl3pPr marL="914400" indent="0" algn="ctr" defTabSz="914400" rtl="0" eaLnBrk="1" latinLnBrk="0" hangingPunct="1">
-              <a:lnSpc>
-                <a:spcPct val="90000"/>
-              </a:lnSpc>
-              <a:spcBef>
-                <a:spcPts val="500"/>
-              </a:spcBef>
-              <a:buFont typeface="Arial" panose="020B0604020202020204" pitchFamily="34" charset="0"/>
-              <a:buNone/>
-              <a:defRPr sz="1800" kern="1200">
-                <a:solidFill>
-                  <a:schemeClr val="tx1"/>
-                </a:solidFill>
-                <a:latin typeface="+mn-lt"/>
-                <a:ea typeface="+mn-ea"/>
-                <a:cs typeface="+mn-cs"/>
-              </a:defRPr>
-            </a:lvl3pPr>
-            <a:lvl4pPr marL="1371600" indent="0" algn="ctr" defTabSz="914400" rtl="0" eaLnBrk="1" latinLnBrk="0" hangingPunct="1">
-              <a:lnSpc>
-                <a:spcPct val="90000"/>
-              </a:lnSpc>
-              <a:spcBef>
-                <a:spcPts val="500"/>
-              </a:spcBef>
-              <a:buFont typeface="Arial" panose="020B0604020202020204" pitchFamily="34" charset="0"/>
-              <a:buNone/>
-              <a:defRPr sz="1600" kern="1200">
-                <a:solidFill>
-                  <a:schemeClr val="tx1"/>
-                </a:solidFill>
-                <a:latin typeface="+mn-lt"/>
-                <a:ea typeface="+mn-ea"/>
-                <a:cs typeface="+mn-cs"/>
-              </a:defRPr>
-            </a:lvl4pPr>
-            <a:lvl5pPr marL="1828800" indent="0" algn="ctr" defTabSz="914400" rtl="0" eaLnBrk="1" latinLnBrk="0" hangingPunct="1">
-              <a:lnSpc>
-                <a:spcPct val="90000"/>
-              </a:lnSpc>
-              <a:spcBef>
-                <a:spcPts val="500"/>
-              </a:spcBef>
-              <a:buFont typeface="Arial" panose="020B0604020202020204" pitchFamily="34" charset="0"/>
-              <a:buNone/>
-              <a:defRPr sz="1600" kern="1200">
-                <a:solidFill>
-                  <a:schemeClr val="tx1"/>
-                </a:solidFill>
-                <a:latin typeface="+mn-lt"/>
-                <a:ea typeface="+mn-ea"/>
-                <a:cs typeface="+mn-cs"/>
-              </a:defRPr>
-            </a:lvl5pPr>
-            <a:lvl6pPr marL="2286000" indent="0" algn="ctr" defTabSz="914400" rtl="0" eaLnBrk="1" latinLnBrk="0" hangingPunct="1">
-              <a:lnSpc>
-                <a:spcPct val="90000"/>
-              </a:lnSpc>
-              <a:spcBef>
-                <a:spcPts val="500"/>
-              </a:spcBef>
-              <a:buFont typeface="Arial" panose="020B0604020202020204" pitchFamily="34" charset="0"/>
-              <a:buNone/>
-              <a:defRPr sz="1600" kern="1200">
-                <a:solidFill>
-                  <a:schemeClr val="tx1"/>
-                </a:solidFill>
-                <a:latin typeface="+mn-lt"/>
-                <a:ea typeface="+mn-ea"/>
-                <a:cs typeface="+mn-cs"/>
-              </a:defRPr>
-            </a:lvl6pPr>
-            <a:lvl7pPr marL="2743200" indent="0" algn="ctr" defTabSz="914400" rtl="0" eaLnBrk="1" latinLnBrk="0" hangingPunct="1">
-              <a:lnSpc>
-                <a:spcPct val="90000"/>
-              </a:lnSpc>
-              <a:spcBef>
-                <a:spcPts val="500"/>
-              </a:spcBef>
-              <a:buFont typeface="Arial" panose="020B0604020202020204" pitchFamily="34" charset="0"/>
-              <a:buNone/>
-              <a:defRPr sz="1600" kern="1200">
-                <a:solidFill>
-                  <a:schemeClr val="tx1"/>
-                </a:solidFill>
-                <a:latin typeface="+mn-lt"/>
-                <a:ea typeface="+mn-ea"/>
-                <a:cs typeface="+mn-cs"/>
-              </a:defRPr>
-            </a:lvl7pPr>
-            <a:lvl8pPr marL="3200400" indent="0" algn="ctr" defTabSz="914400" rtl="0" eaLnBrk="1" latinLnBrk="0" hangingPunct="1">
-              <a:lnSpc>
-                <a:spcPct val="90000"/>
-              </a:lnSpc>
-              <a:spcBef>
-                <a:spcPts val="500"/>
-              </a:spcBef>
-              <a:buFont typeface="Arial" panose="020B0604020202020204" pitchFamily="34" charset="0"/>
-              <a:buNone/>
-              <a:defRPr sz="1600" kern="1200">
-                <a:solidFill>
-                  <a:schemeClr val="tx1"/>
-                </a:solidFill>
-                <a:latin typeface="+mn-lt"/>
-                <a:ea typeface="+mn-ea"/>
-                <a:cs typeface="+mn-cs"/>
-              </a:defRPr>
-            </a:lvl8pPr>
-            <a:lvl9pPr marL="3657600" indent="0" algn="ctr" defTabSz="914400" rtl="0" eaLnBrk="1" latinLnBrk="0" hangingPunct="1">
-              <a:lnSpc>
-                <a:spcPct val="90000"/>
-              </a:lnSpc>
-              <a:spcBef>
-                <a:spcPts val="500"/>
-              </a:spcBef>
-              <a:buFont typeface="Arial" panose="020B0604020202020204" pitchFamily="34" charset="0"/>
-              <a:buNone/>
-              <a:defRPr sz="1600" kern="1200">
-                <a:solidFill>
-                  <a:schemeClr val="tx1"/>
-                </a:solidFill>
-                <a:latin typeface="+mn-lt"/>
-                <a:ea typeface="+mn-ea"/>
-                <a:cs typeface="+mn-cs"/>
-              </a:defRPr>
-            </a:lvl9pPr>
-          </a:lstStyle>
-          <a:p>
-            <a:r>
-              <a:rPr lang="en-US" altLang="ko-Kore-KR" sz="4400" b="1" dirty="0">
-                <a:solidFill>
-                  <a:schemeClr val="accent2"/>
-                </a:solidFill>
-              </a:rPr>
-              <a:t>Function</a:t>
-            </a:r>
-            <a:endParaRPr lang="ko-Kore-KR" sz="4400" b="1" dirty="0">
-              <a:solidFill>
-                <a:schemeClr val="accent2"/>
-              </a:solidFill>
-            </a:endParaRPr>
-          </a:p>
-        </p:txBody>
-      </p:sp>
       <p:pic>
         <p:nvPicPr>
           <p:cNvPr id="6" name="그림 5" descr="텍스트, 스크린샷, 폰트, 디자인이(가) 표시된 사진&#10;&#10;자동 생성된 설명">
@@ -14547,7 +15034,7 @@
 </p:sld>
 </file>
 
-<file path=ppt/slides/slide5.xml><?xml version="1.0" encoding="utf-8"?>
+<file path=ppt/slides/slide4.xml><?xml version="1.0" encoding="utf-8"?>
 <p:sld xmlns:a="http://schemas.openxmlformats.org/drawingml/2006/main" xmlns:r="http://schemas.openxmlformats.org/officeDocument/2006/relationships" xmlns:p="http://schemas.openxmlformats.org/presentationml/2006/main">
   <p:cSld>
     <p:spTree>
@@ -15070,6 +15557,493 @@
     <p:extLst>
       <p:ext uri="{BB962C8B-B14F-4D97-AF65-F5344CB8AC3E}">
         <p14:creationId xmlns:p14="http://schemas.microsoft.com/office/powerpoint/2010/main" val="197822859"/>
+      </p:ext>
+    </p:extLst>
+  </p:cSld>
+  <p:clrMapOvr>
+    <a:masterClrMapping/>
+  </p:clrMapOvr>
+</p:sld>
+</file>
+
+<file path=ppt/slides/slide5.xml><?xml version="1.0" encoding="utf-8"?>
+<p:sld xmlns:a="http://schemas.openxmlformats.org/drawingml/2006/main" xmlns:r="http://schemas.openxmlformats.org/officeDocument/2006/relationships" xmlns:p="http://schemas.openxmlformats.org/presentationml/2006/main">
+  <p:cSld>
+    <p:spTree>
+      <p:nvGrpSpPr>
+        <p:cNvPr id="1" name=""/>
+        <p:cNvGrpSpPr/>
+        <p:nvPr/>
+      </p:nvGrpSpPr>
+      <p:grpSpPr>
+        <a:xfrm>
+          <a:off x="0" y="0"/>
+          <a:ext cx="0" cy="0"/>
+          <a:chOff x="0" y="0"/>
+          <a:chExt cx="0" cy="0"/>
+        </a:xfrm>
+      </p:grpSpPr>
+      <p:sp>
+        <p:nvSpPr>
+          <p:cNvPr id="7" name="직사각형 6">
+            <a:extLst>
+              <a:ext uri="{FF2B5EF4-FFF2-40B4-BE49-F238E27FC236}">
+                <a16:creationId xmlns:a16="http://schemas.microsoft.com/office/drawing/2014/main" id="{281491D1-B6E8-3BFB-42CF-945A32013856}"/>
+              </a:ext>
+            </a:extLst>
+          </p:cNvPr>
+          <p:cNvSpPr/>
+          <p:nvPr/>
+        </p:nvSpPr>
+        <p:spPr>
+          <a:xfrm>
+            <a:off x="-30480" y="6461759"/>
+            <a:ext cx="12240000" cy="454047"/>
+          </a:xfrm>
+          <a:prstGeom prst="rect">
+            <a:avLst/>
+          </a:prstGeom>
+          <a:solidFill>
+            <a:schemeClr val="accent1">
+              <a:alpha val="34949"/>
+            </a:schemeClr>
+          </a:solidFill>
+          <a:ln>
+            <a:noFill/>
+          </a:ln>
+        </p:spPr>
+        <p:style>
+          <a:lnRef idx="2">
+            <a:schemeClr val="accent1">
+              <a:shade val="15000"/>
+            </a:schemeClr>
+          </a:lnRef>
+          <a:fillRef idx="1">
+            <a:schemeClr val="accent1"/>
+          </a:fillRef>
+          <a:effectRef idx="0">
+            <a:schemeClr val="accent1"/>
+          </a:effectRef>
+          <a:fontRef idx="minor">
+            <a:schemeClr val="lt1"/>
+          </a:fontRef>
+        </p:style>
+        <p:txBody>
+          <a:bodyPr rtlCol="0" anchor="ctr"/>
+          <a:lstStyle/>
+          <a:p>
+            <a:pPr algn="ctr"/>
+            <a:endParaRPr kumimoji="1" lang="ko-Kore-KR" altLang="en-US" dirty="0"/>
+          </a:p>
+        </p:txBody>
+      </p:sp>
+      <p:sp>
+        <p:nvSpPr>
+          <p:cNvPr id="2" name="제목 1">
+            <a:extLst>
+              <a:ext uri="{FF2B5EF4-FFF2-40B4-BE49-F238E27FC236}">
+                <a16:creationId xmlns:a16="http://schemas.microsoft.com/office/drawing/2014/main" id="{5B025642-B38D-A74A-8F24-F7D52B9A84CE}"/>
+              </a:ext>
+            </a:extLst>
+          </p:cNvPr>
+          <p:cNvSpPr>
+            <a:spLocks noGrp="1"/>
+          </p:cNvSpPr>
+          <p:nvPr>
+            <p:ph type="ctrTitle"/>
+          </p:nvPr>
+        </p:nvSpPr>
+        <p:spPr>
+          <a:xfrm>
+            <a:off x="-332127" y="6792119"/>
+            <a:ext cx="3941379" cy="131762"/>
+          </a:xfrm>
+        </p:spPr>
+        <p:txBody>
+          <a:bodyPr>
+            <a:noAutofit/>
+          </a:bodyPr>
+          <a:lstStyle/>
+          <a:p>
+            <a:r>
+              <a:rPr lang="en-US" altLang="ko-Kore-KR" sz="2000" dirty="0" err="1">
+                <a:solidFill>
+                  <a:srgbClr val="7030A0"/>
+                </a:solidFill>
+              </a:rPr>
+              <a:t>SangMyeong</a:t>
+            </a:r>
+            <a:r>
+              <a:rPr lang="en-US" altLang="ko-Kore-KR" sz="2000" dirty="0">
+                <a:solidFill>
+                  <a:srgbClr val="7030A0"/>
+                </a:solidFill>
+              </a:rPr>
+              <a:t> Coding Education</a:t>
+            </a:r>
+            <a:endParaRPr lang="ko-Kore-KR" sz="2000" dirty="0">
+              <a:solidFill>
+                <a:srgbClr val="7030A0"/>
+              </a:solidFill>
+            </a:endParaRPr>
+          </a:p>
+        </p:txBody>
+      </p:sp>
+      <p:sp>
+        <p:nvSpPr>
+          <p:cNvPr id="3" name="부제목 2">
+            <a:extLst>
+              <a:ext uri="{FF2B5EF4-FFF2-40B4-BE49-F238E27FC236}">
+                <a16:creationId xmlns:a16="http://schemas.microsoft.com/office/drawing/2014/main" id="{F05A16A8-C921-DD4F-8509-1F06F45DEDD3}"/>
+              </a:ext>
+            </a:extLst>
+          </p:cNvPr>
+          <p:cNvSpPr>
+            <a:spLocks noGrp="1"/>
+          </p:cNvSpPr>
+          <p:nvPr>
+            <p:ph type="subTitle" idx="1"/>
+          </p:nvPr>
+        </p:nvSpPr>
+        <p:spPr>
+          <a:xfrm>
+            <a:off x="4743318" y="6512447"/>
+            <a:ext cx="2827283" cy="467903"/>
+          </a:xfrm>
+        </p:spPr>
+        <p:txBody>
+          <a:bodyPr>
+            <a:normAutofit/>
+          </a:bodyPr>
+          <a:lstStyle/>
+          <a:p>
+            <a:r>
+              <a:rPr lang="en-US" altLang="ko-KR" dirty="0"/>
+              <a:t>Function</a:t>
+            </a:r>
+            <a:endParaRPr lang="ko-Kore-KR" altLang="ko-Kore-KR" dirty="0"/>
+          </a:p>
+        </p:txBody>
+      </p:sp>
+      <p:sp>
+        <p:nvSpPr>
+          <p:cNvPr id="4" name="제목 1">
+            <a:extLst>
+              <a:ext uri="{FF2B5EF4-FFF2-40B4-BE49-F238E27FC236}">
+                <a16:creationId xmlns:a16="http://schemas.microsoft.com/office/drawing/2014/main" id="{AAA94350-F7A7-7F4D-9274-C4E68FEFACC2}"/>
+              </a:ext>
+            </a:extLst>
+          </p:cNvPr>
+          <p:cNvSpPr txBox="1">
+            <a:spLocks/>
+          </p:cNvSpPr>
+          <p:nvPr/>
+        </p:nvSpPr>
+        <p:spPr>
+          <a:xfrm>
+            <a:off x="11216640" y="6858000"/>
+            <a:ext cx="1069954" cy="57807"/>
+          </a:xfrm>
+          <a:prstGeom prst="rect">
+            <a:avLst/>
+          </a:prstGeom>
+        </p:spPr>
+        <p:txBody>
+          <a:bodyPr vert="horz" lIns="91440" tIns="45720" rIns="91440" bIns="45720" rtlCol="0" anchor="b">
+            <a:noAutofit/>
+          </a:bodyPr>
+          <a:lstStyle>
+            <a:lvl1pPr algn="ctr" defTabSz="914400" rtl="0" eaLnBrk="1" latinLnBrk="0" hangingPunct="1">
+              <a:lnSpc>
+                <a:spcPct val="90000"/>
+              </a:lnSpc>
+              <a:spcBef>
+                <a:spcPct val="0"/>
+              </a:spcBef>
+              <a:buNone/>
+              <a:defRPr sz="6000" kern="1200">
+                <a:solidFill>
+                  <a:schemeClr val="tx1"/>
+                </a:solidFill>
+                <a:latin typeface="+mj-lt"/>
+                <a:ea typeface="+mj-ea"/>
+                <a:cs typeface="+mj-cs"/>
+              </a:defRPr>
+            </a:lvl1pPr>
+          </a:lstStyle>
+          <a:p>
+            <a:r>
+              <a:rPr lang="en-US" sz="2400" dirty="0">
+                <a:solidFill>
+                  <a:srgbClr val="00B050"/>
+                </a:solidFill>
+              </a:rPr>
+              <a:t>week 4</a:t>
+            </a:r>
+            <a:endParaRPr lang="ko-Kore-KR" sz="2400" dirty="0">
+              <a:solidFill>
+                <a:srgbClr val="00B050"/>
+              </a:solidFill>
+            </a:endParaRPr>
+          </a:p>
+        </p:txBody>
+      </p:sp>
+      <p:sp>
+        <p:nvSpPr>
+          <p:cNvPr id="9" name="부제목 2">
+            <a:extLst>
+              <a:ext uri="{FF2B5EF4-FFF2-40B4-BE49-F238E27FC236}">
+                <a16:creationId xmlns:a16="http://schemas.microsoft.com/office/drawing/2014/main" id="{618387EB-79C7-B848-8C39-392B62BF4926}"/>
+              </a:ext>
+            </a:extLst>
+          </p:cNvPr>
+          <p:cNvSpPr txBox="1">
+            <a:spLocks/>
+          </p:cNvSpPr>
+          <p:nvPr/>
+        </p:nvSpPr>
+        <p:spPr>
+          <a:xfrm>
+            <a:off x="-1289789" y="0"/>
+            <a:ext cx="4899041" cy="778476"/>
+          </a:xfrm>
+          <a:prstGeom prst="rect">
+            <a:avLst/>
+          </a:prstGeom>
+        </p:spPr>
+        <p:txBody>
+          <a:bodyPr vert="horz" lIns="91440" tIns="45720" rIns="91440" bIns="45720" rtlCol="0">
+            <a:normAutofit/>
+          </a:bodyPr>
+          <a:lstStyle>
+            <a:lvl1pPr marL="0" indent="0" algn="ctr" defTabSz="914400" rtl="0" eaLnBrk="1" latinLnBrk="0" hangingPunct="1">
+              <a:lnSpc>
+                <a:spcPct val="90000"/>
+              </a:lnSpc>
+              <a:spcBef>
+                <a:spcPts val="1000"/>
+              </a:spcBef>
+              <a:buFont typeface="Arial" panose="020B0604020202020204" pitchFamily="34" charset="0"/>
+              <a:buNone/>
+              <a:defRPr sz="2400" kern="1200">
+                <a:solidFill>
+                  <a:schemeClr val="tx1"/>
+                </a:solidFill>
+                <a:latin typeface="+mn-lt"/>
+                <a:ea typeface="+mn-ea"/>
+                <a:cs typeface="+mn-cs"/>
+              </a:defRPr>
+            </a:lvl1pPr>
+            <a:lvl2pPr marL="457200" indent="0" algn="ctr" defTabSz="914400" rtl="0" eaLnBrk="1" latinLnBrk="0" hangingPunct="1">
+              <a:lnSpc>
+                <a:spcPct val="90000"/>
+              </a:lnSpc>
+              <a:spcBef>
+                <a:spcPts val="500"/>
+              </a:spcBef>
+              <a:buFont typeface="Arial" panose="020B0604020202020204" pitchFamily="34" charset="0"/>
+              <a:buNone/>
+              <a:defRPr sz="2000" kern="1200">
+                <a:solidFill>
+                  <a:schemeClr val="tx1"/>
+                </a:solidFill>
+                <a:latin typeface="+mn-lt"/>
+                <a:ea typeface="+mn-ea"/>
+                <a:cs typeface="+mn-cs"/>
+              </a:defRPr>
+            </a:lvl2pPr>
+            <a:lvl3pPr marL="914400" indent="0" algn="ctr" defTabSz="914400" rtl="0" eaLnBrk="1" latinLnBrk="0" hangingPunct="1">
+              <a:lnSpc>
+                <a:spcPct val="90000"/>
+              </a:lnSpc>
+              <a:spcBef>
+                <a:spcPts val="500"/>
+              </a:spcBef>
+              <a:buFont typeface="Arial" panose="020B0604020202020204" pitchFamily="34" charset="0"/>
+              <a:buNone/>
+              <a:defRPr sz="1800" kern="1200">
+                <a:solidFill>
+                  <a:schemeClr val="tx1"/>
+                </a:solidFill>
+                <a:latin typeface="+mn-lt"/>
+                <a:ea typeface="+mn-ea"/>
+                <a:cs typeface="+mn-cs"/>
+              </a:defRPr>
+            </a:lvl3pPr>
+            <a:lvl4pPr marL="1371600" indent="0" algn="ctr" defTabSz="914400" rtl="0" eaLnBrk="1" latinLnBrk="0" hangingPunct="1">
+              <a:lnSpc>
+                <a:spcPct val="90000"/>
+              </a:lnSpc>
+              <a:spcBef>
+                <a:spcPts val="500"/>
+              </a:spcBef>
+              <a:buFont typeface="Arial" panose="020B0604020202020204" pitchFamily="34" charset="0"/>
+              <a:buNone/>
+              <a:defRPr sz="1600" kern="1200">
+                <a:solidFill>
+                  <a:schemeClr val="tx1"/>
+                </a:solidFill>
+                <a:latin typeface="+mn-lt"/>
+                <a:ea typeface="+mn-ea"/>
+                <a:cs typeface="+mn-cs"/>
+              </a:defRPr>
+            </a:lvl4pPr>
+            <a:lvl5pPr marL="1828800" indent="0" algn="ctr" defTabSz="914400" rtl="0" eaLnBrk="1" latinLnBrk="0" hangingPunct="1">
+              <a:lnSpc>
+                <a:spcPct val="90000"/>
+              </a:lnSpc>
+              <a:spcBef>
+                <a:spcPts val="500"/>
+              </a:spcBef>
+              <a:buFont typeface="Arial" panose="020B0604020202020204" pitchFamily="34" charset="0"/>
+              <a:buNone/>
+              <a:defRPr sz="1600" kern="1200">
+                <a:solidFill>
+                  <a:schemeClr val="tx1"/>
+                </a:solidFill>
+                <a:latin typeface="+mn-lt"/>
+                <a:ea typeface="+mn-ea"/>
+                <a:cs typeface="+mn-cs"/>
+              </a:defRPr>
+            </a:lvl5pPr>
+            <a:lvl6pPr marL="2286000" indent="0" algn="ctr" defTabSz="914400" rtl="0" eaLnBrk="1" latinLnBrk="0" hangingPunct="1">
+              <a:lnSpc>
+                <a:spcPct val="90000"/>
+              </a:lnSpc>
+              <a:spcBef>
+                <a:spcPts val="500"/>
+              </a:spcBef>
+              <a:buFont typeface="Arial" panose="020B0604020202020204" pitchFamily="34" charset="0"/>
+              <a:buNone/>
+              <a:defRPr sz="1600" kern="1200">
+                <a:solidFill>
+                  <a:schemeClr val="tx1"/>
+                </a:solidFill>
+                <a:latin typeface="+mn-lt"/>
+                <a:ea typeface="+mn-ea"/>
+                <a:cs typeface="+mn-cs"/>
+              </a:defRPr>
+            </a:lvl6pPr>
+            <a:lvl7pPr marL="2743200" indent="0" algn="ctr" defTabSz="914400" rtl="0" eaLnBrk="1" latinLnBrk="0" hangingPunct="1">
+              <a:lnSpc>
+                <a:spcPct val="90000"/>
+              </a:lnSpc>
+              <a:spcBef>
+                <a:spcPts val="500"/>
+              </a:spcBef>
+              <a:buFont typeface="Arial" panose="020B0604020202020204" pitchFamily="34" charset="0"/>
+              <a:buNone/>
+              <a:defRPr sz="1600" kern="1200">
+                <a:solidFill>
+                  <a:schemeClr val="tx1"/>
+                </a:solidFill>
+                <a:latin typeface="+mn-lt"/>
+                <a:ea typeface="+mn-ea"/>
+                <a:cs typeface="+mn-cs"/>
+              </a:defRPr>
+            </a:lvl7pPr>
+            <a:lvl8pPr marL="3200400" indent="0" algn="ctr" defTabSz="914400" rtl="0" eaLnBrk="1" latinLnBrk="0" hangingPunct="1">
+              <a:lnSpc>
+                <a:spcPct val="90000"/>
+              </a:lnSpc>
+              <a:spcBef>
+                <a:spcPts val="500"/>
+              </a:spcBef>
+              <a:buFont typeface="Arial" panose="020B0604020202020204" pitchFamily="34" charset="0"/>
+              <a:buNone/>
+              <a:defRPr sz="1600" kern="1200">
+                <a:solidFill>
+                  <a:schemeClr val="tx1"/>
+                </a:solidFill>
+                <a:latin typeface="+mn-lt"/>
+                <a:ea typeface="+mn-ea"/>
+                <a:cs typeface="+mn-cs"/>
+              </a:defRPr>
+            </a:lvl8pPr>
+            <a:lvl9pPr marL="3657600" indent="0" algn="ctr" defTabSz="914400" rtl="0" eaLnBrk="1" latinLnBrk="0" hangingPunct="1">
+              <a:lnSpc>
+                <a:spcPct val="90000"/>
+              </a:lnSpc>
+              <a:spcBef>
+                <a:spcPts val="500"/>
+              </a:spcBef>
+              <a:buFont typeface="Arial" panose="020B0604020202020204" pitchFamily="34" charset="0"/>
+              <a:buNone/>
+              <a:defRPr sz="1600" kern="1200">
+                <a:solidFill>
+                  <a:schemeClr val="tx1"/>
+                </a:solidFill>
+                <a:latin typeface="+mn-lt"/>
+                <a:ea typeface="+mn-ea"/>
+                <a:cs typeface="+mn-cs"/>
+              </a:defRPr>
+            </a:lvl9pPr>
+          </a:lstStyle>
+          <a:p>
+            <a:r>
+              <a:rPr lang="en-US" altLang="ko-Kore-KR" sz="4400" b="1" dirty="0">
+                <a:solidFill>
+                  <a:schemeClr val="accent2"/>
+                </a:solidFill>
+              </a:rPr>
+              <a:t>Function</a:t>
+            </a:r>
+            <a:endParaRPr lang="ko-Kore-KR" sz="4400" b="1" dirty="0">
+              <a:solidFill>
+                <a:schemeClr val="accent2"/>
+              </a:solidFill>
+            </a:endParaRPr>
+          </a:p>
+        </p:txBody>
+      </p:sp>
+      <p:sp>
+        <p:nvSpPr>
+          <p:cNvPr id="8" name="TextBox 7">
+            <a:extLst>
+              <a:ext uri="{FF2B5EF4-FFF2-40B4-BE49-F238E27FC236}">
+                <a16:creationId xmlns:a16="http://schemas.microsoft.com/office/drawing/2014/main" id="{7A4EC139-2C93-74A4-FC19-DF3434756593}"/>
+              </a:ext>
+            </a:extLst>
+          </p:cNvPr>
+          <p:cNvSpPr txBox="1"/>
+          <p:nvPr/>
+        </p:nvSpPr>
+        <p:spPr>
+          <a:xfrm>
+            <a:off x="3457341" y="2844225"/>
+            <a:ext cx="5399235" cy="584775"/>
+          </a:xfrm>
+          <a:prstGeom prst="rect">
+            <a:avLst/>
+          </a:prstGeom>
+          <a:noFill/>
+        </p:spPr>
+        <p:txBody>
+          <a:bodyPr wrap="none" rtlCol="0">
+            <a:spAutoFit/>
+          </a:bodyPr>
+          <a:lstStyle/>
+          <a:p>
+            <a:r>
+              <a:rPr kumimoji="1" lang="ko-Kore-KR" altLang="en-US" sz="3200" dirty="0"/>
+              <a:t>반복적</a:t>
+            </a:r>
+            <a:r>
+              <a:rPr kumimoji="1" lang="ko-KR" altLang="en-US" sz="3200" dirty="0"/>
+              <a:t>인 프로그래밍을 피함</a:t>
+            </a:r>
+            <a:r>
+              <a:rPr kumimoji="1" lang="en-US" altLang="ko-KR" sz="3200" dirty="0"/>
+              <a:t>.</a:t>
+            </a:r>
+            <a:endParaRPr kumimoji="1" lang="ko-Kore-KR" altLang="en-US" sz="3200" dirty="0"/>
+          </a:p>
+        </p:txBody>
+      </p:sp>
+    </p:spTree>
+    <p:extLst>
+      <p:ext uri="{BB962C8B-B14F-4D97-AF65-F5344CB8AC3E}">
+        <p14:creationId xmlns:p14="http://schemas.microsoft.com/office/powerpoint/2010/main" val="1124208930"/>
       </p:ext>
     </p:extLst>
   </p:cSld>
@@ -16071,54 +17045,70 @@
           </a:p>
         </p:txBody>
       </p:sp>
-      <p:sp>
-        <p:nvSpPr>
-          <p:cNvPr id="8" name="TextBox 7">
-            <a:extLst>
-              <a:ext uri="{FF2B5EF4-FFF2-40B4-BE49-F238E27FC236}">
-                <a16:creationId xmlns:a16="http://schemas.microsoft.com/office/drawing/2014/main" id="{7A4EC139-2C93-74A4-FC19-DF3434756593}"/>
-              </a:ext>
-            </a:extLst>
-          </p:cNvPr>
-          <p:cNvSpPr txBox="1"/>
+      <p:pic>
+        <p:nvPicPr>
+          <p:cNvPr id="10" name="그림 9" descr="텍스트, 스크린샷, 폰트이(가) 표시된 사진&#10;&#10;자동 생성된 설명">
+            <a:extLst>
+              <a:ext uri="{FF2B5EF4-FFF2-40B4-BE49-F238E27FC236}">
+                <a16:creationId xmlns:a16="http://schemas.microsoft.com/office/drawing/2014/main" id="{47A1BE62-99B3-5D49-513E-B8B8D039BCE0}"/>
+              </a:ext>
+            </a:extLst>
+          </p:cNvPr>
+          <p:cNvPicPr>
+            <a:picLocks noChangeAspect="1"/>
+          </p:cNvPicPr>
           <p:nvPr/>
-        </p:nvSpPr>
+        </p:nvPicPr>
+        <p:blipFill>
+          <a:blip r:embed="rId2"/>
+          <a:stretch>
+            <a:fillRect/>
+          </a:stretch>
+        </p:blipFill>
         <p:spPr>
           <a:xfrm>
-            <a:off x="3457341" y="2844225"/>
-            <a:ext cx="5399235" cy="584775"/>
+            <a:off x="8438109" y="679937"/>
+            <a:ext cx="2651035" cy="5252977"/>
           </a:xfrm>
           <a:prstGeom prst="rect">
             <a:avLst/>
           </a:prstGeom>
-          <a:noFill/>
         </p:spPr>
-        <p:txBody>
-          <a:bodyPr wrap="none" rtlCol="0">
-            <a:spAutoFit/>
-          </a:bodyPr>
-          <a:lstStyle/>
-          <a:p>
-            <a:r>
-              <a:rPr kumimoji="1" lang="ko-Kore-KR" altLang="en-US" sz="3200" dirty="0"/>
-              <a:t>반복적</a:t>
-            </a:r>
-            <a:r>
-              <a:rPr kumimoji="1" lang="ko-KR" altLang="en-US" sz="3200" dirty="0"/>
-              <a:t>인 프로그래밍을 피함</a:t>
-            </a:r>
-            <a:r>
-              <a:rPr kumimoji="1" lang="en-US" altLang="ko-KR" sz="3200" dirty="0"/>
-              <a:t>.</a:t>
-            </a:r>
-            <a:endParaRPr kumimoji="1" lang="ko-Kore-KR" altLang="en-US" sz="3200" dirty="0"/>
-          </a:p>
-        </p:txBody>
-      </p:sp>
+      </p:pic>
+      <p:pic>
+        <p:nvPicPr>
+          <p:cNvPr id="14" name="그림 13" descr="텍스트, 스크린샷, 폰트이(가) 표시된 사진&#10;&#10;자동 생성된 설명">
+            <a:extLst>
+              <a:ext uri="{FF2B5EF4-FFF2-40B4-BE49-F238E27FC236}">
+                <a16:creationId xmlns:a16="http://schemas.microsoft.com/office/drawing/2014/main" id="{4367B812-602D-E5D5-8E6F-6DBD8123EED6}"/>
+              </a:ext>
+            </a:extLst>
+          </p:cNvPr>
+          <p:cNvPicPr>
+            <a:picLocks noChangeAspect="1"/>
+          </p:cNvPicPr>
+          <p:nvPr/>
+        </p:nvPicPr>
+        <p:blipFill>
+          <a:blip r:embed="rId3"/>
+          <a:stretch>
+            <a:fillRect/>
+          </a:stretch>
+        </p:blipFill>
+        <p:spPr>
+          <a:xfrm>
+            <a:off x="978388" y="891689"/>
+            <a:ext cx="6700228" cy="4829472"/>
+          </a:xfrm>
+          <a:prstGeom prst="rect">
+            <a:avLst/>
+          </a:prstGeom>
+        </p:spPr>
+      </p:pic>
     </p:spTree>
     <p:extLst>
       <p:ext uri="{BB962C8B-B14F-4D97-AF65-F5344CB8AC3E}">
-        <p14:creationId xmlns:p14="http://schemas.microsoft.com/office/powerpoint/2010/main" val="1124208930"/>
+        <p14:creationId xmlns:p14="http://schemas.microsoft.com/office/powerpoint/2010/main" val="1510301631"/>
       </p:ext>
     </p:extLst>
   </p:cSld>
@@ -16558,70 +17548,50 @@
           </a:p>
         </p:txBody>
       </p:sp>
-      <p:pic>
-        <p:nvPicPr>
-          <p:cNvPr id="10" name="그림 9" descr="텍스트, 스크린샷, 폰트이(가) 표시된 사진&#10;&#10;자동 생성된 설명">
-            <a:extLst>
-              <a:ext uri="{FF2B5EF4-FFF2-40B4-BE49-F238E27FC236}">
-                <a16:creationId xmlns:a16="http://schemas.microsoft.com/office/drawing/2014/main" id="{47A1BE62-99B3-5D49-513E-B8B8D039BCE0}"/>
-              </a:ext>
-            </a:extLst>
-          </p:cNvPr>
-          <p:cNvPicPr>
-            <a:picLocks noChangeAspect="1"/>
-          </p:cNvPicPr>
+      <p:sp>
+        <p:nvSpPr>
+          <p:cNvPr id="8" name="TextBox 7">
+            <a:extLst>
+              <a:ext uri="{FF2B5EF4-FFF2-40B4-BE49-F238E27FC236}">
+                <a16:creationId xmlns:a16="http://schemas.microsoft.com/office/drawing/2014/main" id="{7A4EC139-2C93-74A4-FC19-DF3434756593}"/>
+              </a:ext>
+            </a:extLst>
+          </p:cNvPr>
+          <p:cNvSpPr txBox="1"/>
           <p:nvPr/>
-        </p:nvPicPr>
-        <p:blipFill>
-          <a:blip r:embed="rId2"/>
-          <a:stretch>
-            <a:fillRect/>
-          </a:stretch>
-        </p:blipFill>
+        </p:nvSpPr>
         <p:spPr>
           <a:xfrm>
-            <a:off x="8438109" y="679937"/>
-            <a:ext cx="2651035" cy="5252977"/>
+            <a:off x="4529750" y="3035342"/>
+            <a:ext cx="3254417" cy="584775"/>
           </a:xfrm>
           <a:prstGeom prst="rect">
             <a:avLst/>
           </a:prstGeom>
+          <a:noFill/>
         </p:spPr>
-      </p:pic>
-      <p:pic>
-        <p:nvPicPr>
-          <p:cNvPr id="14" name="그림 13" descr="텍스트, 스크린샷, 폰트이(가) 표시된 사진&#10;&#10;자동 생성된 설명">
-            <a:extLst>
-              <a:ext uri="{FF2B5EF4-FFF2-40B4-BE49-F238E27FC236}">
-                <a16:creationId xmlns:a16="http://schemas.microsoft.com/office/drawing/2014/main" id="{4367B812-602D-E5D5-8E6F-6DBD8123EED6}"/>
-              </a:ext>
-            </a:extLst>
-          </p:cNvPr>
-          <p:cNvPicPr>
-            <a:picLocks noChangeAspect="1"/>
-          </p:cNvPicPr>
-          <p:nvPr/>
-        </p:nvPicPr>
-        <p:blipFill>
-          <a:blip r:embed="rId3"/>
-          <a:stretch>
-            <a:fillRect/>
-          </a:stretch>
-        </p:blipFill>
-        <p:spPr>
-          <a:xfrm>
-            <a:off x="978388" y="891689"/>
-            <a:ext cx="6700228" cy="4829472"/>
-          </a:xfrm>
-          <a:prstGeom prst="rect">
-            <a:avLst/>
-          </a:prstGeom>
-        </p:spPr>
-      </p:pic>
+        <p:txBody>
+          <a:bodyPr wrap="none" rtlCol="0">
+            <a:spAutoFit/>
+          </a:bodyPr>
+          <a:lstStyle/>
+          <a:p>
+            <a:r>
+              <a:rPr kumimoji="1" lang="ko-KR" altLang="en-US" sz="3200" dirty="0"/>
+              <a:t>가독성을 높인다</a:t>
+            </a:r>
+            <a:r>
+              <a:rPr kumimoji="1" lang="en-US" altLang="ko-KR" sz="3200" dirty="0"/>
+              <a:t>.</a:t>
+            </a:r>
+            <a:endParaRPr kumimoji="1" lang="ko-Kore-KR" altLang="en-US" sz="3200" dirty="0"/>
+          </a:p>
+        </p:txBody>
+      </p:sp>
     </p:spTree>
     <p:extLst>
       <p:ext uri="{BB962C8B-B14F-4D97-AF65-F5344CB8AC3E}">
-        <p14:creationId xmlns:p14="http://schemas.microsoft.com/office/powerpoint/2010/main" val="1510301631"/>
+        <p14:creationId xmlns:p14="http://schemas.microsoft.com/office/powerpoint/2010/main" val="956560261"/>
       </p:ext>
     </p:extLst>
   </p:cSld>
@@ -17061,50 +18031,40 @@
           </a:p>
         </p:txBody>
       </p:sp>
-      <p:sp>
-        <p:nvSpPr>
-          <p:cNvPr id="8" name="TextBox 7">
-            <a:extLst>
-              <a:ext uri="{FF2B5EF4-FFF2-40B4-BE49-F238E27FC236}">
-                <a16:creationId xmlns:a16="http://schemas.microsoft.com/office/drawing/2014/main" id="{7A4EC139-2C93-74A4-FC19-DF3434756593}"/>
-              </a:ext>
-            </a:extLst>
-          </p:cNvPr>
-          <p:cNvSpPr txBox="1"/>
+      <p:pic>
+        <p:nvPicPr>
+          <p:cNvPr id="6" name="그림 5" descr="텍스트, 스크린샷, 폰트이(가) 표시된 사진&#10;&#10;자동 생성된 설명">
+            <a:extLst>
+              <a:ext uri="{FF2B5EF4-FFF2-40B4-BE49-F238E27FC236}">
+                <a16:creationId xmlns:a16="http://schemas.microsoft.com/office/drawing/2014/main" id="{B1382B88-CB36-EE1E-9AB8-8B8215421F28}"/>
+              </a:ext>
+            </a:extLst>
+          </p:cNvPr>
+          <p:cNvPicPr>
+            <a:picLocks noChangeAspect="1"/>
+          </p:cNvPicPr>
           <p:nvPr/>
-        </p:nvSpPr>
+        </p:nvPicPr>
+        <p:blipFill>
+          <a:blip r:embed="rId2"/>
+          <a:stretch>
+            <a:fillRect/>
+          </a:stretch>
+        </p:blipFill>
         <p:spPr>
           <a:xfrm>
-            <a:off x="4529750" y="3035342"/>
-            <a:ext cx="3254417" cy="584775"/>
+            <a:off x="2607309" y="1931600"/>
+            <a:ext cx="7099300" cy="2057400"/>
           </a:xfrm>
           <a:prstGeom prst="rect">
             <a:avLst/>
           </a:prstGeom>
-          <a:noFill/>
         </p:spPr>
-        <p:txBody>
-          <a:bodyPr wrap="none" rtlCol="0">
-            <a:spAutoFit/>
-          </a:bodyPr>
-          <a:lstStyle/>
-          <a:p>
-            <a:r>
-              <a:rPr kumimoji="1" lang="ko-KR" altLang="en-US" sz="3200" dirty="0"/>
-              <a:t>가독성을 높인다</a:t>
-            </a:r>
-            <a:r>
-              <a:rPr kumimoji="1" lang="en-US" altLang="ko-KR" sz="3200" dirty="0"/>
-              <a:t>.</a:t>
-            </a:r>
-            <a:endParaRPr kumimoji="1" lang="ko-Kore-KR" altLang="en-US" sz="3200" dirty="0"/>
-          </a:p>
-        </p:txBody>
-      </p:sp>
+      </p:pic>
     </p:spTree>
     <p:extLst>
       <p:ext uri="{BB962C8B-B14F-4D97-AF65-F5344CB8AC3E}">
-        <p14:creationId xmlns:p14="http://schemas.microsoft.com/office/powerpoint/2010/main" val="956560261"/>
+        <p14:creationId xmlns:p14="http://schemas.microsoft.com/office/powerpoint/2010/main" val="3703148446"/>
       </p:ext>
     </p:extLst>
   </p:cSld>

</xml_diff>